<commit_message>
Deploy website - based on 654e0dfff9aef2195848f8bdcf044d06d4627068
</commit_message>
<xml_diff>
--- a/assets/1_process_img.pptx
+++ b/assets/1_process_img.pptx
@@ -217,7 +217,7 @@
           <a:p>
             <a:fld id="{CABFA58B-201B-41D2-AA3E-28483B84FD7B}" type="datetimeFigureOut">
               <a:rPr lang="ko-KR" altLang="en-US" smtClean="0"/>
-              <a:t>2022-03-08</a:t>
+              <a:t>2022-04-04</a:t>
             </a:fld>
             <a:endParaRPr lang="ko-KR" altLang="en-US"/>
           </a:p>
@@ -663,7 +663,7 @@
           <a:p>
             <a:fld id="{C33163C4-65CF-48D2-8124-E2CEDBD7A0C5}" type="datetimeFigureOut">
               <a:rPr lang="ko-KR" altLang="en-US" smtClean="0"/>
-              <a:t>2022-03-08</a:t>
+              <a:t>2022-04-04</a:t>
             </a:fld>
             <a:endParaRPr lang="ko-KR" altLang="en-US"/>
           </a:p>
@@ -985,7 +985,7 @@
           <a:p>
             <a:fld id="{C33163C4-65CF-48D2-8124-E2CEDBD7A0C5}" type="datetimeFigureOut">
               <a:rPr lang="ko-KR" altLang="en-US" smtClean="0"/>
-              <a:t>2022-03-08</a:t>
+              <a:t>2022-04-04</a:t>
             </a:fld>
             <a:endParaRPr lang="ko-KR" altLang="en-US"/>
           </a:p>
@@ -1163,7 +1163,7 @@
           <a:p>
             <a:fld id="{C33163C4-65CF-48D2-8124-E2CEDBD7A0C5}" type="datetimeFigureOut">
               <a:rPr lang="ko-KR" altLang="en-US" smtClean="0"/>
-              <a:t>2022-03-08</a:t>
+              <a:t>2022-04-04</a:t>
             </a:fld>
             <a:endParaRPr lang="ko-KR" altLang="en-US"/>
           </a:p>
@@ -1403,7 +1403,7 @@
           <a:p>
             <a:fld id="{29936F60-83FB-4643-B7D2-F169DF4090A4}" type="datetimeFigureOut">
               <a:rPr lang="ko-KR" altLang="en-US" smtClean="0"/>
-              <a:t>2022-03-08</a:t>
+              <a:t>2022-04-04</a:t>
             </a:fld>
             <a:endParaRPr lang="ko-KR" altLang="en-US"/>
           </a:p>
@@ -1571,7 +1571,7 @@
           <a:p>
             <a:fld id="{29936F60-83FB-4643-B7D2-F169DF4090A4}" type="datetimeFigureOut">
               <a:rPr lang="ko-KR" altLang="en-US" smtClean="0"/>
-              <a:t>2022-03-08</a:t>
+              <a:t>2022-04-04</a:t>
             </a:fld>
             <a:endParaRPr lang="ko-KR" altLang="en-US"/>
           </a:p>
@@ -1816,7 +1816,7 @@
           <a:p>
             <a:fld id="{29936F60-83FB-4643-B7D2-F169DF4090A4}" type="datetimeFigureOut">
               <a:rPr lang="ko-KR" altLang="en-US" smtClean="0"/>
-              <a:t>2022-03-08</a:t>
+              <a:t>2022-04-04</a:t>
             </a:fld>
             <a:endParaRPr lang="ko-KR" altLang="en-US"/>
           </a:p>
@@ -2101,7 +2101,7 @@
           <a:p>
             <a:fld id="{29936F60-83FB-4643-B7D2-F169DF4090A4}" type="datetimeFigureOut">
               <a:rPr lang="ko-KR" altLang="en-US" smtClean="0"/>
-              <a:t>2022-03-08</a:t>
+              <a:t>2022-04-04</a:t>
             </a:fld>
             <a:endParaRPr lang="ko-KR" altLang="en-US"/>
           </a:p>
@@ -2520,7 +2520,7 @@
           <a:p>
             <a:fld id="{29936F60-83FB-4643-B7D2-F169DF4090A4}" type="datetimeFigureOut">
               <a:rPr lang="ko-KR" altLang="en-US" smtClean="0"/>
-              <a:t>2022-03-08</a:t>
+              <a:t>2022-04-04</a:t>
             </a:fld>
             <a:endParaRPr lang="ko-KR" altLang="en-US"/>
           </a:p>
@@ -2637,7 +2637,7 @@
           <a:p>
             <a:fld id="{29936F60-83FB-4643-B7D2-F169DF4090A4}" type="datetimeFigureOut">
               <a:rPr lang="ko-KR" altLang="en-US" smtClean="0"/>
-              <a:t>2022-03-08</a:t>
+              <a:t>2022-04-04</a:t>
             </a:fld>
             <a:endParaRPr lang="ko-KR" altLang="en-US"/>
           </a:p>
@@ -2732,7 +2732,7 @@
           <a:p>
             <a:fld id="{29936F60-83FB-4643-B7D2-F169DF4090A4}" type="datetimeFigureOut">
               <a:rPr lang="ko-KR" altLang="en-US" smtClean="0"/>
-              <a:t>2022-03-08</a:t>
+              <a:t>2022-04-04</a:t>
             </a:fld>
             <a:endParaRPr lang="ko-KR" altLang="en-US"/>
           </a:p>
@@ -3007,7 +3007,7 @@
           <a:p>
             <a:fld id="{29936F60-83FB-4643-B7D2-F169DF4090A4}" type="datetimeFigureOut">
               <a:rPr lang="ko-KR" altLang="en-US" smtClean="0"/>
-              <a:t>2022-03-08</a:t>
+              <a:t>2022-04-04</a:t>
             </a:fld>
             <a:endParaRPr lang="ko-KR" altLang="en-US"/>
           </a:p>
@@ -3197,7 +3197,7 @@
           <a:p>
             <a:fld id="{C33163C4-65CF-48D2-8124-E2CEDBD7A0C5}" type="datetimeFigureOut">
               <a:rPr lang="ko-KR" altLang="en-US" smtClean="0"/>
-              <a:t>2022-03-08</a:t>
+              <a:t>2022-04-04</a:t>
             </a:fld>
             <a:endParaRPr lang="ko-KR" altLang="en-US"/>
           </a:p>
@@ -3810,7 +3810,7 @@
           <a:p>
             <a:fld id="{29936F60-83FB-4643-B7D2-F169DF4090A4}" type="datetimeFigureOut">
               <a:rPr lang="ko-KR" altLang="en-US" smtClean="0"/>
-              <a:t>2022-03-08</a:t>
+              <a:t>2022-04-04</a:t>
             </a:fld>
             <a:endParaRPr lang="ko-KR" altLang="en-US"/>
           </a:p>
@@ -3978,7 +3978,7 @@
           <a:p>
             <a:fld id="{29936F60-83FB-4643-B7D2-F169DF4090A4}" type="datetimeFigureOut">
               <a:rPr lang="ko-KR" altLang="en-US" smtClean="0"/>
-              <a:t>2022-03-08</a:t>
+              <a:t>2022-04-04</a:t>
             </a:fld>
             <a:endParaRPr lang="ko-KR" altLang="en-US"/>
           </a:p>
@@ -4156,7 +4156,7 @@
           <a:p>
             <a:fld id="{29936F60-83FB-4643-B7D2-F169DF4090A4}" type="datetimeFigureOut">
               <a:rPr lang="ko-KR" altLang="en-US" smtClean="0"/>
-              <a:t>2022-03-08</a:t>
+              <a:t>2022-04-04</a:t>
             </a:fld>
             <a:endParaRPr lang="ko-KR" altLang="en-US"/>
           </a:p>
@@ -4401,7 +4401,7 @@
           <a:p>
             <a:fld id="{C33163C4-65CF-48D2-8124-E2CEDBD7A0C5}" type="datetimeFigureOut">
               <a:rPr lang="ko-KR" altLang="en-US" smtClean="0"/>
-              <a:t>2022-03-08</a:t>
+              <a:t>2022-04-04</a:t>
             </a:fld>
             <a:endParaRPr lang="ko-KR" altLang="en-US"/>
           </a:p>
@@ -4527,7 +4527,7 @@
           <a:p>
             <a:fld id="{C33163C4-65CF-48D2-8124-E2CEDBD7A0C5}" type="datetimeFigureOut">
               <a:rPr lang="ko-KR" altLang="en-US" smtClean="0"/>
-              <a:t>2022-03-08</a:t>
+              <a:t>2022-04-04</a:t>
             </a:fld>
             <a:endParaRPr lang="ko-KR" altLang="en-US"/>
           </a:p>
@@ -5430,7 +5430,7 @@
           <a:p>
             <a:fld id="{C33163C4-65CF-48D2-8124-E2CEDBD7A0C5}" type="datetimeFigureOut">
               <a:rPr lang="ko-KR" altLang="en-US" smtClean="0"/>
-              <a:t>2022-03-08</a:t>
+              <a:t>2022-04-04</a:t>
             </a:fld>
             <a:endParaRPr lang="ko-KR" altLang="en-US"/>
           </a:p>
@@ -5547,7 +5547,7 @@
           <a:p>
             <a:fld id="{C33163C4-65CF-48D2-8124-E2CEDBD7A0C5}" type="datetimeFigureOut">
               <a:rPr lang="ko-KR" altLang="en-US" smtClean="0"/>
-              <a:t>2022-03-08</a:t>
+              <a:t>2022-04-04</a:t>
             </a:fld>
             <a:endParaRPr lang="ko-KR" altLang="en-US"/>
           </a:p>
@@ -5642,7 +5642,7 @@
           <a:p>
             <a:fld id="{C33163C4-65CF-48D2-8124-E2CEDBD7A0C5}" type="datetimeFigureOut">
               <a:rPr lang="ko-KR" altLang="en-US" smtClean="0"/>
-              <a:t>2022-03-08</a:t>
+              <a:t>2022-04-04</a:t>
             </a:fld>
             <a:endParaRPr lang="ko-KR" altLang="en-US"/>
           </a:p>
@@ -5917,7 +5917,7 @@
           <a:p>
             <a:fld id="{C33163C4-65CF-48D2-8124-E2CEDBD7A0C5}" type="datetimeFigureOut">
               <a:rPr lang="ko-KR" altLang="en-US" smtClean="0"/>
-              <a:t>2022-03-08</a:t>
+              <a:t>2022-04-04</a:t>
             </a:fld>
             <a:endParaRPr lang="ko-KR" altLang="en-US"/>
           </a:p>
@@ -6169,7 +6169,7 @@
           <a:p>
             <a:fld id="{C33163C4-65CF-48D2-8124-E2CEDBD7A0C5}" type="datetimeFigureOut">
               <a:rPr lang="ko-KR" altLang="en-US" smtClean="0"/>
-              <a:t>2022-03-08</a:t>
+              <a:t>2022-04-04</a:t>
             </a:fld>
             <a:endParaRPr lang="ko-KR" altLang="en-US"/>
           </a:p>
@@ -6404,7 +6404,7 @@
           <a:p>
             <a:fld id="{C33163C4-65CF-48D2-8124-E2CEDBD7A0C5}" type="datetimeFigureOut">
               <a:rPr lang="ko-KR" altLang="en-US" smtClean="0"/>
-              <a:t>2022-03-08</a:t>
+              <a:t>2022-04-04</a:t>
             </a:fld>
             <a:endParaRPr lang="ko-KR" altLang="en-US"/>
           </a:p>
@@ -6914,7 +6914,7 @@
           <a:p>
             <a:fld id="{29936F60-83FB-4643-B7D2-F169DF4090A4}" type="datetimeFigureOut">
               <a:rPr lang="ko-KR" altLang="en-US" smtClean="0"/>
-              <a:t>2022-03-08</a:t>
+              <a:t>2022-04-04</a:t>
             </a:fld>
             <a:endParaRPr lang="ko-KR" altLang="en-US"/>
           </a:p>
@@ -7331,6 +7331,1436 @@
           </a:p>
         </p:txBody>
       </p:sp>
+      <p:grpSp>
+        <p:nvGrpSpPr>
+          <p:cNvPr id="10" name="그룹 9"/>
+          <p:cNvGrpSpPr/>
+          <p:nvPr/>
+        </p:nvGrpSpPr>
+        <p:grpSpPr>
+          <a:xfrm>
+            <a:off x="3419364" y="7634806"/>
+            <a:ext cx="12612881" cy="5114987"/>
+            <a:chOff x="3419364" y="7634806"/>
+            <a:chExt cx="12612881" cy="5114987"/>
+          </a:xfrm>
+        </p:grpSpPr>
+        <p:pic>
+          <p:nvPicPr>
+            <p:cNvPr id="8" name="그림 7"/>
+            <p:cNvPicPr>
+              <a:picLocks noChangeAspect="1"/>
+            </p:cNvPicPr>
+            <p:nvPr/>
+          </p:nvPicPr>
+          <p:blipFill>
+            <a:blip r:embed="rId2"/>
+            <a:stretch>
+              <a:fillRect/>
+            </a:stretch>
+          </p:blipFill>
+          <p:spPr>
+            <a:xfrm>
+              <a:off x="3419364" y="7634807"/>
+              <a:ext cx="7005547" cy="5114986"/>
+            </a:xfrm>
+            <a:prstGeom prst="rect">
+              <a:avLst/>
+            </a:prstGeom>
+            <a:ln>
+              <a:solidFill>
+                <a:schemeClr val="tx1"/>
+              </a:solidFill>
+            </a:ln>
+          </p:spPr>
+        </p:pic>
+        <p:pic>
+          <p:nvPicPr>
+            <p:cNvPr id="9" name="그림 8"/>
+            <p:cNvPicPr>
+              <a:picLocks noChangeAspect="1"/>
+            </p:cNvPicPr>
+            <p:nvPr/>
+          </p:nvPicPr>
+          <p:blipFill>
+            <a:blip r:embed="rId3">
+              <a:extLst>
+                <a:ext uri="{28A0092B-C50C-407E-A947-70E740481C1C}">
+                  <a14:useLocalDpi xmlns:a14="http://schemas.microsoft.com/office/drawing/2010/main" val="0"/>
+                </a:ext>
+              </a:extLst>
+            </a:blip>
+            <a:stretch>
+              <a:fillRect/>
+            </a:stretch>
+          </p:blipFill>
+          <p:spPr>
+            <a:xfrm>
+              <a:off x="6887452" y="7634806"/>
+              <a:ext cx="9144793" cy="5114987"/>
+            </a:xfrm>
+            <a:prstGeom prst="rect">
+              <a:avLst/>
+            </a:prstGeom>
+            <a:ln>
+              <a:solidFill>
+                <a:schemeClr val="tx1"/>
+              </a:solidFill>
+            </a:ln>
+          </p:spPr>
+        </p:pic>
+      </p:grpSp>
+      <p:grpSp>
+        <p:nvGrpSpPr>
+          <p:cNvPr id="55" name="그룹 54"/>
+          <p:cNvGrpSpPr/>
+          <p:nvPr/>
+        </p:nvGrpSpPr>
+        <p:grpSpPr>
+          <a:xfrm>
+            <a:off x="5529944" y="1277257"/>
+            <a:ext cx="9971314" cy="5834743"/>
+            <a:chOff x="5529944" y="1277257"/>
+            <a:chExt cx="9971314" cy="5834743"/>
+          </a:xfrm>
+        </p:grpSpPr>
+        <p:sp>
+          <p:nvSpPr>
+            <p:cNvPr id="54" name="직사각형 53"/>
+            <p:cNvSpPr/>
+            <p:nvPr/>
+          </p:nvSpPr>
+          <p:spPr>
+            <a:xfrm>
+              <a:off x="5529944" y="1277257"/>
+              <a:ext cx="9971314" cy="5834743"/>
+            </a:xfrm>
+            <a:prstGeom prst="rect">
+              <a:avLst/>
+            </a:prstGeom>
+            <a:solidFill>
+              <a:schemeClr val="bg1"/>
+            </a:solidFill>
+            <a:ln>
+              <a:noFill/>
+            </a:ln>
+          </p:spPr>
+          <p:style>
+            <a:lnRef idx="2">
+              <a:schemeClr val="accent1">
+                <a:shade val="50000"/>
+              </a:schemeClr>
+            </a:lnRef>
+            <a:fillRef idx="1">
+              <a:schemeClr val="accent1"/>
+            </a:fillRef>
+            <a:effectRef idx="0">
+              <a:schemeClr val="accent1"/>
+            </a:effectRef>
+            <a:fontRef idx="minor">
+              <a:schemeClr val="lt1"/>
+            </a:fontRef>
+          </p:style>
+          <p:txBody>
+            <a:bodyPr rtlCol="0" anchor="ctr"/>
+            <a:lstStyle/>
+            <a:p>
+              <a:pPr algn="ctr"/>
+              <a:endParaRPr lang="ko-KR" altLang="en-US"/>
+            </a:p>
+          </p:txBody>
+        </p:sp>
+        <p:grpSp>
+          <p:nvGrpSpPr>
+            <p:cNvPr id="53" name="그룹 52"/>
+            <p:cNvGrpSpPr/>
+            <p:nvPr/>
+          </p:nvGrpSpPr>
+          <p:grpSpPr>
+            <a:xfrm>
+              <a:off x="5561635" y="1331293"/>
+              <a:ext cx="9920629" cy="5675678"/>
+              <a:chOff x="5561635" y="1331293"/>
+              <a:chExt cx="9920629" cy="5675678"/>
+            </a:xfrm>
+          </p:grpSpPr>
+          <p:pic>
+            <p:nvPicPr>
+              <p:cNvPr id="28" name="그림 121"/>
+              <p:cNvPicPr>
+                <a:picLocks noChangeAspect="1"/>
+              </p:cNvPicPr>
+              <p:nvPr/>
+            </p:nvPicPr>
+            <p:blipFill>
+              <a:blip r:embed="rId4">
+                <a:extLst>
+                  <a:ext uri="{28A0092B-C50C-407E-A947-70E740481C1C}">
+                    <a14:useLocalDpi xmlns:a14="http://schemas.microsoft.com/office/drawing/2010/main" val="0"/>
+                  </a:ext>
+                </a:extLst>
+              </a:blip>
+              <a:srcRect r="13307"/>
+              <a:stretch>
+                <a:fillRect/>
+              </a:stretch>
+            </p:blipFill>
+            <p:spPr bwMode="auto">
+              <a:xfrm>
+                <a:off x="5636970" y="5084497"/>
+                <a:ext cx="3561162" cy="1922474"/>
+              </a:xfrm>
+              <a:prstGeom prst="rect">
+                <a:avLst/>
+              </a:prstGeom>
+              <a:noFill/>
+              <a:ln w="25400">
+                <a:solidFill>
+                  <a:srgbClr val="0000FF"/>
+                </a:solidFill>
+                <a:miter lim="800000"/>
+                <a:headEnd/>
+                <a:tailEnd/>
+              </a:ln>
+              <a:extLst>
+                <a:ext uri="{909E8E84-426E-40DD-AFC4-6F175D3DCCD1}">
+                  <a14:hiddenFill xmlns:a14="http://schemas.microsoft.com/office/drawing/2010/main">
+                    <a:solidFill>
+                      <a:srgbClr val="FFFFFF"/>
+                    </a:solidFill>
+                  </a14:hiddenFill>
+                </a:ext>
+              </a:extLst>
+            </p:spPr>
+          </p:pic>
+          <p:sp>
+            <p:nvSpPr>
+              <p:cNvPr id="31" name="Text Box 3"/>
+              <p:cNvSpPr txBox="1">
+                <a:spLocks noChangeAspect="1" noChangeArrowheads="1"/>
+              </p:cNvSpPr>
+              <p:nvPr/>
+            </p:nvSpPr>
+            <p:spPr bwMode="auto">
+              <a:xfrm>
+                <a:off x="6000826" y="5120857"/>
+                <a:ext cx="2870949" cy="161425"/>
+              </a:xfrm>
+              <a:prstGeom prst="rect">
+                <a:avLst/>
+              </a:prstGeom>
+              <a:noFill/>
+              <a:ln>
+                <a:noFill/>
+              </a:ln>
+              <a:extLst>
+                <a:ext uri="{909E8E84-426E-40DD-AFC4-6F175D3DCCD1}">
+                  <a14:hiddenFill xmlns:a14="http://schemas.microsoft.com/office/drawing/2010/main">
+                    <a:solidFill>
+                      <a:srgbClr val="FFFFFF"/>
+                    </a:solidFill>
+                  </a14:hiddenFill>
+                </a:ext>
+                <a:ext uri="{91240B29-F687-4F45-9708-019B960494DF}">
+                  <a14:hiddenLine xmlns:a14="http://schemas.microsoft.com/office/drawing/2010/main" w="9525" algn="ctr">
+                    <a:solidFill>
+                      <a:srgbClr val="000000"/>
+                    </a:solidFill>
+                    <a:miter lim="800000"/>
+                    <a:headEnd/>
+                    <a:tailEnd/>
+                  </a14:hiddenLine>
+                </a:ext>
+              </a:extLst>
+            </p:spPr>
+            <p:txBody>
+              <a:bodyPr wrap="none"/>
+              <a:lstStyle>
+                <a:lvl1pPr>
+                  <a:defRPr>
+                    <a:solidFill>
+                      <a:schemeClr val="tx1"/>
+                    </a:solidFill>
+                    <a:latin typeface="맑은 고딕" panose="020B0503020000020004" pitchFamily="50" charset="-127"/>
+                    <a:ea typeface="맑은 고딕" panose="020B0503020000020004" pitchFamily="50" charset="-127"/>
+                  </a:defRPr>
+                </a:lvl1pPr>
+                <a:lvl2pPr marL="742950" indent="-285750">
+                  <a:defRPr>
+                    <a:solidFill>
+                      <a:schemeClr val="tx1"/>
+                    </a:solidFill>
+                    <a:latin typeface="맑은 고딕" panose="020B0503020000020004" pitchFamily="50" charset="-127"/>
+                    <a:ea typeface="맑은 고딕" panose="020B0503020000020004" pitchFamily="50" charset="-127"/>
+                  </a:defRPr>
+                </a:lvl2pPr>
+                <a:lvl3pPr marL="1143000" indent="-228600">
+                  <a:defRPr>
+                    <a:solidFill>
+                      <a:schemeClr val="tx1"/>
+                    </a:solidFill>
+                    <a:latin typeface="맑은 고딕" panose="020B0503020000020004" pitchFamily="50" charset="-127"/>
+                    <a:ea typeface="맑은 고딕" panose="020B0503020000020004" pitchFamily="50" charset="-127"/>
+                  </a:defRPr>
+                </a:lvl3pPr>
+                <a:lvl4pPr marL="1600200" indent="-228600">
+                  <a:defRPr>
+                    <a:solidFill>
+                      <a:schemeClr val="tx1"/>
+                    </a:solidFill>
+                    <a:latin typeface="맑은 고딕" panose="020B0503020000020004" pitchFamily="50" charset="-127"/>
+                    <a:ea typeface="맑은 고딕" panose="020B0503020000020004" pitchFamily="50" charset="-127"/>
+                  </a:defRPr>
+                </a:lvl4pPr>
+                <a:lvl5pPr marL="2057400" indent="-228600">
+                  <a:defRPr>
+                    <a:solidFill>
+                      <a:schemeClr val="tx1"/>
+                    </a:solidFill>
+                    <a:latin typeface="맑은 고딕" panose="020B0503020000020004" pitchFamily="50" charset="-127"/>
+                    <a:ea typeface="맑은 고딕" panose="020B0503020000020004" pitchFamily="50" charset="-127"/>
+                  </a:defRPr>
+                </a:lvl5pPr>
+                <a:lvl6pPr marL="2514600" indent="-228600" eaLnBrk="0" fontAlgn="base" hangingPunct="0">
+                  <a:spcBef>
+                    <a:spcPct val="0"/>
+                  </a:spcBef>
+                  <a:spcAft>
+                    <a:spcPct val="0"/>
+                  </a:spcAft>
+                  <a:defRPr>
+                    <a:solidFill>
+                      <a:schemeClr val="tx1"/>
+                    </a:solidFill>
+                    <a:latin typeface="맑은 고딕" panose="020B0503020000020004" pitchFamily="50" charset="-127"/>
+                    <a:ea typeface="맑은 고딕" panose="020B0503020000020004" pitchFamily="50" charset="-127"/>
+                  </a:defRPr>
+                </a:lvl6pPr>
+                <a:lvl7pPr marL="2971800" indent="-228600" eaLnBrk="0" fontAlgn="base" hangingPunct="0">
+                  <a:spcBef>
+                    <a:spcPct val="0"/>
+                  </a:spcBef>
+                  <a:spcAft>
+                    <a:spcPct val="0"/>
+                  </a:spcAft>
+                  <a:defRPr>
+                    <a:solidFill>
+                      <a:schemeClr val="tx1"/>
+                    </a:solidFill>
+                    <a:latin typeface="맑은 고딕" panose="020B0503020000020004" pitchFamily="50" charset="-127"/>
+                    <a:ea typeface="맑은 고딕" panose="020B0503020000020004" pitchFamily="50" charset="-127"/>
+                  </a:defRPr>
+                </a:lvl7pPr>
+                <a:lvl8pPr marL="3429000" indent="-228600" eaLnBrk="0" fontAlgn="base" hangingPunct="0">
+                  <a:spcBef>
+                    <a:spcPct val="0"/>
+                  </a:spcBef>
+                  <a:spcAft>
+                    <a:spcPct val="0"/>
+                  </a:spcAft>
+                  <a:defRPr>
+                    <a:solidFill>
+                      <a:schemeClr val="tx1"/>
+                    </a:solidFill>
+                    <a:latin typeface="맑은 고딕" panose="020B0503020000020004" pitchFamily="50" charset="-127"/>
+                    <a:ea typeface="맑은 고딕" panose="020B0503020000020004" pitchFamily="50" charset="-127"/>
+                  </a:defRPr>
+                </a:lvl8pPr>
+                <a:lvl9pPr marL="3886200" indent="-228600" eaLnBrk="0" fontAlgn="base" hangingPunct="0">
+                  <a:spcBef>
+                    <a:spcPct val="0"/>
+                  </a:spcBef>
+                  <a:spcAft>
+                    <a:spcPct val="0"/>
+                  </a:spcAft>
+                  <a:defRPr>
+                    <a:solidFill>
+                      <a:schemeClr val="tx1"/>
+                    </a:solidFill>
+                    <a:latin typeface="맑은 고딕" panose="020B0503020000020004" pitchFamily="50" charset="-127"/>
+                    <a:ea typeface="맑은 고딕" panose="020B0503020000020004" pitchFamily="50" charset="-127"/>
+                  </a:defRPr>
+                </a:lvl9pPr>
+              </a:lstStyle>
+              <a:p>
+                <a:pPr eaLnBrk="1" hangingPunct="1">
+                  <a:spcBef>
+                    <a:spcPct val="50000"/>
+                  </a:spcBef>
+                </a:pPr>
+                <a:r>
+                  <a:rPr kumimoji="1" lang="ko-KR" altLang="en-US" sz="800" b="1" smtClean="0"/>
+                  <a:t>로직에 </a:t>
+                </a:r>
+                <a:r>
+                  <a:rPr kumimoji="1" lang="ko-KR" altLang="en-US" sz="800" b="1"/>
+                  <a:t>대한 </a:t>
+                </a:r>
+                <a:r>
+                  <a:rPr kumimoji="1" lang="ko-KR" altLang="en-US" sz="800" b="1"/>
+                  <a:t>상태를 </a:t>
+                </a:r>
+                <a:r>
+                  <a:rPr kumimoji="1" lang="ko-KR" altLang="en-US" sz="800" b="1" smtClean="0"/>
+                  <a:t>정의하여 </a:t>
+                </a:r>
+                <a:r>
+                  <a:rPr kumimoji="1" lang="en-US" altLang="ko-KR" sz="800" b="1" smtClean="0"/>
+                  <a:t>SW</a:t>
+                </a:r>
+                <a:r>
+                  <a:rPr kumimoji="1" lang="ko-KR" altLang="en-US" sz="800" b="1" smtClean="0"/>
+                  <a:t>전체 </a:t>
+                </a:r>
+                <a:r>
+                  <a:rPr kumimoji="1" lang="ko-KR" altLang="en-US" sz="800" b="1"/>
+                  <a:t>동작을 </a:t>
+                </a:r>
+                <a:r>
+                  <a:rPr kumimoji="1" lang="ko-KR" altLang="en-US" sz="800" b="1"/>
+                  <a:t>포괄적으로 </a:t>
+                </a:r>
+                <a:r>
+                  <a:rPr kumimoji="1" lang="ko-KR" altLang="en-US" sz="800" b="1" smtClean="0"/>
+                  <a:t>파악</a:t>
+                </a:r>
+                <a:endParaRPr kumimoji="1" lang="en-US" altLang="ko-KR" sz="800" b="1"/>
+              </a:p>
+            </p:txBody>
+          </p:sp>
+          <p:grpSp>
+            <p:nvGrpSpPr>
+              <p:cNvPr id="43" name="그룹 42"/>
+              <p:cNvGrpSpPr>
+                <a:grpSpLocks noChangeAspect="1"/>
+              </p:cNvGrpSpPr>
+              <p:nvPr/>
+            </p:nvGrpSpPr>
+            <p:grpSpPr>
+              <a:xfrm>
+                <a:off x="5561635" y="1331293"/>
+                <a:ext cx="9920629" cy="5615152"/>
+                <a:chOff x="10925914" y="2519089"/>
+                <a:chExt cx="6986587" cy="3954462"/>
+              </a:xfrm>
+            </p:grpSpPr>
+            <p:pic>
+              <p:nvPicPr>
+                <p:cNvPr id="33" name="그림 21"/>
+                <p:cNvPicPr>
+                  <a:picLocks noChangeAspect="1"/>
+                </p:cNvPicPr>
+                <p:nvPr/>
+              </p:nvPicPr>
+              <p:blipFill>
+                <a:blip r:embed="rId5">
+                  <a:extLst>
+                    <a:ext uri="{28A0092B-C50C-407E-A947-70E740481C1C}">
+                      <a14:useLocalDpi xmlns:a14="http://schemas.microsoft.com/office/drawing/2010/main" val="0"/>
+                    </a:ext>
+                  </a:extLst>
+                </a:blip>
+                <a:srcRect/>
+                <a:stretch>
+                  <a:fillRect/>
+                </a:stretch>
+              </p:blipFill>
+              <p:spPr bwMode="auto">
+                <a:xfrm>
+                  <a:off x="10925914" y="2592114"/>
+                  <a:ext cx="3651250" cy="2514600"/>
+                </a:xfrm>
+                <a:prstGeom prst="rect">
+                  <a:avLst/>
+                </a:prstGeom>
+                <a:noFill/>
+                <a:ln>
+                  <a:noFill/>
+                </a:ln>
+                <a:extLst>
+                  <a:ext uri="{909E8E84-426E-40DD-AFC4-6F175D3DCCD1}">
+                    <a14:hiddenFill xmlns:a14="http://schemas.microsoft.com/office/drawing/2010/main">
+                      <a:solidFill>
+                        <a:srgbClr val="FFFFFF"/>
+                      </a:solidFill>
+                    </a14:hiddenFill>
+                  </a:ext>
+                  <a:ext uri="{91240B29-F687-4F45-9708-019B960494DF}">
+                    <a14:hiddenLine xmlns:a14="http://schemas.microsoft.com/office/drawing/2010/main" w="9525">
+                      <a:solidFill>
+                        <a:srgbClr val="000000"/>
+                      </a:solidFill>
+                      <a:miter lim="800000"/>
+                      <a:headEnd/>
+                      <a:tailEnd/>
+                    </a14:hiddenLine>
+                  </a:ext>
+                </a:extLst>
+              </p:spPr>
+            </p:pic>
+            <p:pic>
+              <p:nvPicPr>
+                <p:cNvPr id="34" name="그림 1"/>
+                <p:cNvPicPr>
+                  <a:picLocks noChangeAspect="1"/>
+                </p:cNvPicPr>
+                <p:nvPr/>
+              </p:nvPicPr>
+              <p:blipFill>
+                <a:blip r:embed="rId6">
+                  <a:extLst>
+                    <a:ext uri="{28A0092B-C50C-407E-A947-70E740481C1C}">
+                      <a14:useLocalDpi xmlns:a14="http://schemas.microsoft.com/office/drawing/2010/main" val="0"/>
+                    </a:ext>
+                  </a:extLst>
+                </a:blip>
+                <a:srcRect/>
+                <a:stretch>
+                  <a:fillRect/>
+                </a:stretch>
+              </p:blipFill>
+              <p:spPr bwMode="auto">
+                <a:xfrm>
+                  <a:off x="14575576" y="2519089"/>
+                  <a:ext cx="3336925" cy="3954462"/>
+                </a:xfrm>
+                <a:prstGeom prst="rect">
+                  <a:avLst/>
+                </a:prstGeom>
+                <a:noFill/>
+                <a:ln>
+                  <a:noFill/>
+                </a:ln>
+                <a:extLst>
+                  <a:ext uri="{909E8E84-426E-40DD-AFC4-6F175D3DCCD1}">
+                    <a14:hiddenFill xmlns:a14="http://schemas.microsoft.com/office/drawing/2010/main">
+                      <a:solidFill>
+                        <a:srgbClr val="FFFFFF"/>
+                      </a:solidFill>
+                    </a14:hiddenFill>
+                  </a:ext>
+                  <a:ext uri="{91240B29-F687-4F45-9708-019B960494DF}">
+                    <a14:hiddenLine xmlns:a14="http://schemas.microsoft.com/office/drawing/2010/main" w="9525">
+                      <a:solidFill>
+                        <a:srgbClr val="000000"/>
+                      </a:solidFill>
+                      <a:miter lim="800000"/>
+                      <a:headEnd/>
+                      <a:tailEnd/>
+                    </a14:hiddenLine>
+                  </a:ext>
+                </a:extLst>
+              </p:spPr>
+            </p:pic>
+            <p:sp>
+              <p:nvSpPr>
+                <p:cNvPr id="35" name="TextBox 34"/>
+                <p:cNvSpPr txBox="1"/>
+                <p:nvPr/>
+              </p:nvSpPr>
+              <p:spPr>
+                <a:xfrm>
+                  <a:off x="12962676" y="3919264"/>
+                  <a:ext cx="228600" cy="76200"/>
+                </a:xfrm>
+                <a:prstGeom prst="rect">
+                  <a:avLst/>
+                </a:prstGeom>
+                <a:solidFill>
+                  <a:schemeClr val="bg1">
+                    <a:lumMod val="95000"/>
+                  </a:schemeClr>
+                </a:solidFill>
+              </p:spPr>
+              <p:txBody>
+                <a:bodyPr lIns="0" tIns="0" rIns="0" bIns="0">
+                  <a:normAutofit/>
+                </a:bodyPr>
+                <a:lstStyle>
+                  <a:lvl1pPr>
+                    <a:defRPr>
+                      <a:solidFill>
+                        <a:schemeClr val="tx1"/>
+                      </a:solidFill>
+                      <a:latin typeface="맑은 고딕" panose="020B0503020000020004" pitchFamily="50" charset="-127"/>
+                      <a:ea typeface="맑은 고딕" panose="020B0503020000020004" pitchFamily="50" charset="-127"/>
+                    </a:defRPr>
+                  </a:lvl1pPr>
+                  <a:lvl2pPr marL="742950" indent="-285750">
+                    <a:defRPr>
+                      <a:solidFill>
+                        <a:schemeClr val="tx1"/>
+                      </a:solidFill>
+                      <a:latin typeface="맑은 고딕" panose="020B0503020000020004" pitchFamily="50" charset="-127"/>
+                      <a:ea typeface="맑은 고딕" panose="020B0503020000020004" pitchFamily="50" charset="-127"/>
+                    </a:defRPr>
+                  </a:lvl2pPr>
+                  <a:lvl3pPr marL="1143000" indent="-228600">
+                    <a:defRPr>
+                      <a:solidFill>
+                        <a:schemeClr val="tx1"/>
+                      </a:solidFill>
+                      <a:latin typeface="맑은 고딕" panose="020B0503020000020004" pitchFamily="50" charset="-127"/>
+                      <a:ea typeface="맑은 고딕" panose="020B0503020000020004" pitchFamily="50" charset="-127"/>
+                    </a:defRPr>
+                  </a:lvl3pPr>
+                  <a:lvl4pPr marL="1600200" indent="-228600">
+                    <a:defRPr>
+                      <a:solidFill>
+                        <a:schemeClr val="tx1"/>
+                      </a:solidFill>
+                      <a:latin typeface="맑은 고딕" panose="020B0503020000020004" pitchFamily="50" charset="-127"/>
+                      <a:ea typeface="맑은 고딕" panose="020B0503020000020004" pitchFamily="50" charset="-127"/>
+                    </a:defRPr>
+                  </a:lvl4pPr>
+                  <a:lvl5pPr marL="2057400" indent="-228600">
+                    <a:defRPr>
+                      <a:solidFill>
+                        <a:schemeClr val="tx1"/>
+                      </a:solidFill>
+                      <a:latin typeface="맑은 고딕" panose="020B0503020000020004" pitchFamily="50" charset="-127"/>
+                      <a:ea typeface="맑은 고딕" panose="020B0503020000020004" pitchFamily="50" charset="-127"/>
+                    </a:defRPr>
+                  </a:lvl5pPr>
+                  <a:lvl6pPr marL="2514600" indent="-228600" eaLnBrk="0" fontAlgn="base" hangingPunct="0">
+                    <a:spcBef>
+                      <a:spcPct val="0"/>
+                    </a:spcBef>
+                    <a:spcAft>
+                      <a:spcPct val="0"/>
+                    </a:spcAft>
+                    <a:defRPr>
+                      <a:solidFill>
+                        <a:schemeClr val="tx1"/>
+                      </a:solidFill>
+                      <a:latin typeface="맑은 고딕" panose="020B0503020000020004" pitchFamily="50" charset="-127"/>
+                      <a:ea typeface="맑은 고딕" panose="020B0503020000020004" pitchFamily="50" charset="-127"/>
+                    </a:defRPr>
+                  </a:lvl6pPr>
+                  <a:lvl7pPr marL="2971800" indent="-228600" eaLnBrk="0" fontAlgn="base" hangingPunct="0">
+                    <a:spcBef>
+                      <a:spcPct val="0"/>
+                    </a:spcBef>
+                    <a:spcAft>
+                      <a:spcPct val="0"/>
+                    </a:spcAft>
+                    <a:defRPr>
+                      <a:solidFill>
+                        <a:schemeClr val="tx1"/>
+                      </a:solidFill>
+                      <a:latin typeface="맑은 고딕" panose="020B0503020000020004" pitchFamily="50" charset="-127"/>
+                      <a:ea typeface="맑은 고딕" panose="020B0503020000020004" pitchFamily="50" charset="-127"/>
+                    </a:defRPr>
+                  </a:lvl7pPr>
+                  <a:lvl8pPr marL="3429000" indent="-228600" eaLnBrk="0" fontAlgn="base" hangingPunct="0">
+                    <a:spcBef>
+                      <a:spcPct val="0"/>
+                    </a:spcBef>
+                    <a:spcAft>
+                      <a:spcPct val="0"/>
+                    </a:spcAft>
+                    <a:defRPr>
+                      <a:solidFill>
+                        <a:schemeClr val="tx1"/>
+                      </a:solidFill>
+                      <a:latin typeface="맑은 고딕" panose="020B0503020000020004" pitchFamily="50" charset="-127"/>
+                      <a:ea typeface="맑은 고딕" panose="020B0503020000020004" pitchFamily="50" charset="-127"/>
+                    </a:defRPr>
+                  </a:lvl8pPr>
+                  <a:lvl9pPr marL="3886200" indent="-228600" eaLnBrk="0" fontAlgn="base" hangingPunct="0">
+                    <a:spcBef>
+                      <a:spcPct val="0"/>
+                    </a:spcBef>
+                    <a:spcAft>
+                      <a:spcPct val="0"/>
+                    </a:spcAft>
+                    <a:defRPr>
+                      <a:solidFill>
+                        <a:schemeClr val="tx1"/>
+                      </a:solidFill>
+                      <a:latin typeface="맑은 고딕" panose="020B0503020000020004" pitchFamily="50" charset="-127"/>
+                      <a:ea typeface="맑은 고딕" panose="020B0503020000020004" pitchFamily="50" charset="-127"/>
+                    </a:defRPr>
+                  </a:lvl9pPr>
+                </a:lstStyle>
+                <a:p>
+                  <a:pPr algn="ctr">
+                    <a:defRPr/>
+                  </a:pPr>
+                  <a:r>
+                    <a:rPr lang="en-US" altLang="ko-KR" sz="400" b="1" smtClean="0">
+                      <a:latin typeface="Cambria" panose="02040503050406030204" pitchFamily="18" charset="0"/>
+                      <a:ea typeface="Cambria" panose="02040503050406030204" pitchFamily="18" charset="0"/>
+                      <a:cs typeface="Arial" panose="020B0604020202020204" pitchFamily="34" charset="0"/>
+                    </a:rPr>
+                    <a:t>RollBlind</a:t>
+                  </a:r>
+                  <a:endParaRPr lang="ko-KR" altLang="en-US" sz="400" b="1" smtClean="0">
+                    <a:latin typeface="Cambria" panose="02040503050406030204" pitchFamily="18" charset="0"/>
+                    <a:ea typeface="Cambria" panose="02040503050406030204" pitchFamily="18" charset="0"/>
+                    <a:cs typeface="Arial" panose="020B0604020202020204" pitchFamily="34" charset="0"/>
+                  </a:endParaRPr>
+                </a:p>
+              </p:txBody>
+            </p:sp>
+            <p:sp>
+              <p:nvSpPr>
+                <p:cNvPr id="36" name="TextBox 35"/>
+                <p:cNvSpPr txBox="1"/>
+                <p:nvPr/>
+              </p:nvSpPr>
+              <p:spPr>
+                <a:xfrm>
+                  <a:off x="13010301" y="2638151"/>
+                  <a:ext cx="152400" cy="76200"/>
+                </a:xfrm>
+                <a:prstGeom prst="rect">
+                  <a:avLst/>
+                </a:prstGeom>
+                <a:solidFill>
+                  <a:schemeClr val="bg1">
+                    <a:lumMod val="95000"/>
+                  </a:schemeClr>
+                </a:solidFill>
+              </p:spPr>
+              <p:txBody>
+                <a:bodyPr lIns="0" tIns="0" rIns="0" bIns="0">
+                  <a:normAutofit/>
+                </a:bodyPr>
+                <a:lstStyle>
+                  <a:lvl1pPr>
+                    <a:defRPr>
+                      <a:solidFill>
+                        <a:schemeClr val="tx1"/>
+                      </a:solidFill>
+                      <a:latin typeface="맑은 고딕" panose="020B0503020000020004" pitchFamily="50" charset="-127"/>
+                      <a:ea typeface="맑은 고딕" panose="020B0503020000020004" pitchFamily="50" charset="-127"/>
+                    </a:defRPr>
+                  </a:lvl1pPr>
+                  <a:lvl2pPr marL="742950" indent="-285750">
+                    <a:defRPr>
+                      <a:solidFill>
+                        <a:schemeClr val="tx1"/>
+                      </a:solidFill>
+                      <a:latin typeface="맑은 고딕" panose="020B0503020000020004" pitchFamily="50" charset="-127"/>
+                      <a:ea typeface="맑은 고딕" panose="020B0503020000020004" pitchFamily="50" charset="-127"/>
+                    </a:defRPr>
+                  </a:lvl2pPr>
+                  <a:lvl3pPr marL="1143000" indent="-228600">
+                    <a:defRPr>
+                      <a:solidFill>
+                        <a:schemeClr val="tx1"/>
+                      </a:solidFill>
+                      <a:latin typeface="맑은 고딕" panose="020B0503020000020004" pitchFamily="50" charset="-127"/>
+                      <a:ea typeface="맑은 고딕" panose="020B0503020000020004" pitchFamily="50" charset="-127"/>
+                    </a:defRPr>
+                  </a:lvl3pPr>
+                  <a:lvl4pPr marL="1600200" indent="-228600">
+                    <a:defRPr>
+                      <a:solidFill>
+                        <a:schemeClr val="tx1"/>
+                      </a:solidFill>
+                      <a:latin typeface="맑은 고딕" panose="020B0503020000020004" pitchFamily="50" charset="-127"/>
+                      <a:ea typeface="맑은 고딕" panose="020B0503020000020004" pitchFamily="50" charset="-127"/>
+                    </a:defRPr>
+                  </a:lvl4pPr>
+                  <a:lvl5pPr marL="2057400" indent="-228600">
+                    <a:defRPr>
+                      <a:solidFill>
+                        <a:schemeClr val="tx1"/>
+                      </a:solidFill>
+                      <a:latin typeface="맑은 고딕" panose="020B0503020000020004" pitchFamily="50" charset="-127"/>
+                      <a:ea typeface="맑은 고딕" panose="020B0503020000020004" pitchFamily="50" charset="-127"/>
+                    </a:defRPr>
+                  </a:lvl5pPr>
+                  <a:lvl6pPr marL="2514600" indent="-228600" eaLnBrk="0" fontAlgn="base" hangingPunct="0">
+                    <a:spcBef>
+                      <a:spcPct val="0"/>
+                    </a:spcBef>
+                    <a:spcAft>
+                      <a:spcPct val="0"/>
+                    </a:spcAft>
+                    <a:defRPr>
+                      <a:solidFill>
+                        <a:schemeClr val="tx1"/>
+                      </a:solidFill>
+                      <a:latin typeface="맑은 고딕" panose="020B0503020000020004" pitchFamily="50" charset="-127"/>
+                      <a:ea typeface="맑은 고딕" panose="020B0503020000020004" pitchFamily="50" charset="-127"/>
+                    </a:defRPr>
+                  </a:lvl6pPr>
+                  <a:lvl7pPr marL="2971800" indent="-228600" eaLnBrk="0" fontAlgn="base" hangingPunct="0">
+                    <a:spcBef>
+                      <a:spcPct val="0"/>
+                    </a:spcBef>
+                    <a:spcAft>
+                      <a:spcPct val="0"/>
+                    </a:spcAft>
+                    <a:defRPr>
+                      <a:solidFill>
+                        <a:schemeClr val="tx1"/>
+                      </a:solidFill>
+                      <a:latin typeface="맑은 고딕" panose="020B0503020000020004" pitchFamily="50" charset="-127"/>
+                      <a:ea typeface="맑은 고딕" panose="020B0503020000020004" pitchFamily="50" charset="-127"/>
+                    </a:defRPr>
+                  </a:lvl7pPr>
+                  <a:lvl8pPr marL="3429000" indent="-228600" eaLnBrk="0" fontAlgn="base" hangingPunct="0">
+                    <a:spcBef>
+                      <a:spcPct val="0"/>
+                    </a:spcBef>
+                    <a:spcAft>
+                      <a:spcPct val="0"/>
+                    </a:spcAft>
+                    <a:defRPr>
+                      <a:solidFill>
+                        <a:schemeClr val="tx1"/>
+                      </a:solidFill>
+                      <a:latin typeface="맑은 고딕" panose="020B0503020000020004" pitchFamily="50" charset="-127"/>
+                      <a:ea typeface="맑은 고딕" panose="020B0503020000020004" pitchFamily="50" charset="-127"/>
+                    </a:defRPr>
+                  </a:lvl8pPr>
+                  <a:lvl9pPr marL="3886200" indent="-228600" eaLnBrk="0" fontAlgn="base" hangingPunct="0">
+                    <a:spcBef>
+                      <a:spcPct val="0"/>
+                    </a:spcBef>
+                    <a:spcAft>
+                      <a:spcPct val="0"/>
+                    </a:spcAft>
+                    <a:defRPr>
+                      <a:solidFill>
+                        <a:schemeClr val="tx1"/>
+                      </a:solidFill>
+                      <a:latin typeface="맑은 고딕" panose="020B0503020000020004" pitchFamily="50" charset="-127"/>
+                      <a:ea typeface="맑은 고딕" panose="020B0503020000020004" pitchFamily="50" charset="-127"/>
+                    </a:defRPr>
+                  </a:lvl9pPr>
+                </a:lstStyle>
+                <a:p>
+                  <a:pPr algn="ctr">
+                    <a:defRPr/>
+                  </a:pPr>
+                  <a:r>
+                    <a:rPr lang="en-US" altLang="ko-KR" sz="400" b="1" smtClean="0">
+                      <a:latin typeface="Cambria" panose="02040503050406030204" pitchFamily="18" charset="0"/>
+                      <a:ea typeface="Cambria" panose="02040503050406030204" pitchFamily="18" charset="0"/>
+                      <a:cs typeface="Arial" panose="020B0604020202020204" pitchFamily="34" charset="0"/>
+                    </a:rPr>
+                    <a:t>Glass</a:t>
+                  </a:r>
+                  <a:endParaRPr lang="ko-KR" altLang="en-US" sz="400" b="1" smtClean="0">
+                    <a:latin typeface="Cambria" panose="02040503050406030204" pitchFamily="18" charset="0"/>
+                    <a:ea typeface="Cambria" panose="02040503050406030204" pitchFamily="18" charset="0"/>
+                    <a:cs typeface="Arial" panose="020B0604020202020204" pitchFamily="34" charset="0"/>
+                  </a:endParaRPr>
+                </a:p>
+              </p:txBody>
+            </p:sp>
+            <p:sp>
+              <p:nvSpPr>
+                <p:cNvPr id="37" name="직사각형 36"/>
+                <p:cNvSpPr/>
+                <p:nvPr/>
+              </p:nvSpPr>
+              <p:spPr>
+                <a:xfrm>
+                  <a:off x="12640414" y="2760389"/>
+                  <a:ext cx="839787" cy="990600"/>
+                </a:xfrm>
+                <a:prstGeom prst="rect">
+                  <a:avLst/>
+                </a:prstGeom>
+                <a:solidFill>
+                  <a:schemeClr val="accent4">
+                    <a:lumMod val="50000"/>
+                    <a:alpha val="16000"/>
+                  </a:schemeClr>
+                </a:solidFill>
+                <a:ln>
+                  <a:solidFill>
+                    <a:schemeClr val="accent4"/>
+                  </a:solidFill>
+                </a:ln>
+              </p:spPr>
+              <p:style>
+                <a:lnRef idx="2">
+                  <a:schemeClr val="accent1">
+                    <a:shade val="50000"/>
+                  </a:schemeClr>
+                </a:lnRef>
+                <a:fillRef idx="1">
+                  <a:schemeClr val="accent1"/>
+                </a:fillRef>
+                <a:effectRef idx="0">
+                  <a:schemeClr val="accent1"/>
+                </a:effectRef>
+                <a:fontRef idx="minor">
+                  <a:schemeClr val="lt1"/>
+                </a:fontRef>
+              </p:style>
+              <p:txBody>
+                <a:bodyPr anchor="ctr"/>
+                <a:lstStyle/>
+                <a:p>
+                  <a:pPr algn="ctr">
+                    <a:defRPr/>
+                  </a:pPr>
+                  <a:endParaRPr lang="ko-KR" altLang="en-US"/>
+                </a:p>
+              </p:txBody>
+            </p:sp>
+            <p:sp>
+              <p:nvSpPr>
+                <p:cNvPr id="38" name="직사각형 37"/>
+                <p:cNvSpPr/>
+                <p:nvPr/>
+              </p:nvSpPr>
+              <p:spPr>
+                <a:xfrm>
+                  <a:off x="14743851" y="2533376"/>
+                  <a:ext cx="3130550" cy="1901825"/>
+                </a:xfrm>
+                <a:prstGeom prst="rect">
+                  <a:avLst/>
+                </a:prstGeom>
+                <a:solidFill>
+                  <a:schemeClr val="accent4">
+                    <a:lumMod val="50000"/>
+                    <a:alpha val="16000"/>
+                  </a:schemeClr>
+                </a:solidFill>
+                <a:ln>
+                  <a:solidFill>
+                    <a:schemeClr val="accent4"/>
+                  </a:solidFill>
+                </a:ln>
+              </p:spPr>
+              <p:style>
+                <a:lnRef idx="2">
+                  <a:schemeClr val="accent1">
+                    <a:shade val="50000"/>
+                  </a:schemeClr>
+                </a:lnRef>
+                <a:fillRef idx="1">
+                  <a:schemeClr val="accent1"/>
+                </a:fillRef>
+                <a:effectRef idx="0">
+                  <a:schemeClr val="accent1"/>
+                </a:effectRef>
+                <a:fontRef idx="minor">
+                  <a:schemeClr val="lt1"/>
+                </a:fontRef>
+              </p:style>
+              <p:txBody>
+                <a:bodyPr anchor="ctr"/>
+                <a:lstStyle/>
+                <a:p>
+                  <a:pPr algn="ctr">
+                    <a:defRPr/>
+                  </a:pPr>
+                  <a:endParaRPr lang="ko-KR" altLang="en-US"/>
+                </a:p>
+              </p:txBody>
+            </p:sp>
+            <p:sp>
+              <p:nvSpPr>
+                <p:cNvPr id="39" name="직사각형 38"/>
+                <p:cNvSpPr/>
+                <p:nvPr/>
+              </p:nvSpPr>
+              <p:spPr>
+                <a:xfrm>
+                  <a:off x="12645176" y="4044676"/>
+                  <a:ext cx="839788" cy="992188"/>
+                </a:xfrm>
+                <a:prstGeom prst="rect">
+                  <a:avLst/>
+                </a:prstGeom>
+                <a:solidFill>
+                  <a:schemeClr val="accent6">
+                    <a:lumMod val="50000"/>
+                    <a:alpha val="16000"/>
+                  </a:schemeClr>
+                </a:solidFill>
+                <a:ln>
+                  <a:solidFill>
+                    <a:schemeClr val="accent6"/>
+                  </a:solidFill>
+                </a:ln>
+              </p:spPr>
+              <p:style>
+                <a:lnRef idx="2">
+                  <a:schemeClr val="accent1">
+                    <a:shade val="50000"/>
+                  </a:schemeClr>
+                </a:lnRef>
+                <a:fillRef idx="1">
+                  <a:schemeClr val="accent1"/>
+                </a:fillRef>
+                <a:effectRef idx="0">
+                  <a:schemeClr val="accent1"/>
+                </a:effectRef>
+                <a:fontRef idx="minor">
+                  <a:schemeClr val="lt1"/>
+                </a:fontRef>
+              </p:style>
+              <p:txBody>
+                <a:bodyPr anchor="ctr"/>
+                <a:lstStyle/>
+                <a:p>
+                  <a:pPr algn="ctr">
+                    <a:defRPr/>
+                  </a:pPr>
+                  <a:endParaRPr lang="ko-KR" altLang="en-US"/>
+                </a:p>
+              </p:txBody>
+            </p:sp>
+            <p:sp>
+              <p:nvSpPr>
+                <p:cNvPr id="40" name="직사각형 39"/>
+                <p:cNvSpPr/>
+                <p:nvPr/>
+              </p:nvSpPr>
+              <p:spPr>
+                <a:xfrm>
+                  <a:off x="14732739" y="4565376"/>
+                  <a:ext cx="3130550" cy="1901825"/>
+                </a:xfrm>
+                <a:prstGeom prst="rect">
+                  <a:avLst/>
+                </a:prstGeom>
+                <a:solidFill>
+                  <a:schemeClr val="accent6">
+                    <a:lumMod val="50000"/>
+                    <a:alpha val="16000"/>
+                  </a:schemeClr>
+                </a:solidFill>
+                <a:ln>
+                  <a:solidFill>
+                    <a:schemeClr val="accent6"/>
+                  </a:solidFill>
+                </a:ln>
+              </p:spPr>
+              <p:style>
+                <a:lnRef idx="2">
+                  <a:schemeClr val="accent1">
+                    <a:shade val="50000"/>
+                  </a:schemeClr>
+                </a:lnRef>
+                <a:fillRef idx="1">
+                  <a:schemeClr val="accent1"/>
+                </a:fillRef>
+                <a:effectRef idx="0">
+                  <a:schemeClr val="accent1"/>
+                </a:effectRef>
+                <a:fontRef idx="minor">
+                  <a:schemeClr val="lt1"/>
+                </a:fontRef>
+              </p:style>
+              <p:txBody>
+                <a:bodyPr anchor="ctr"/>
+                <a:lstStyle/>
+                <a:p>
+                  <a:pPr algn="ctr">
+                    <a:defRPr/>
+                  </a:pPr>
+                  <a:endParaRPr lang="ko-KR" altLang="en-US"/>
+                </a:p>
+              </p:txBody>
+            </p:sp>
+            <p:sp>
+              <p:nvSpPr>
+                <p:cNvPr id="41" name="자유형 40"/>
+                <p:cNvSpPr/>
+                <p:nvPr/>
+              </p:nvSpPr>
+              <p:spPr>
+                <a:xfrm>
+                  <a:off x="13484964" y="2536551"/>
+                  <a:ext cx="1258887" cy="1897063"/>
+                </a:xfrm>
+                <a:custGeom>
+                  <a:avLst/>
+                  <a:gdLst>
+                    <a:gd name="connsiteX0" fmla="*/ 0 w 1663700"/>
+                    <a:gd name="connsiteY0" fmla="*/ 260350 h 2241550"/>
+                    <a:gd name="connsiteX1" fmla="*/ 1663700 w 1663700"/>
+                    <a:gd name="connsiteY1" fmla="*/ 0 h 2241550"/>
+                    <a:gd name="connsiteX2" fmla="*/ 1663700 w 1663700"/>
+                    <a:gd name="connsiteY2" fmla="*/ 2241550 h 2241550"/>
+                    <a:gd name="connsiteX3" fmla="*/ 0 w 1663700"/>
+                    <a:gd name="connsiteY3" fmla="*/ 1428750 h 2241550"/>
+                    <a:gd name="connsiteX4" fmla="*/ 0 w 1663700"/>
+                    <a:gd name="connsiteY4" fmla="*/ 260350 h 2241550"/>
+                  </a:gdLst>
+                  <a:ahLst/>
+                  <a:cxnLst>
+                    <a:cxn ang="0">
+                      <a:pos x="connsiteX0" y="connsiteY0"/>
+                    </a:cxn>
+                    <a:cxn ang="0">
+                      <a:pos x="connsiteX1" y="connsiteY1"/>
+                    </a:cxn>
+                    <a:cxn ang="0">
+                      <a:pos x="connsiteX2" y="connsiteY2"/>
+                    </a:cxn>
+                    <a:cxn ang="0">
+                      <a:pos x="connsiteX3" y="connsiteY3"/>
+                    </a:cxn>
+                    <a:cxn ang="0">
+                      <a:pos x="connsiteX4" y="connsiteY4"/>
+                    </a:cxn>
+                  </a:cxnLst>
+                  <a:rect l="l" t="t" r="r" b="b"/>
+                  <a:pathLst>
+                    <a:path w="1663700" h="2241550">
+                      <a:moveTo>
+                        <a:pt x="0" y="260350"/>
+                      </a:moveTo>
+                      <a:lnTo>
+                        <a:pt x="1663700" y="0"/>
+                      </a:lnTo>
+                      <a:lnTo>
+                        <a:pt x="1663700" y="2241550"/>
+                      </a:lnTo>
+                      <a:lnTo>
+                        <a:pt x="0" y="1428750"/>
+                      </a:lnTo>
+                      <a:lnTo>
+                        <a:pt x="0" y="260350"/>
+                      </a:lnTo>
+                      <a:close/>
+                    </a:path>
+                  </a:pathLst>
+                </a:custGeom>
+                <a:solidFill>
+                  <a:schemeClr val="accent4">
+                    <a:lumMod val="50000"/>
+                    <a:alpha val="16000"/>
+                  </a:schemeClr>
+                </a:solidFill>
+                <a:ln>
+                  <a:solidFill>
+                    <a:schemeClr val="accent4"/>
+                  </a:solidFill>
+                </a:ln>
+              </p:spPr>
+              <p:style>
+                <a:lnRef idx="2">
+                  <a:schemeClr val="accent1">
+                    <a:shade val="50000"/>
+                  </a:schemeClr>
+                </a:lnRef>
+                <a:fillRef idx="1">
+                  <a:schemeClr val="accent1"/>
+                </a:fillRef>
+                <a:effectRef idx="0">
+                  <a:schemeClr val="accent1"/>
+                </a:effectRef>
+                <a:fontRef idx="minor">
+                  <a:schemeClr val="lt1"/>
+                </a:fontRef>
+              </p:style>
+              <p:txBody>
+                <a:bodyPr anchor="ctr"/>
+                <a:lstStyle/>
+                <a:p>
+                  <a:pPr algn="ctr">
+                    <a:defRPr/>
+                  </a:pPr>
+                  <a:endParaRPr lang="ko-KR" altLang="en-US"/>
+                </a:p>
+              </p:txBody>
+            </p:sp>
+            <p:sp>
+              <p:nvSpPr>
+                <p:cNvPr id="42" name="자유형 41"/>
+                <p:cNvSpPr/>
+                <p:nvPr/>
+              </p:nvSpPr>
+              <p:spPr>
+                <a:xfrm>
+                  <a:off x="13480201" y="4041501"/>
+                  <a:ext cx="1252538" cy="2419350"/>
+                </a:xfrm>
+                <a:custGeom>
+                  <a:avLst/>
+                  <a:gdLst>
+                    <a:gd name="connsiteX0" fmla="*/ 0 w 1657350"/>
+                    <a:gd name="connsiteY0" fmla="*/ 0 h 2857500"/>
+                    <a:gd name="connsiteX1" fmla="*/ 6350 w 1657350"/>
+                    <a:gd name="connsiteY1" fmla="*/ 1174750 h 2857500"/>
+                    <a:gd name="connsiteX2" fmla="*/ 1657350 w 1657350"/>
+                    <a:gd name="connsiteY2" fmla="*/ 2857500 h 2857500"/>
+                    <a:gd name="connsiteX3" fmla="*/ 1651000 w 1657350"/>
+                    <a:gd name="connsiteY3" fmla="*/ 609600 h 2857500"/>
+                    <a:gd name="connsiteX4" fmla="*/ 0 w 1657350"/>
+                    <a:gd name="connsiteY4" fmla="*/ 0 h 2857500"/>
+                  </a:gdLst>
+                  <a:ahLst/>
+                  <a:cxnLst>
+                    <a:cxn ang="0">
+                      <a:pos x="connsiteX0" y="connsiteY0"/>
+                    </a:cxn>
+                    <a:cxn ang="0">
+                      <a:pos x="connsiteX1" y="connsiteY1"/>
+                    </a:cxn>
+                    <a:cxn ang="0">
+                      <a:pos x="connsiteX2" y="connsiteY2"/>
+                    </a:cxn>
+                    <a:cxn ang="0">
+                      <a:pos x="connsiteX3" y="connsiteY3"/>
+                    </a:cxn>
+                    <a:cxn ang="0">
+                      <a:pos x="connsiteX4" y="connsiteY4"/>
+                    </a:cxn>
+                  </a:cxnLst>
+                  <a:rect l="l" t="t" r="r" b="b"/>
+                  <a:pathLst>
+                    <a:path w="1657350" h="2857500">
+                      <a:moveTo>
+                        <a:pt x="0" y="0"/>
+                      </a:moveTo>
+                      <a:cubicBezTo>
+                        <a:pt x="2117" y="391583"/>
+                        <a:pt x="4233" y="783167"/>
+                        <a:pt x="6350" y="1174750"/>
+                      </a:cubicBezTo>
+                      <a:lnTo>
+                        <a:pt x="1657350" y="2857500"/>
+                      </a:lnTo>
+                      <a:cubicBezTo>
+                        <a:pt x="1655233" y="2108200"/>
+                        <a:pt x="1653117" y="1358900"/>
+                        <a:pt x="1651000" y="609600"/>
+                      </a:cubicBezTo>
+                      <a:lnTo>
+                        <a:pt x="0" y="0"/>
+                      </a:lnTo>
+                      <a:close/>
+                    </a:path>
+                  </a:pathLst>
+                </a:custGeom>
+                <a:solidFill>
+                  <a:schemeClr val="accent6">
+                    <a:lumMod val="50000"/>
+                    <a:alpha val="16000"/>
+                  </a:schemeClr>
+                </a:solidFill>
+                <a:ln>
+                  <a:solidFill>
+                    <a:schemeClr val="accent6"/>
+                  </a:solidFill>
+                </a:ln>
+              </p:spPr>
+              <p:style>
+                <a:lnRef idx="2">
+                  <a:schemeClr val="accent1">
+                    <a:shade val="50000"/>
+                  </a:schemeClr>
+                </a:lnRef>
+                <a:fillRef idx="1">
+                  <a:schemeClr val="accent1"/>
+                </a:fillRef>
+                <a:effectRef idx="0">
+                  <a:schemeClr val="accent1"/>
+                </a:effectRef>
+                <a:fontRef idx="minor">
+                  <a:schemeClr val="lt1"/>
+                </a:fontRef>
+              </p:style>
+              <p:txBody>
+                <a:bodyPr anchor="ctr"/>
+                <a:lstStyle/>
+                <a:p>
+                  <a:pPr algn="ctr">
+                    <a:defRPr/>
+                  </a:pPr>
+                  <a:endParaRPr lang="ko-KR" altLang="en-US"/>
+                </a:p>
+              </p:txBody>
+            </p:sp>
+          </p:grpSp>
+          <p:sp>
+            <p:nvSpPr>
+              <p:cNvPr id="44" name="직사각형 43"/>
+              <p:cNvSpPr/>
+              <p:nvPr/>
+            </p:nvSpPr>
+            <p:spPr>
+              <a:xfrm>
+                <a:off x="12968288" y="2102644"/>
+                <a:ext cx="747712" cy="478631"/>
+              </a:xfrm>
+              <a:prstGeom prst="rect">
+                <a:avLst/>
+              </a:prstGeom>
+              <a:noFill/>
+              <a:ln>
+                <a:solidFill>
+                  <a:srgbClr val="0000FF"/>
+                </a:solidFill>
+              </a:ln>
+            </p:spPr>
+            <p:style>
+              <a:lnRef idx="2">
+                <a:schemeClr val="accent1">
+                  <a:shade val="50000"/>
+                </a:schemeClr>
+              </a:lnRef>
+              <a:fillRef idx="1">
+                <a:schemeClr val="accent1"/>
+              </a:fillRef>
+              <a:effectRef idx="0">
+                <a:schemeClr val="accent1"/>
+              </a:effectRef>
+              <a:fontRef idx="minor">
+                <a:schemeClr val="lt1"/>
+              </a:fontRef>
+            </p:style>
+            <p:txBody>
+              <a:bodyPr rtlCol="0" anchor="ctr"/>
+              <a:lstStyle/>
+              <a:p>
+                <a:pPr algn="ctr"/>
+                <a:endParaRPr lang="ko-KR" altLang="en-US"/>
+              </a:p>
+            </p:txBody>
+          </p:sp>
+          <p:sp>
+            <p:nvSpPr>
+              <p:cNvPr id="45" name="직사각형 44"/>
+              <p:cNvSpPr/>
+              <p:nvPr/>
+            </p:nvSpPr>
+            <p:spPr>
+              <a:xfrm>
+                <a:off x="12951621" y="4971413"/>
+                <a:ext cx="747712" cy="478631"/>
+              </a:xfrm>
+              <a:prstGeom prst="rect">
+                <a:avLst/>
+              </a:prstGeom>
+              <a:noFill/>
+              <a:ln>
+                <a:solidFill>
+                  <a:srgbClr val="0000FF"/>
+                </a:solidFill>
+              </a:ln>
+            </p:spPr>
+            <p:style>
+              <a:lnRef idx="2">
+                <a:schemeClr val="accent1">
+                  <a:shade val="50000"/>
+                </a:schemeClr>
+              </a:lnRef>
+              <a:fillRef idx="1">
+                <a:schemeClr val="accent1"/>
+              </a:fillRef>
+              <a:effectRef idx="0">
+                <a:schemeClr val="accent1"/>
+              </a:effectRef>
+              <a:fontRef idx="minor">
+                <a:schemeClr val="lt1"/>
+              </a:fontRef>
+            </p:style>
+            <p:txBody>
+              <a:bodyPr rtlCol="0" anchor="ctr"/>
+              <a:lstStyle/>
+              <a:p>
+                <a:pPr algn="ctr"/>
+                <a:endParaRPr lang="ko-KR" altLang="en-US"/>
+              </a:p>
+            </p:txBody>
+          </p:sp>
+          <p:cxnSp>
+            <p:nvCxnSpPr>
+              <p:cNvPr id="47" name="꺾인 연결선 46"/>
+              <p:cNvCxnSpPr>
+                <a:stCxn id="44" idx="1"/>
+                <a:endCxn id="28" idx="3"/>
+              </p:cNvCxnSpPr>
+              <p:nvPr/>
+            </p:nvCxnSpPr>
+            <p:spPr>
+              <a:xfrm rot="10800000" flipV="1">
+                <a:off x="9198132" y="2341960"/>
+                <a:ext cx="3770156" cy="3703774"/>
+              </a:xfrm>
+              <a:prstGeom prst="bentConnector3">
+                <a:avLst>
+                  <a:gd name="adj1" fmla="val 14377"/>
+                </a:avLst>
+              </a:prstGeom>
+              <a:noFill/>
+              <a:ln w="50800">
+                <a:solidFill>
+                  <a:srgbClr val="0000FF"/>
+                </a:solidFill>
+                <a:tailEnd type="triangle"/>
+              </a:ln>
+            </p:spPr>
+            <p:style>
+              <a:lnRef idx="2">
+                <a:schemeClr val="accent1">
+                  <a:shade val="50000"/>
+                </a:schemeClr>
+              </a:lnRef>
+              <a:fillRef idx="1">
+                <a:schemeClr val="accent1"/>
+              </a:fillRef>
+              <a:effectRef idx="0">
+                <a:schemeClr val="accent1"/>
+              </a:effectRef>
+              <a:fontRef idx="minor">
+                <a:schemeClr val="lt1"/>
+              </a:fontRef>
+            </p:style>
+          </p:cxnSp>
+          <p:cxnSp>
+            <p:nvCxnSpPr>
+              <p:cNvPr id="49" name="꺾인 연결선 48"/>
+              <p:cNvCxnSpPr>
+                <a:stCxn id="45" idx="1"/>
+                <a:endCxn id="28" idx="3"/>
+              </p:cNvCxnSpPr>
+              <p:nvPr/>
+            </p:nvCxnSpPr>
+            <p:spPr>
+              <a:xfrm rot="10800000" flipV="1">
+                <a:off x="9198133" y="5210728"/>
+                <a:ext cx="3753489" cy="835005"/>
+              </a:xfrm>
+              <a:prstGeom prst="bentConnector3">
+                <a:avLst>
+                  <a:gd name="adj1" fmla="val 13966"/>
+                </a:avLst>
+              </a:prstGeom>
+              <a:noFill/>
+              <a:ln w="50800">
+                <a:solidFill>
+                  <a:srgbClr val="0000FF"/>
+                </a:solidFill>
+                <a:tailEnd type="triangle"/>
+              </a:ln>
+            </p:spPr>
+            <p:style>
+              <a:lnRef idx="2">
+                <a:schemeClr val="accent1">
+                  <a:shade val="50000"/>
+                </a:schemeClr>
+              </a:lnRef>
+              <a:fillRef idx="1">
+                <a:schemeClr val="accent1"/>
+              </a:fillRef>
+              <a:effectRef idx="0">
+                <a:schemeClr val="accent1"/>
+              </a:effectRef>
+              <a:fontRef idx="minor">
+                <a:schemeClr val="lt1"/>
+              </a:fontRef>
+            </p:style>
+          </p:cxnSp>
+        </p:grpSp>
+      </p:grpSp>
     </p:spTree>
     <p:extLst>
       <p:ext uri="{BB962C8B-B14F-4D97-AF65-F5344CB8AC3E}">

</xml_diff>

<commit_message>
Deploy website - based on e3e8fb61c8856ba3a1872bdcd935fcbe44107338
</commit_message>
<xml_diff>
--- a/assets/1_process_img.pptx
+++ b/assets/1_process_img.pptx
@@ -217,7 +217,7 @@
           <a:p>
             <a:fld id="{CABFA58B-201B-41D2-AA3E-28483B84FD7B}" type="datetimeFigureOut">
               <a:rPr lang="ko-KR" altLang="en-US" smtClean="0"/>
-              <a:t>2022-04-04</a:t>
+              <a:t>2022-04-05</a:t>
             </a:fld>
             <a:endParaRPr lang="ko-KR" altLang="en-US"/>
           </a:p>
@@ -663,7 +663,7 @@
           <a:p>
             <a:fld id="{C33163C4-65CF-48D2-8124-E2CEDBD7A0C5}" type="datetimeFigureOut">
               <a:rPr lang="ko-KR" altLang="en-US" smtClean="0"/>
-              <a:t>2022-04-04</a:t>
+              <a:t>2022-04-05</a:t>
             </a:fld>
             <a:endParaRPr lang="ko-KR" altLang="en-US"/>
           </a:p>
@@ -985,7 +985,7 @@
           <a:p>
             <a:fld id="{C33163C4-65CF-48D2-8124-E2CEDBD7A0C5}" type="datetimeFigureOut">
               <a:rPr lang="ko-KR" altLang="en-US" smtClean="0"/>
-              <a:t>2022-04-04</a:t>
+              <a:t>2022-04-05</a:t>
             </a:fld>
             <a:endParaRPr lang="ko-KR" altLang="en-US"/>
           </a:p>
@@ -1163,7 +1163,7 @@
           <a:p>
             <a:fld id="{C33163C4-65CF-48D2-8124-E2CEDBD7A0C5}" type="datetimeFigureOut">
               <a:rPr lang="ko-KR" altLang="en-US" smtClean="0"/>
-              <a:t>2022-04-04</a:t>
+              <a:t>2022-04-05</a:t>
             </a:fld>
             <a:endParaRPr lang="ko-KR" altLang="en-US"/>
           </a:p>
@@ -1403,7 +1403,7 @@
           <a:p>
             <a:fld id="{29936F60-83FB-4643-B7D2-F169DF4090A4}" type="datetimeFigureOut">
               <a:rPr lang="ko-KR" altLang="en-US" smtClean="0"/>
-              <a:t>2022-04-04</a:t>
+              <a:t>2022-04-05</a:t>
             </a:fld>
             <a:endParaRPr lang="ko-KR" altLang="en-US"/>
           </a:p>
@@ -1571,7 +1571,7 @@
           <a:p>
             <a:fld id="{29936F60-83FB-4643-B7D2-F169DF4090A4}" type="datetimeFigureOut">
               <a:rPr lang="ko-KR" altLang="en-US" smtClean="0"/>
-              <a:t>2022-04-04</a:t>
+              <a:t>2022-04-05</a:t>
             </a:fld>
             <a:endParaRPr lang="ko-KR" altLang="en-US"/>
           </a:p>
@@ -1816,7 +1816,7 @@
           <a:p>
             <a:fld id="{29936F60-83FB-4643-B7D2-F169DF4090A4}" type="datetimeFigureOut">
               <a:rPr lang="ko-KR" altLang="en-US" smtClean="0"/>
-              <a:t>2022-04-04</a:t>
+              <a:t>2022-04-05</a:t>
             </a:fld>
             <a:endParaRPr lang="ko-KR" altLang="en-US"/>
           </a:p>
@@ -2101,7 +2101,7 @@
           <a:p>
             <a:fld id="{29936F60-83FB-4643-B7D2-F169DF4090A4}" type="datetimeFigureOut">
               <a:rPr lang="ko-KR" altLang="en-US" smtClean="0"/>
-              <a:t>2022-04-04</a:t>
+              <a:t>2022-04-05</a:t>
             </a:fld>
             <a:endParaRPr lang="ko-KR" altLang="en-US"/>
           </a:p>
@@ -2520,7 +2520,7 @@
           <a:p>
             <a:fld id="{29936F60-83FB-4643-B7D2-F169DF4090A4}" type="datetimeFigureOut">
               <a:rPr lang="ko-KR" altLang="en-US" smtClean="0"/>
-              <a:t>2022-04-04</a:t>
+              <a:t>2022-04-05</a:t>
             </a:fld>
             <a:endParaRPr lang="ko-KR" altLang="en-US"/>
           </a:p>
@@ -2637,7 +2637,7 @@
           <a:p>
             <a:fld id="{29936F60-83FB-4643-B7D2-F169DF4090A4}" type="datetimeFigureOut">
               <a:rPr lang="ko-KR" altLang="en-US" smtClean="0"/>
-              <a:t>2022-04-04</a:t>
+              <a:t>2022-04-05</a:t>
             </a:fld>
             <a:endParaRPr lang="ko-KR" altLang="en-US"/>
           </a:p>
@@ -2732,7 +2732,7 @@
           <a:p>
             <a:fld id="{29936F60-83FB-4643-B7D2-F169DF4090A4}" type="datetimeFigureOut">
               <a:rPr lang="ko-KR" altLang="en-US" smtClean="0"/>
-              <a:t>2022-04-04</a:t>
+              <a:t>2022-04-05</a:t>
             </a:fld>
             <a:endParaRPr lang="ko-KR" altLang="en-US"/>
           </a:p>
@@ -3007,7 +3007,7 @@
           <a:p>
             <a:fld id="{29936F60-83FB-4643-B7D2-F169DF4090A4}" type="datetimeFigureOut">
               <a:rPr lang="ko-KR" altLang="en-US" smtClean="0"/>
-              <a:t>2022-04-04</a:t>
+              <a:t>2022-04-05</a:t>
             </a:fld>
             <a:endParaRPr lang="ko-KR" altLang="en-US"/>
           </a:p>
@@ -3197,7 +3197,7 @@
           <a:p>
             <a:fld id="{C33163C4-65CF-48D2-8124-E2CEDBD7A0C5}" type="datetimeFigureOut">
               <a:rPr lang="ko-KR" altLang="en-US" smtClean="0"/>
-              <a:t>2022-04-04</a:t>
+              <a:t>2022-04-05</a:t>
             </a:fld>
             <a:endParaRPr lang="ko-KR" altLang="en-US"/>
           </a:p>
@@ -3810,7 +3810,7 @@
           <a:p>
             <a:fld id="{29936F60-83FB-4643-B7D2-F169DF4090A4}" type="datetimeFigureOut">
               <a:rPr lang="ko-KR" altLang="en-US" smtClean="0"/>
-              <a:t>2022-04-04</a:t>
+              <a:t>2022-04-05</a:t>
             </a:fld>
             <a:endParaRPr lang="ko-KR" altLang="en-US"/>
           </a:p>
@@ -3978,7 +3978,7 @@
           <a:p>
             <a:fld id="{29936F60-83FB-4643-B7D2-F169DF4090A4}" type="datetimeFigureOut">
               <a:rPr lang="ko-KR" altLang="en-US" smtClean="0"/>
-              <a:t>2022-04-04</a:t>
+              <a:t>2022-04-05</a:t>
             </a:fld>
             <a:endParaRPr lang="ko-KR" altLang="en-US"/>
           </a:p>
@@ -4156,7 +4156,7 @@
           <a:p>
             <a:fld id="{29936F60-83FB-4643-B7D2-F169DF4090A4}" type="datetimeFigureOut">
               <a:rPr lang="ko-KR" altLang="en-US" smtClean="0"/>
-              <a:t>2022-04-04</a:t>
+              <a:t>2022-04-05</a:t>
             </a:fld>
             <a:endParaRPr lang="ko-KR" altLang="en-US"/>
           </a:p>
@@ -4401,7 +4401,7 @@
           <a:p>
             <a:fld id="{C33163C4-65CF-48D2-8124-E2CEDBD7A0C5}" type="datetimeFigureOut">
               <a:rPr lang="ko-KR" altLang="en-US" smtClean="0"/>
-              <a:t>2022-04-04</a:t>
+              <a:t>2022-04-05</a:t>
             </a:fld>
             <a:endParaRPr lang="ko-KR" altLang="en-US"/>
           </a:p>
@@ -4527,7 +4527,7 @@
           <a:p>
             <a:fld id="{C33163C4-65CF-48D2-8124-E2CEDBD7A0C5}" type="datetimeFigureOut">
               <a:rPr lang="ko-KR" altLang="en-US" smtClean="0"/>
-              <a:t>2022-04-04</a:t>
+              <a:t>2022-04-05</a:t>
             </a:fld>
             <a:endParaRPr lang="ko-KR" altLang="en-US"/>
           </a:p>
@@ -5430,7 +5430,7 @@
           <a:p>
             <a:fld id="{C33163C4-65CF-48D2-8124-E2CEDBD7A0C5}" type="datetimeFigureOut">
               <a:rPr lang="ko-KR" altLang="en-US" smtClean="0"/>
-              <a:t>2022-04-04</a:t>
+              <a:t>2022-04-05</a:t>
             </a:fld>
             <a:endParaRPr lang="ko-KR" altLang="en-US"/>
           </a:p>
@@ -5547,7 +5547,7 @@
           <a:p>
             <a:fld id="{C33163C4-65CF-48D2-8124-E2CEDBD7A0C5}" type="datetimeFigureOut">
               <a:rPr lang="ko-KR" altLang="en-US" smtClean="0"/>
-              <a:t>2022-04-04</a:t>
+              <a:t>2022-04-05</a:t>
             </a:fld>
             <a:endParaRPr lang="ko-KR" altLang="en-US"/>
           </a:p>
@@ -5642,7 +5642,7 @@
           <a:p>
             <a:fld id="{C33163C4-65CF-48D2-8124-E2CEDBD7A0C5}" type="datetimeFigureOut">
               <a:rPr lang="ko-KR" altLang="en-US" smtClean="0"/>
-              <a:t>2022-04-04</a:t>
+              <a:t>2022-04-05</a:t>
             </a:fld>
             <a:endParaRPr lang="ko-KR" altLang="en-US"/>
           </a:p>
@@ -5917,7 +5917,7 @@
           <a:p>
             <a:fld id="{C33163C4-65CF-48D2-8124-E2CEDBD7A0C5}" type="datetimeFigureOut">
               <a:rPr lang="ko-KR" altLang="en-US" smtClean="0"/>
-              <a:t>2022-04-04</a:t>
+              <a:t>2022-04-05</a:t>
             </a:fld>
             <a:endParaRPr lang="ko-KR" altLang="en-US"/>
           </a:p>
@@ -6169,7 +6169,7 @@
           <a:p>
             <a:fld id="{C33163C4-65CF-48D2-8124-E2CEDBD7A0C5}" type="datetimeFigureOut">
               <a:rPr lang="ko-KR" altLang="en-US" smtClean="0"/>
-              <a:t>2022-04-04</a:t>
+              <a:t>2022-04-05</a:t>
             </a:fld>
             <a:endParaRPr lang="ko-KR" altLang="en-US"/>
           </a:p>
@@ -6404,7 +6404,7 @@
           <a:p>
             <a:fld id="{C33163C4-65CF-48D2-8124-E2CEDBD7A0C5}" type="datetimeFigureOut">
               <a:rPr lang="ko-KR" altLang="en-US" smtClean="0"/>
-              <a:t>2022-04-04</a:t>
+              <a:t>2022-04-05</a:t>
             </a:fld>
             <a:endParaRPr lang="ko-KR" altLang="en-US"/>
           </a:p>
@@ -6914,7 +6914,7 @@
           <a:p>
             <a:fld id="{29936F60-83FB-4643-B7D2-F169DF4090A4}" type="datetimeFigureOut">
               <a:rPr lang="ko-KR" altLang="en-US" smtClean="0"/>
-              <a:t>2022-04-04</a:t>
+              <a:t>2022-04-05</a:t>
             </a:fld>
             <a:endParaRPr lang="ko-KR" altLang="en-US"/>
           </a:p>
@@ -7333,85 +7333,6 @@
       </p:sp>
       <p:grpSp>
         <p:nvGrpSpPr>
-          <p:cNvPr id="10" name="그룹 9"/>
-          <p:cNvGrpSpPr/>
-          <p:nvPr/>
-        </p:nvGrpSpPr>
-        <p:grpSpPr>
-          <a:xfrm>
-            <a:off x="3419364" y="7634806"/>
-            <a:ext cx="12612881" cy="5114987"/>
-            <a:chOff x="3419364" y="7634806"/>
-            <a:chExt cx="12612881" cy="5114987"/>
-          </a:xfrm>
-        </p:grpSpPr>
-        <p:pic>
-          <p:nvPicPr>
-            <p:cNvPr id="8" name="그림 7"/>
-            <p:cNvPicPr>
-              <a:picLocks noChangeAspect="1"/>
-            </p:cNvPicPr>
-            <p:nvPr/>
-          </p:nvPicPr>
-          <p:blipFill>
-            <a:blip r:embed="rId2"/>
-            <a:stretch>
-              <a:fillRect/>
-            </a:stretch>
-          </p:blipFill>
-          <p:spPr>
-            <a:xfrm>
-              <a:off x="3419364" y="7634807"/>
-              <a:ext cx="7005547" cy="5114986"/>
-            </a:xfrm>
-            <a:prstGeom prst="rect">
-              <a:avLst/>
-            </a:prstGeom>
-            <a:ln>
-              <a:solidFill>
-                <a:schemeClr val="tx1"/>
-              </a:solidFill>
-            </a:ln>
-          </p:spPr>
-        </p:pic>
-        <p:pic>
-          <p:nvPicPr>
-            <p:cNvPr id="9" name="그림 8"/>
-            <p:cNvPicPr>
-              <a:picLocks noChangeAspect="1"/>
-            </p:cNvPicPr>
-            <p:nvPr/>
-          </p:nvPicPr>
-          <p:blipFill>
-            <a:blip r:embed="rId3">
-              <a:extLst>
-                <a:ext uri="{28A0092B-C50C-407E-A947-70E740481C1C}">
-                  <a14:useLocalDpi xmlns:a14="http://schemas.microsoft.com/office/drawing/2010/main" val="0"/>
-                </a:ext>
-              </a:extLst>
-            </a:blip>
-            <a:stretch>
-              <a:fillRect/>
-            </a:stretch>
-          </p:blipFill>
-          <p:spPr>
-            <a:xfrm>
-              <a:off x="6887452" y="7634806"/>
-              <a:ext cx="9144793" cy="5114987"/>
-            </a:xfrm>
-            <a:prstGeom prst="rect">
-              <a:avLst/>
-            </a:prstGeom>
-            <a:ln>
-              <a:solidFill>
-                <a:schemeClr val="tx1"/>
-              </a:solidFill>
-            </a:ln>
-          </p:spPr>
-        </p:pic>
-      </p:grpSp>
-      <p:grpSp>
-        <p:nvGrpSpPr>
           <p:cNvPr id="55" name="그룹 54"/>
           <p:cNvGrpSpPr/>
           <p:nvPr/>
@@ -7493,7 +7414,7 @@
               <p:nvPr/>
             </p:nvPicPr>
             <p:blipFill>
-              <a:blip r:embed="rId4">
+              <a:blip r:embed="rId2">
                 <a:extLst>
                   <a:ext uri="{28A0092B-C50C-407E-A947-70E740481C1C}">
                     <a14:useLocalDpi xmlns:a14="http://schemas.microsoft.com/office/drawing/2010/main" val="0"/>
@@ -7694,11 +7615,7 @@
                 </a:r>
                 <a:r>
                   <a:rPr kumimoji="1" lang="ko-KR" altLang="en-US" sz="800" b="1"/>
-                  <a:t>대한 </a:t>
-                </a:r>
-                <a:r>
-                  <a:rPr kumimoji="1" lang="ko-KR" altLang="en-US" sz="800" b="1"/>
-                  <a:t>상태를 </a:t>
+                  <a:t>대한 상태를 </a:t>
                 </a:r>
                 <a:r>
                   <a:rPr kumimoji="1" lang="ko-KR" altLang="en-US" sz="800" b="1" smtClean="0"/>
@@ -7714,11 +7631,7 @@
                 </a:r>
                 <a:r>
                   <a:rPr kumimoji="1" lang="ko-KR" altLang="en-US" sz="800" b="1"/>
-                  <a:t>동작을 </a:t>
-                </a:r>
-                <a:r>
-                  <a:rPr kumimoji="1" lang="ko-KR" altLang="en-US" sz="800" b="1"/>
-                  <a:t>포괄적으로 </a:t>
+                  <a:t>동작을 포괄적으로 </a:t>
                 </a:r>
                 <a:r>
                   <a:rPr kumimoji="1" lang="ko-KR" altLang="en-US" sz="800" b="1" smtClean="0"/>
@@ -7753,7 +7666,7 @@
                 <p:nvPr/>
               </p:nvPicPr>
               <p:blipFill>
-                <a:blip r:embed="rId5">
+                <a:blip r:embed="rId3">
                   <a:extLst>
                     <a:ext uri="{28A0092B-C50C-407E-A947-70E740481C1C}">
                       <a14:useLocalDpi xmlns:a14="http://schemas.microsoft.com/office/drawing/2010/main" val="0"/>
@@ -7807,7 +7720,7 @@
                 <p:nvPr/>
               </p:nvPicPr>
               <p:blipFill>
-                <a:blip r:embed="rId6">
+                <a:blip r:embed="rId4">
                   <a:extLst>
                     <a:ext uri="{28A0092B-C50C-407E-A947-70E740481C1C}">
                       <a14:useLocalDpi xmlns:a14="http://schemas.microsoft.com/office/drawing/2010/main" val="0"/>
@@ -8760,6 +8673,177 @@
             </p:style>
           </p:cxnSp>
         </p:grpSp>
+      </p:grpSp>
+      <p:grpSp>
+        <p:nvGrpSpPr>
+          <p:cNvPr id="6" name="그룹 5"/>
+          <p:cNvGrpSpPr/>
+          <p:nvPr/>
+        </p:nvGrpSpPr>
+        <p:grpSpPr>
+          <a:xfrm>
+            <a:off x="1295128" y="7496464"/>
+            <a:ext cx="12993720" cy="5114987"/>
+            <a:chOff x="1295128" y="7496464"/>
+            <a:chExt cx="12993720" cy="5114987"/>
+          </a:xfrm>
+        </p:grpSpPr>
+        <p:sp>
+          <p:nvSpPr>
+            <p:cNvPr id="5" name="직사각형 4"/>
+            <p:cNvSpPr/>
+            <p:nvPr/>
+          </p:nvSpPr>
+          <p:spPr>
+            <a:xfrm>
+              <a:off x="1295128" y="7496464"/>
+              <a:ext cx="12993720" cy="5114986"/>
+            </a:xfrm>
+            <a:prstGeom prst="rect">
+              <a:avLst/>
+            </a:prstGeom>
+            <a:solidFill>
+              <a:schemeClr val="bg1"/>
+            </a:solidFill>
+            <a:ln>
+              <a:noFill/>
+            </a:ln>
+          </p:spPr>
+          <p:style>
+            <a:lnRef idx="2">
+              <a:schemeClr val="accent1">
+                <a:shade val="50000"/>
+              </a:schemeClr>
+            </a:lnRef>
+            <a:fillRef idx="1">
+              <a:schemeClr val="accent1"/>
+            </a:fillRef>
+            <a:effectRef idx="0">
+              <a:schemeClr val="accent1"/>
+            </a:effectRef>
+            <a:fontRef idx="minor">
+              <a:schemeClr val="lt1"/>
+            </a:fontRef>
+          </p:style>
+          <p:txBody>
+            <a:bodyPr rtlCol="0" anchor="ctr"/>
+            <a:lstStyle/>
+            <a:p>
+              <a:pPr algn="ctr"/>
+              <a:endParaRPr lang="ko-KR" altLang="en-US"/>
+            </a:p>
+          </p:txBody>
+        </p:sp>
+        <p:pic>
+          <p:nvPicPr>
+            <p:cNvPr id="8" name="그림 7"/>
+            <p:cNvPicPr>
+              <a:picLocks noChangeAspect="1"/>
+            </p:cNvPicPr>
+            <p:nvPr/>
+          </p:nvPicPr>
+          <p:blipFill rotWithShape="1">
+            <a:blip r:embed="rId5"/>
+            <a:srcRect r="53746"/>
+            <a:stretch/>
+          </p:blipFill>
+          <p:spPr>
+            <a:xfrm>
+              <a:off x="11048488" y="7496464"/>
+              <a:ext cx="3240360" cy="5114986"/>
+            </a:xfrm>
+            <a:prstGeom prst="rect">
+              <a:avLst/>
+            </a:prstGeom>
+            <a:ln>
+              <a:solidFill>
+                <a:schemeClr val="tx1"/>
+              </a:solidFill>
+            </a:ln>
+          </p:spPr>
+        </p:pic>
+        <p:pic>
+          <p:nvPicPr>
+            <p:cNvPr id="9" name="그림 8"/>
+            <p:cNvPicPr>
+              <a:picLocks noChangeAspect="1"/>
+            </p:cNvPicPr>
+            <p:nvPr/>
+          </p:nvPicPr>
+          <p:blipFill>
+            <a:blip r:embed="rId6">
+              <a:extLst>
+                <a:ext uri="{28A0092B-C50C-407E-A947-70E740481C1C}">
+                  <a14:useLocalDpi xmlns:a14="http://schemas.microsoft.com/office/drawing/2010/main" val="0"/>
+                </a:ext>
+              </a:extLst>
+            </a:blip>
+            <a:stretch>
+              <a:fillRect/>
+            </a:stretch>
+          </p:blipFill>
+          <p:spPr>
+            <a:xfrm>
+              <a:off x="1295128" y="7496464"/>
+              <a:ext cx="9144793" cy="5114987"/>
+            </a:xfrm>
+            <a:prstGeom prst="rect">
+              <a:avLst/>
+            </a:prstGeom>
+            <a:ln>
+              <a:solidFill>
+                <a:schemeClr val="tx1"/>
+              </a:solidFill>
+            </a:ln>
+          </p:spPr>
+        </p:pic>
+        <p:sp>
+          <p:nvSpPr>
+            <p:cNvPr id="2" name="오른쪽 화살표 1"/>
+            <p:cNvSpPr/>
+            <p:nvPr/>
+          </p:nvSpPr>
+          <p:spPr>
+            <a:xfrm>
+              <a:off x="10531379" y="8722187"/>
+              <a:ext cx="451549" cy="2663541"/>
+            </a:xfrm>
+            <a:prstGeom prst="rightArrow">
+              <a:avLst/>
+            </a:prstGeom>
+            <a:solidFill>
+              <a:schemeClr val="accent1">
+                <a:lumMod val="20000"/>
+                <a:lumOff val="80000"/>
+              </a:schemeClr>
+            </a:solidFill>
+            <a:ln w="12700"/>
+          </p:spPr>
+          <p:style>
+            <a:lnRef idx="2">
+              <a:schemeClr val="accent1">
+                <a:shade val="50000"/>
+              </a:schemeClr>
+            </a:lnRef>
+            <a:fillRef idx="1">
+              <a:schemeClr val="accent1"/>
+            </a:fillRef>
+            <a:effectRef idx="0">
+              <a:schemeClr val="accent1"/>
+            </a:effectRef>
+            <a:fontRef idx="minor">
+              <a:schemeClr val="lt1"/>
+            </a:fontRef>
+          </p:style>
+          <p:txBody>
+            <a:bodyPr rtlCol="0" anchor="ctr"/>
+            <a:lstStyle/>
+            <a:p>
+              <a:pPr algn="ctr"/>
+              <a:endParaRPr lang="ko-KR" altLang="en-US"/>
+            </a:p>
+          </p:txBody>
+        </p:sp>
       </p:grpSp>
     </p:spTree>
     <p:extLst>

</xml_diff>

<commit_message>
Deploy website - based on ec456d44fb87c5050efab215f0714f9c4a1f8d9d
</commit_message>
<xml_diff>
--- a/assets/1_process_img.pptx
+++ b/assets/1_process_img.pptx
@@ -116,16 +116,6 @@
             <a:srgbClr val="A4A3A4"/>
           </p15:clr>
         </p15:guide>
-        <p15:guide id="4" orient="horz" pos="7665" userDrawn="1">
-          <p15:clr>
-            <a:srgbClr val="A4A3A4"/>
-          </p15:clr>
-        </p15:guide>
-        <p15:guide id="5" pos="11135" userDrawn="1">
-          <p15:clr>
-            <a:srgbClr val="A4A3A4"/>
-          </p15:clr>
-        </p15:guide>
       </p15:sldGuideLst>
     </p:ext>
     <p:ext uri="{2D200454-40CA-4A62-9FC3-DE9A4176ACB9}">
@@ -217,7 +207,7 @@
           <a:p>
             <a:fld id="{CABFA58B-201B-41D2-AA3E-28483B84FD7B}" type="datetimeFigureOut">
               <a:rPr lang="ko-KR" altLang="en-US" smtClean="0"/>
-              <a:t>2022-04-05</a:t>
+              <a:t>2022-04-25</a:t>
             </a:fld>
             <a:endParaRPr lang="ko-KR" altLang="en-US"/>
           </a:p>
@@ -663,7 +653,7 @@
           <a:p>
             <a:fld id="{C33163C4-65CF-48D2-8124-E2CEDBD7A0C5}" type="datetimeFigureOut">
               <a:rPr lang="ko-KR" altLang="en-US" smtClean="0"/>
-              <a:t>2022-04-05</a:t>
+              <a:t>2022-04-25</a:t>
             </a:fld>
             <a:endParaRPr lang="ko-KR" altLang="en-US"/>
           </a:p>
@@ -985,7 +975,7 @@
           <a:p>
             <a:fld id="{C33163C4-65CF-48D2-8124-E2CEDBD7A0C5}" type="datetimeFigureOut">
               <a:rPr lang="ko-KR" altLang="en-US" smtClean="0"/>
-              <a:t>2022-04-05</a:t>
+              <a:t>2022-04-25</a:t>
             </a:fld>
             <a:endParaRPr lang="ko-KR" altLang="en-US"/>
           </a:p>
@@ -1163,7 +1153,7 @@
           <a:p>
             <a:fld id="{C33163C4-65CF-48D2-8124-E2CEDBD7A0C5}" type="datetimeFigureOut">
               <a:rPr lang="ko-KR" altLang="en-US" smtClean="0"/>
-              <a:t>2022-04-05</a:t>
+              <a:t>2022-04-25</a:t>
             </a:fld>
             <a:endParaRPr lang="ko-KR" altLang="en-US"/>
           </a:p>
@@ -1403,7 +1393,7 @@
           <a:p>
             <a:fld id="{29936F60-83FB-4643-B7D2-F169DF4090A4}" type="datetimeFigureOut">
               <a:rPr lang="ko-KR" altLang="en-US" smtClean="0"/>
-              <a:t>2022-04-05</a:t>
+              <a:t>2022-04-25</a:t>
             </a:fld>
             <a:endParaRPr lang="ko-KR" altLang="en-US"/>
           </a:p>
@@ -1571,7 +1561,7 @@
           <a:p>
             <a:fld id="{29936F60-83FB-4643-B7D2-F169DF4090A4}" type="datetimeFigureOut">
               <a:rPr lang="ko-KR" altLang="en-US" smtClean="0"/>
-              <a:t>2022-04-05</a:t>
+              <a:t>2022-04-25</a:t>
             </a:fld>
             <a:endParaRPr lang="ko-KR" altLang="en-US"/>
           </a:p>
@@ -1816,7 +1806,7 @@
           <a:p>
             <a:fld id="{29936F60-83FB-4643-B7D2-F169DF4090A4}" type="datetimeFigureOut">
               <a:rPr lang="ko-KR" altLang="en-US" smtClean="0"/>
-              <a:t>2022-04-05</a:t>
+              <a:t>2022-04-25</a:t>
             </a:fld>
             <a:endParaRPr lang="ko-KR" altLang="en-US"/>
           </a:p>
@@ -2101,7 +2091,7 @@
           <a:p>
             <a:fld id="{29936F60-83FB-4643-B7D2-F169DF4090A4}" type="datetimeFigureOut">
               <a:rPr lang="ko-KR" altLang="en-US" smtClean="0"/>
-              <a:t>2022-04-05</a:t>
+              <a:t>2022-04-25</a:t>
             </a:fld>
             <a:endParaRPr lang="ko-KR" altLang="en-US"/>
           </a:p>
@@ -2520,7 +2510,7 @@
           <a:p>
             <a:fld id="{29936F60-83FB-4643-B7D2-F169DF4090A4}" type="datetimeFigureOut">
               <a:rPr lang="ko-KR" altLang="en-US" smtClean="0"/>
-              <a:t>2022-04-05</a:t>
+              <a:t>2022-04-25</a:t>
             </a:fld>
             <a:endParaRPr lang="ko-KR" altLang="en-US"/>
           </a:p>
@@ -2637,7 +2627,7 @@
           <a:p>
             <a:fld id="{29936F60-83FB-4643-B7D2-F169DF4090A4}" type="datetimeFigureOut">
               <a:rPr lang="ko-KR" altLang="en-US" smtClean="0"/>
-              <a:t>2022-04-05</a:t>
+              <a:t>2022-04-25</a:t>
             </a:fld>
             <a:endParaRPr lang="ko-KR" altLang="en-US"/>
           </a:p>
@@ -2732,7 +2722,7 @@
           <a:p>
             <a:fld id="{29936F60-83FB-4643-B7D2-F169DF4090A4}" type="datetimeFigureOut">
               <a:rPr lang="ko-KR" altLang="en-US" smtClean="0"/>
-              <a:t>2022-04-05</a:t>
+              <a:t>2022-04-25</a:t>
             </a:fld>
             <a:endParaRPr lang="ko-KR" altLang="en-US"/>
           </a:p>
@@ -3007,7 +2997,7 @@
           <a:p>
             <a:fld id="{29936F60-83FB-4643-B7D2-F169DF4090A4}" type="datetimeFigureOut">
               <a:rPr lang="ko-KR" altLang="en-US" smtClean="0"/>
-              <a:t>2022-04-05</a:t>
+              <a:t>2022-04-25</a:t>
             </a:fld>
             <a:endParaRPr lang="ko-KR" altLang="en-US"/>
           </a:p>
@@ -3197,7 +3187,7 @@
           <a:p>
             <a:fld id="{C33163C4-65CF-48D2-8124-E2CEDBD7A0C5}" type="datetimeFigureOut">
               <a:rPr lang="ko-KR" altLang="en-US" smtClean="0"/>
-              <a:t>2022-04-05</a:t>
+              <a:t>2022-04-25</a:t>
             </a:fld>
             <a:endParaRPr lang="ko-KR" altLang="en-US"/>
           </a:p>
@@ -3810,7 +3800,7 @@
           <a:p>
             <a:fld id="{29936F60-83FB-4643-B7D2-F169DF4090A4}" type="datetimeFigureOut">
               <a:rPr lang="ko-KR" altLang="en-US" smtClean="0"/>
-              <a:t>2022-04-05</a:t>
+              <a:t>2022-04-25</a:t>
             </a:fld>
             <a:endParaRPr lang="ko-KR" altLang="en-US"/>
           </a:p>
@@ -3978,7 +3968,7 @@
           <a:p>
             <a:fld id="{29936F60-83FB-4643-B7D2-F169DF4090A4}" type="datetimeFigureOut">
               <a:rPr lang="ko-KR" altLang="en-US" smtClean="0"/>
-              <a:t>2022-04-05</a:t>
+              <a:t>2022-04-25</a:t>
             </a:fld>
             <a:endParaRPr lang="ko-KR" altLang="en-US"/>
           </a:p>
@@ -4156,7 +4146,7 @@
           <a:p>
             <a:fld id="{29936F60-83FB-4643-B7D2-F169DF4090A4}" type="datetimeFigureOut">
               <a:rPr lang="ko-KR" altLang="en-US" smtClean="0"/>
-              <a:t>2022-04-05</a:t>
+              <a:t>2022-04-25</a:t>
             </a:fld>
             <a:endParaRPr lang="ko-KR" altLang="en-US"/>
           </a:p>
@@ -4401,7 +4391,7 @@
           <a:p>
             <a:fld id="{C33163C4-65CF-48D2-8124-E2CEDBD7A0C5}" type="datetimeFigureOut">
               <a:rPr lang="ko-KR" altLang="en-US" smtClean="0"/>
-              <a:t>2022-04-05</a:t>
+              <a:t>2022-04-25</a:t>
             </a:fld>
             <a:endParaRPr lang="ko-KR" altLang="en-US"/>
           </a:p>
@@ -4527,7 +4517,7 @@
           <a:p>
             <a:fld id="{C33163C4-65CF-48D2-8124-E2CEDBD7A0C5}" type="datetimeFigureOut">
               <a:rPr lang="ko-KR" altLang="en-US" smtClean="0"/>
-              <a:t>2022-04-05</a:t>
+              <a:t>2022-04-25</a:t>
             </a:fld>
             <a:endParaRPr lang="ko-KR" altLang="en-US"/>
           </a:p>
@@ -5430,7 +5420,7 @@
           <a:p>
             <a:fld id="{C33163C4-65CF-48D2-8124-E2CEDBD7A0C5}" type="datetimeFigureOut">
               <a:rPr lang="ko-KR" altLang="en-US" smtClean="0"/>
-              <a:t>2022-04-05</a:t>
+              <a:t>2022-04-25</a:t>
             </a:fld>
             <a:endParaRPr lang="ko-KR" altLang="en-US"/>
           </a:p>
@@ -5547,7 +5537,7 @@
           <a:p>
             <a:fld id="{C33163C4-65CF-48D2-8124-E2CEDBD7A0C5}" type="datetimeFigureOut">
               <a:rPr lang="ko-KR" altLang="en-US" smtClean="0"/>
-              <a:t>2022-04-05</a:t>
+              <a:t>2022-04-25</a:t>
             </a:fld>
             <a:endParaRPr lang="ko-KR" altLang="en-US"/>
           </a:p>
@@ -5642,7 +5632,7 @@
           <a:p>
             <a:fld id="{C33163C4-65CF-48D2-8124-E2CEDBD7A0C5}" type="datetimeFigureOut">
               <a:rPr lang="ko-KR" altLang="en-US" smtClean="0"/>
-              <a:t>2022-04-05</a:t>
+              <a:t>2022-04-25</a:t>
             </a:fld>
             <a:endParaRPr lang="ko-KR" altLang="en-US"/>
           </a:p>
@@ -5917,7 +5907,7 @@
           <a:p>
             <a:fld id="{C33163C4-65CF-48D2-8124-E2CEDBD7A0C5}" type="datetimeFigureOut">
               <a:rPr lang="ko-KR" altLang="en-US" smtClean="0"/>
-              <a:t>2022-04-05</a:t>
+              <a:t>2022-04-25</a:t>
             </a:fld>
             <a:endParaRPr lang="ko-KR" altLang="en-US"/>
           </a:p>
@@ -6169,7 +6159,7 @@
           <a:p>
             <a:fld id="{C33163C4-65CF-48D2-8124-E2CEDBD7A0C5}" type="datetimeFigureOut">
               <a:rPr lang="ko-KR" altLang="en-US" smtClean="0"/>
-              <a:t>2022-04-05</a:t>
+              <a:t>2022-04-25</a:t>
             </a:fld>
             <a:endParaRPr lang="ko-KR" altLang="en-US"/>
           </a:p>
@@ -6404,7 +6394,7 @@
           <a:p>
             <a:fld id="{C33163C4-65CF-48D2-8124-E2CEDBD7A0C5}" type="datetimeFigureOut">
               <a:rPr lang="ko-KR" altLang="en-US" smtClean="0"/>
-              <a:t>2022-04-05</a:t>
+              <a:t>2022-04-25</a:t>
             </a:fld>
             <a:endParaRPr lang="ko-KR" altLang="en-US"/>
           </a:p>
@@ -6914,7 +6904,7 @@
           <a:p>
             <a:fld id="{29936F60-83FB-4643-B7D2-F169DF4090A4}" type="datetimeFigureOut">
               <a:rPr lang="ko-KR" altLang="en-US" smtClean="0"/>
-              <a:t>2022-04-05</a:t>
+              <a:t>2022-04-25</a:t>
             </a:fld>
             <a:endParaRPr lang="ko-KR" altLang="en-US"/>
           </a:p>
@@ -8845,6 +8835,34 @@
           </p:txBody>
         </p:sp>
       </p:grpSp>
+      <p:pic>
+        <p:nvPicPr>
+          <p:cNvPr id="29" name="그림 28"/>
+          <p:cNvPicPr>
+            <a:picLocks noChangeAspect="1"/>
+          </p:cNvPicPr>
+          <p:nvPr/>
+        </p:nvPicPr>
+        <p:blipFill rotWithShape="1">
+          <a:blip r:embed="rId5"/>
+          <a:srcRect r="53746"/>
+          <a:stretch/>
+        </p:blipFill>
+        <p:spPr>
+          <a:xfrm>
+            <a:off x="14593131" y="7513144"/>
+            <a:ext cx="2543757" cy="4015381"/>
+          </a:xfrm>
+          <a:prstGeom prst="rect">
+            <a:avLst/>
+          </a:prstGeom>
+          <a:ln>
+            <a:solidFill>
+              <a:schemeClr val="tx1"/>
+            </a:solidFill>
+          </a:ln>
+        </p:spPr>
+      </p:pic>
     </p:spTree>
     <p:extLst>
       <p:ext uri="{BB962C8B-B14F-4D97-AF65-F5344CB8AC3E}">

</xml_diff>

<commit_message>
Deploy website - based on f46114ae45377261c8bd9e01fd96a2cec8f23d84
</commit_message>
<xml_diff>
--- a/assets/1_process_img.pptx
+++ b/assets/1_process_img.pptx
@@ -6,10 +6,11 @@
     <p:sldMasterId id="2147483660" r:id="rId2"/>
   </p:sldMasterIdLst>
   <p:notesMasterIdLst>
-    <p:notesMasterId r:id="rId4"/>
+    <p:notesMasterId r:id="rId5"/>
   </p:notesMasterIdLst>
   <p:sldIdLst>
     <p:sldId id="358" r:id="rId3"/>
+    <p:sldId id="359" r:id="rId4"/>
   </p:sldIdLst>
   <p:sldSz cx="18288000" cy="14039850"/>
   <p:notesSz cx="6858000" cy="9144000"/>
@@ -116,6 +117,11 @@
             <a:srgbClr val="A4A3A4"/>
           </p15:clr>
         </p15:guide>
+        <p15:guide id="4" orient="horz" pos="4422">
+          <p15:clr>
+            <a:srgbClr val="A4A3A4"/>
+          </p15:clr>
+        </p15:guide>
       </p15:sldGuideLst>
     </p:ext>
     <p:ext uri="{2D200454-40CA-4A62-9FC3-DE9A4176ACB9}">
@@ -207,7 +213,7 @@
           <a:p>
             <a:fld id="{CABFA58B-201B-41D2-AA3E-28483B84FD7B}" type="datetimeFigureOut">
               <a:rPr lang="ko-KR" altLang="en-US" smtClean="0"/>
-              <a:t>2022-04-25</a:t>
+              <a:t>2022-11-27</a:t>
             </a:fld>
             <a:endParaRPr lang="ko-KR" altLang="en-US"/>
           </a:p>
@@ -653,7 +659,7 @@
           <a:p>
             <a:fld id="{C33163C4-65CF-48D2-8124-E2CEDBD7A0C5}" type="datetimeFigureOut">
               <a:rPr lang="ko-KR" altLang="en-US" smtClean="0"/>
-              <a:t>2022-04-25</a:t>
+              <a:t>2022-11-27</a:t>
             </a:fld>
             <a:endParaRPr lang="ko-KR" altLang="en-US"/>
           </a:p>
@@ -975,7 +981,7 @@
           <a:p>
             <a:fld id="{C33163C4-65CF-48D2-8124-E2CEDBD7A0C5}" type="datetimeFigureOut">
               <a:rPr lang="ko-KR" altLang="en-US" smtClean="0"/>
-              <a:t>2022-04-25</a:t>
+              <a:t>2022-11-27</a:t>
             </a:fld>
             <a:endParaRPr lang="ko-KR" altLang="en-US"/>
           </a:p>
@@ -1153,7 +1159,7 @@
           <a:p>
             <a:fld id="{C33163C4-65CF-48D2-8124-E2CEDBD7A0C5}" type="datetimeFigureOut">
               <a:rPr lang="ko-KR" altLang="en-US" smtClean="0"/>
-              <a:t>2022-04-25</a:t>
+              <a:t>2022-11-27</a:t>
             </a:fld>
             <a:endParaRPr lang="ko-KR" altLang="en-US"/>
           </a:p>
@@ -1393,7 +1399,7 @@
           <a:p>
             <a:fld id="{29936F60-83FB-4643-B7D2-F169DF4090A4}" type="datetimeFigureOut">
               <a:rPr lang="ko-KR" altLang="en-US" smtClean="0"/>
-              <a:t>2022-04-25</a:t>
+              <a:t>2022-11-27</a:t>
             </a:fld>
             <a:endParaRPr lang="ko-KR" altLang="en-US"/>
           </a:p>
@@ -1561,7 +1567,7 @@
           <a:p>
             <a:fld id="{29936F60-83FB-4643-B7D2-F169DF4090A4}" type="datetimeFigureOut">
               <a:rPr lang="ko-KR" altLang="en-US" smtClean="0"/>
-              <a:t>2022-04-25</a:t>
+              <a:t>2022-11-27</a:t>
             </a:fld>
             <a:endParaRPr lang="ko-KR" altLang="en-US"/>
           </a:p>
@@ -1806,7 +1812,7 @@
           <a:p>
             <a:fld id="{29936F60-83FB-4643-B7D2-F169DF4090A4}" type="datetimeFigureOut">
               <a:rPr lang="ko-KR" altLang="en-US" smtClean="0"/>
-              <a:t>2022-04-25</a:t>
+              <a:t>2022-11-27</a:t>
             </a:fld>
             <a:endParaRPr lang="ko-KR" altLang="en-US"/>
           </a:p>
@@ -2091,7 +2097,7 @@
           <a:p>
             <a:fld id="{29936F60-83FB-4643-B7D2-F169DF4090A4}" type="datetimeFigureOut">
               <a:rPr lang="ko-KR" altLang="en-US" smtClean="0"/>
-              <a:t>2022-04-25</a:t>
+              <a:t>2022-11-27</a:t>
             </a:fld>
             <a:endParaRPr lang="ko-KR" altLang="en-US"/>
           </a:p>
@@ -2510,7 +2516,7 @@
           <a:p>
             <a:fld id="{29936F60-83FB-4643-B7D2-F169DF4090A4}" type="datetimeFigureOut">
               <a:rPr lang="ko-KR" altLang="en-US" smtClean="0"/>
-              <a:t>2022-04-25</a:t>
+              <a:t>2022-11-27</a:t>
             </a:fld>
             <a:endParaRPr lang="ko-KR" altLang="en-US"/>
           </a:p>
@@ -2627,7 +2633,7 @@
           <a:p>
             <a:fld id="{29936F60-83FB-4643-B7D2-F169DF4090A4}" type="datetimeFigureOut">
               <a:rPr lang="ko-KR" altLang="en-US" smtClean="0"/>
-              <a:t>2022-04-25</a:t>
+              <a:t>2022-11-27</a:t>
             </a:fld>
             <a:endParaRPr lang="ko-KR" altLang="en-US"/>
           </a:p>
@@ -2722,7 +2728,7 @@
           <a:p>
             <a:fld id="{29936F60-83FB-4643-B7D2-F169DF4090A4}" type="datetimeFigureOut">
               <a:rPr lang="ko-KR" altLang="en-US" smtClean="0"/>
-              <a:t>2022-04-25</a:t>
+              <a:t>2022-11-27</a:t>
             </a:fld>
             <a:endParaRPr lang="ko-KR" altLang="en-US"/>
           </a:p>
@@ -2997,7 +3003,7 @@
           <a:p>
             <a:fld id="{29936F60-83FB-4643-B7D2-F169DF4090A4}" type="datetimeFigureOut">
               <a:rPr lang="ko-KR" altLang="en-US" smtClean="0"/>
-              <a:t>2022-04-25</a:t>
+              <a:t>2022-11-27</a:t>
             </a:fld>
             <a:endParaRPr lang="ko-KR" altLang="en-US"/>
           </a:p>
@@ -3187,7 +3193,7 @@
           <a:p>
             <a:fld id="{C33163C4-65CF-48D2-8124-E2CEDBD7A0C5}" type="datetimeFigureOut">
               <a:rPr lang="ko-KR" altLang="en-US" smtClean="0"/>
-              <a:t>2022-04-25</a:t>
+              <a:t>2022-11-27</a:t>
             </a:fld>
             <a:endParaRPr lang="ko-KR" altLang="en-US"/>
           </a:p>
@@ -3800,7 +3806,7 @@
           <a:p>
             <a:fld id="{29936F60-83FB-4643-B7D2-F169DF4090A4}" type="datetimeFigureOut">
               <a:rPr lang="ko-KR" altLang="en-US" smtClean="0"/>
-              <a:t>2022-04-25</a:t>
+              <a:t>2022-11-27</a:t>
             </a:fld>
             <a:endParaRPr lang="ko-KR" altLang="en-US"/>
           </a:p>
@@ -3968,7 +3974,7 @@
           <a:p>
             <a:fld id="{29936F60-83FB-4643-B7D2-F169DF4090A4}" type="datetimeFigureOut">
               <a:rPr lang="ko-KR" altLang="en-US" smtClean="0"/>
-              <a:t>2022-04-25</a:t>
+              <a:t>2022-11-27</a:t>
             </a:fld>
             <a:endParaRPr lang="ko-KR" altLang="en-US"/>
           </a:p>
@@ -4146,7 +4152,7 @@
           <a:p>
             <a:fld id="{29936F60-83FB-4643-B7D2-F169DF4090A4}" type="datetimeFigureOut">
               <a:rPr lang="ko-KR" altLang="en-US" smtClean="0"/>
-              <a:t>2022-04-25</a:t>
+              <a:t>2022-11-27</a:t>
             </a:fld>
             <a:endParaRPr lang="ko-KR" altLang="en-US"/>
           </a:p>
@@ -4391,7 +4397,7 @@
           <a:p>
             <a:fld id="{C33163C4-65CF-48D2-8124-E2CEDBD7A0C5}" type="datetimeFigureOut">
               <a:rPr lang="ko-KR" altLang="en-US" smtClean="0"/>
-              <a:t>2022-04-25</a:t>
+              <a:t>2022-11-27</a:t>
             </a:fld>
             <a:endParaRPr lang="ko-KR" altLang="en-US"/>
           </a:p>
@@ -4517,7 +4523,7 @@
           <a:p>
             <a:fld id="{C33163C4-65CF-48D2-8124-E2CEDBD7A0C5}" type="datetimeFigureOut">
               <a:rPr lang="ko-KR" altLang="en-US" smtClean="0"/>
-              <a:t>2022-04-25</a:t>
+              <a:t>2022-11-27</a:t>
             </a:fld>
             <a:endParaRPr lang="ko-KR" altLang="en-US"/>
           </a:p>
@@ -5420,7 +5426,7 @@
           <a:p>
             <a:fld id="{C33163C4-65CF-48D2-8124-E2CEDBD7A0C5}" type="datetimeFigureOut">
               <a:rPr lang="ko-KR" altLang="en-US" smtClean="0"/>
-              <a:t>2022-04-25</a:t>
+              <a:t>2022-11-27</a:t>
             </a:fld>
             <a:endParaRPr lang="ko-KR" altLang="en-US"/>
           </a:p>
@@ -5537,7 +5543,7 @@
           <a:p>
             <a:fld id="{C33163C4-65CF-48D2-8124-E2CEDBD7A0C5}" type="datetimeFigureOut">
               <a:rPr lang="ko-KR" altLang="en-US" smtClean="0"/>
-              <a:t>2022-04-25</a:t>
+              <a:t>2022-11-27</a:t>
             </a:fld>
             <a:endParaRPr lang="ko-KR" altLang="en-US"/>
           </a:p>
@@ -5632,7 +5638,7 @@
           <a:p>
             <a:fld id="{C33163C4-65CF-48D2-8124-E2CEDBD7A0C5}" type="datetimeFigureOut">
               <a:rPr lang="ko-KR" altLang="en-US" smtClean="0"/>
-              <a:t>2022-04-25</a:t>
+              <a:t>2022-11-27</a:t>
             </a:fld>
             <a:endParaRPr lang="ko-KR" altLang="en-US"/>
           </a:p>
@@ -5907,7 +5913,7 @@
           <a:p>
             <a:fld id="{C33163C4-65CF-48D2-8124-E2CEDBD7A0C5}" type="datetimeFigureOut">
               <a:rPr lang="ko-KR" altLang="en-US" smtClean="0"/>
-              <a:t>2022-04-25</a:t>
+              <a:t>2022-11-27</a:t>
             </a:fld>
             <a:endParaRPr lang="ko-KR" altLang="en-US"/>
           </a:p>
@@ -6159,7 +6165,7 @@
           <a:p>
             <a:fld id="{C33163C4-65CF-48D2-8124-E2CEDBD7A0C5}" type="datetimeFigureOut">
               <a:rPr lang="ko-KR" altLang="en-US" smtClean="0"/>
-              <a:t>2022-04-25</a:t>
+              <a:t>2022-11-27</a:t>
             </a:fld>
             <a:endParaRPr lang="ko-KR" altLang="en-US"/>
           </a:p>
@@ -6394,7 +6400,7 @@
           <a:p>
             <a:fld id="{C33163C4-65CF-48D2-8124-E2CEDBD7A0C5}" type="datetimeFigureOut">
               <a:rPr lang="ko-KR" altLang="en-US" smtClean="0"/>
-              <a:t>2022-04-25</a:t>
+              <a:t>2022-11-27</a:t>
             </a:fld>
             <a:endParaRPr lang="ko-KR" altLang="en-US"/>
           </a:p>
@@ -6904,7 +6910,7 @@
           <a:p>
             <a:fld id="{29936F60-83FB-4643-B7D2-F169DF4090A4}" type="datetimeFigureOut">
               <a:rPr lang="ko-KR" altLang="en-US" smtClean="0"/>
-              <a:t>2022-04-25</a:t>
+              <a:t>2022-11-27</a:t>
             </a:fld>
             <a:endParaRPr lang="ko-KR" altLang="en-US"/>
           </a:p>
@@ -7600,32 +7606,16 @@
                   </a:spcBef>
                 </a:pPr>
                 <a:r>
-                  <a:rPr kumimoji="1" lang="ko-KR" altLang="en-US" sz="800" b="1" smtClean="0"/>
-                  <a:t>로직에 </a:t>
+                  <a:rPr kumimoji="1" lang="ko-KR" altLang="en-US" sz="800" b="1"/>
+                  <a:t>로직에 대한 상태를 정의하여 </a:t>
+                </a:r>
+                <a:r>
+                  <a:rPr kumimoji="1" lang="en-US" altLang="ko-KR" sz="800" b="1"/>
+                  <a:t>SW</a:t>
                 </a:r>
                 <a:r>
                   <a:rPr kumimoji="1" lang="ko-KR" altLang="en-US" sz="800" b="1"/>
-                  <a:t>대한 상태를 </a:t>
-                </a:r>
-                <a:r>
-                  <a:rPr kumimoji="1" lang="ko-KR" altLang="en-US" sz="800" b="1" smtClean="0"/>
-                  <a:t>정의하여 </a:t>
-                </a:r>
-                <a:r>
-                  <a:rPr kumimoji="1" lang="en-US" altLang="ko-KR" sz="800" b="1" smtClean="0"/>
-                  <a:t>SW</a:t>
-                </a:r>
-                <a:r>
-                  <a:rPr kumimoji="1" lang="ko-KR" altLang="en-US" sz="800" b="1" smtClean="0"/>
-                  <a:t>전체 </a:t>
-                </a:r>
-                <a:r>
-                  <a:rPr kumimoji="1" lang="ko-KR" altLang="en-US" sz="800" b="1"/>
-                  <a:t>동작을 포괄적으로 </a:t>
-                </a:r>
-                <a:r>
-                  <a:rPr kumimoji="1" lang="ko-KR" altLang="en-US" sz="800" b="1" smtClean="0"/>
-                  <a:t>파악</a:t>
+                  <a:t>전체 동작을 포괄적으로 파악</a:t>
                 </a:r>
                 <a:endParaRPr kumimoji="1" lang="en-US" altLang="ko-KR" sz="800" b="1"/>
               </a:p>
@@ -7891,14 +7881,14 @@
                     <a:defRPr/>
                   </a:pPr>
                   <a:r>
-                    <a:rPr lang="en-US" altLang="ko-KR" sz="400" b="1" smtClean="0">
+                    <a:rPr lang="en-US" altLang="ko-KR" sz="400" b="1">
                       <a:latin typeface="Cambria" panose="02040503050406030204" pitchFamily="18" charset="0"/>
                       <a:ea typeface="Cambria" panose="02040503050406030204" pitchFamily="18" charset="0"/>
                       <a:cs typeface="Arial" panose="020B0604020202020204" pitchFamily="34" charset="0"/>
                     </a:rPr>
                     <a:t>RollBlind</a:t>
                   </a:r>
-                  <a:endParaRPr lang="ko-KR" altLang="en-US" sz="400" b="1" smtClean="0">
+                  <a:endParaRPr lang="ko-KR" altLang="en-US" sz="400" b="1">
                     <a:latin typeface="Cambria" panose="02040503050406030204" pitchFamily="18" charset="0"/>
                     <a:ea typeface="Cambria" panose="02040503050406030204" pitchFamily="18" charset="0"/>
                     <a:cs typeface="Arial" panose="020B0604020202020204" pitchFamily="34" charset="0"/>
@@ -8042,14 +8032,14 @@
                     <a:defRPr/>
                   </a:pPr>
                   <a:r>
-                    <a:rPr lang="en-US" altLang="ko-KR" sz="400" b="1" smtClean="0">
+                    <a:rPr lang="en-US" altLang="ko-KR" sz="400" b="1">
                       <a:latin typeface="Cambria" panose="02040503050406030204" pitchFamily="18" charset="0"/>
                       <a:ea typeface="Cambria" panose="02040503050406030204" pitchFamily="18" charset="0"/>
                       <a:cs typeface="Arial" panose="020B0604020202020204" pitchFamily="34" charset="0"/>
                     </a:rPr>
                     <a:t>Glass</a:t>
                   </a:r>
-                  <a:endParaRPr lang="ko-KR" altLang="en-US" sz="400" b="1" smtClean="0">
+                  <a:endParaRPr lang="ko-KR" altLang="en-US" sz="400" b="1">
                     <a:latin typeface="Cambria" panose="02040503050406030204" pitchFamily="18" charset="0"/>
                     <a:ea typeface="Cambria" panose="02040503050406030204" pitchFamily="18" charset="0"/>
                     <a:cs typeface="Arial" panose="020B0604020202020204" pitchFamily="34" charset="0"/>
@@ -8835,23 +8825,148 @@
           </p:txBody>
         </p:sp>
       </p:grpSp>
+    </p:spTree>
+    <p:extLst>
+      <p:ext uri="{BB962C8B-B14F-4D97-AF65-F5344CB8AC3E}">
+        <p14:creationId xmlns:p14="http://schemas.microsoft.com/office/powerpoint/2010/main" val="50183194"/>
+      </p:ext>
+    </p:extLst>
+  </p:cSld>
+  <p:clrMapOvr>
+    <a:masterClrMapping/>
+  </p:clrMapOvr>
+</p:sld>
+</file>
+
+<file path=ppt/slides/slide2.xml><?xml version="1.0" encoding="utf-8"?>
+<p:sld xmlns:a="http://schemas.openxmlformats.org/drawingml/2006/main" xmlns:r="http://schemas.openxmlformats.org/officeDocument/2006/relationships" xmlns:p="http://schemas.openxmlformats.org/presentationml/2006/main">
+  <p:cSld>
+    <p:spTree>
+      <p:nvGrpSpPr>
+        <p:cNvPr id="1" name=""/>
+        <p:cNvGrpSpPr/>
+        <p:nvPr/>
+      </p:nvGrpSpPr>
+      <p:grpSpPr>
+        <a:xfrm>
+          <a:off x="0" y="0"/>
+          <a:ext cx="0" cy="0"/>
+          <a:chOff x="0" y="0"/>
+          <a:chExt cx="0" cy="0"/>
+        </a:xfrm>
+      </p:grpSpPr>
+      <p:sp>
+        <p:nvSpPr>
+          <p:cNvPr id="3" name="슬라이드 번호 개체 틀 2">
+            <a:extLst>
+              <a:ext uri="{FF2B5EF4-FFF2-40B4-BE49-F238E27FC236}">
+                <a16:creationId xmlns:a16="http://schemas.microsoft.com/office/drawing/2014/main" id="{402B4354-4876-46BF-A52B-48CAA927932A}"/>
+              </a:ext>
+            </a:extLst>
+          </p:cNvPr>
+          <p:cNvSpPr>
+            <a:spLocks noGrp="1"/>
+          </p:cNvSpPr>
+          <p:nvPr>
+            <p:ph type="sldNum" sz="quarter" idx="12"/>
+          </p:nvPr>
+        </p:nvSpPr>
+        <p:spPr/>
+        <p:txBody>
+          <a:bodyPr/>
+          <a:lstStyle/>
+          <a:p>
+            <a:fld id="{83FD6675-1775-473F-B12B-1A4033AC630B}" type="slidenum">
+              <a:rPr lang="ko-KR" altLang="en-US" smtClean="0"/>
+              <a:t>2</a:t>
+            </a:fld>
+            <a:endParaRPr lang="ko-KR" altLang="en-US"/>
+          </a:p>
+        </p:txBody>
+      </p:sp>
+      <p:sp>
+        <p:nvSpPr>
+          <p:cNvPr id="4" name="제목 3">
+            <a:extLst>
+              <a:ext uri="{FF2B5EF4-FFF2-40B4-BE49-F238E27FC236}">
+                <a16:creationId xmlns:a16="http://schemas.microsoft.com/office/drawing/2014/main" id="{906B3FFC-335D-44D1-A327-0EB90EA1D3AE}"/>
+              </a:ext>
+            </a:extLst>
+          </p:cNvPr>
+          <p:cNvSpPr>
+            <a:spLocks noGrp="1"/>
+          </p:cNvSpPr>
+          <p:nvPr>
+            <p:ph type="title"/>
+          </p:nvPr>
+        </p:nvSpPr>
+        <p:spPr/>
+        <p:txBody>
+          <a:bodyPr/>
+          <a:lstStyle/>
+          <a:p>
+            <a:endParaRPr lang="ko-KR" altLang="en-US"/>
+          </a:p>
+        </p:txBody>
+      </p:sp>
       <p:pic>
         <p:nvPicPr>
-          <p:cNvPr id="29" name="그림 28"/>
+          <p:cNvPr id="5" name="그림 4">
+            <a:extLst>
+              <a:ext uri="{FF2B5EF4-FFF2-40B4-BE49-F238E27FC236}">
+                <a16:creationId xmlns:a16="http://schemas.microsoft.com/office/drawing/2014/main" id="{C2375F56-F3C1-4FDB-8812-69534BE2CF46}"/>
+              </a:ext>
+            </a:extLst>
+          </p:cNvPr>
           <p:cNvPicPr>
             <a:picLocks noChangeAspect="1"/>
           </p:cNvPicPr>
           <p:nvPr/>
         </p:nvPicPr>
         <p:blipFill rotWithShape="1">
-          <a:blip r:embed="rId5"/>
+          <a:blip r:embed="rId2"/>
           <a:srcRect r="53746"/>
           <a:stretch/>
         </p:blipFill>
         <p:spPr>
           <a:xfrm>
-            <a:off x="14593131" y="7513144"/>
+            <a:off x="11088216" y="2754773"/>
             <a:ext cx="2543757" cy="4015381"/>
+          </a:xfrm>
+          <a:prstGeom prst="rect">
+            <a:avLst/>
+          </a:prstGeom>
+          <a:ln>
+            <a:solidFill>
+              <a:schemeClr val="tx1"/>
+            </a:solidFill>
+          </a:ln>
+        </p:spPr>
+      </p:pic>
+      <p:pic>
+        <p:nvPicPr>
+          <p:cNvPr id="7" name="그림 6">
+            <a:extLst>
+              <a:ext uri="{FF2B5EF4-FFF2-40B4-BE49-F238E27FC236}">
+                <a16:creationId xmlns:a16="http://schemas.microsoft.com/office/drawing/2014/main" id="{CCE15B13-312F-4248-A3E6-72818B1307F0}"/>
+              </a:ext>
+            </a:extLst>
+          </p:cNvPr>
+          <p:cNvPicPr>
+            <a:picLocks noChangeAspect="1"/>
+          </p:cNvPicPr>
+          <p:nvPr/>
+        </p:nvPicPr>
+        <p:blipFill>
+          <a:blip r:embed="rId3"/>
+          <a:stretch>
+            <a:fillRect/>
+          </a:stretch>
+        </p:blipFill>
+        <p:spPr>
+          <a:xfrm>
+            <a:off x="7653970" y="2760129"/>
+            <a:ext cx="2867025" cy="4010025"/>
           </a:xfrm>
           <a:prstGeom prst="rect">
             <a:avLst/>
@@ -8866,20 +8981,13 @@
     </p:spTree>
     <p:extLst>
       <p:ext uri="{BB962C8B-B14F-4D97-AF65-F5344CB8AC3E}">
-        <p14:creationId xmlns:p14="http://schemas.microsoft.com/office/powerpoint/2010/main" val="50183194"/>
+        <p14:creationId xmlns:p14="http://schemas.microsoft.com/office/powerpoint/2010/main" val="2596662696"/>
       </p:ext>
     </p:extLst>
   </p:cSld>
   <p:clrMapOvr>
     <a:masterClrMapping/>
   </p:clrMapOvr>
-  <p:timing>
-    <p:tnLst>
-      <p:par>
-        <p:cTn id="1" dur="indefinite" restart="never" nodeType="tmRoot"/>
-      </p:par>
-    </p:tnLst>
-  </p:timing>
 </p:sld>
 </file>
 

</xml_diff>

<commit_message>
Deploy website - based on e7547ca3c748a0084a23231612ca657c8092e9b4
</commit_message>
<xml_diff>
--- a/assets/1_process_img.pptx
+++ b/assets/1_process_img.pptx
@@ -6,11 +6,12 @@
     <p:sldMasterId id="2147483660" r:id="rId2"/>
   </p:sldMasterIdLst>
   <p:notesMasterIdLst>
-    <p:notesMasterId r:id="rId5"/>
+    <p:notesMasterId r:id="rId6"/>
   </p:notesMasterIdLst>
   <p:sldIdLst>
     <p:sldId id="358" r:id="rId3"/>
     <p:sldId id="359" r:id="rId4"/>
+    <p:sldId id="360" r:id="rId5"/>
   </p:sldIdLst>
   <p:sldSz cx="18288000" cy="14039850"/>
   <p:notesSz cx="6858000" cy="9144000"/>
@@ -111,18 +112,7 @@
   </p:defaultTextStyle>
   <p:extLst>
     <p:ext uri="{EFAFB233-063F-42B5-8137-9DF3F51BA10A}">
-      <p15:sldGuideLst xmlns:p15="http://schemas.microsoft.com/office/powerpoint/2012/main">
-        <p15:guide id="3" pos="317" userDrawn="1">
-          <p15:clr>
-            <a:srgbClr val="A4A3A4"/>
-          </p15:clr>
-        </p15:guide>
-        <p15:guide id="4" orient="horz" pos="4422">
-          <p15:clr>
-            <a:srgbClr val="A4A3A4"/>
-          </p15:clr>
-        </p15:guide>
-      </p15:sldGuideLst>
+      <p15:sldGuideLst xmlns:p15="http://schemas.microsoft.com/office/powerpoint/2012/main"/>
     </p:ext>
     <p:ext uri="{2D200454-40CA-4A62-9FC3-DE9A4176ACB9}">
       <p15:notesGuideLst xmlns:p15="http://schemas.microsoft.com/office/powerpoint/2012/main"/>
@@ -213,7 +203,7 @@
           <a:p>
             <a:fld id="{CABFA58B-201B-41D2-AA3E-28483B84FD7B}" type="datetimeFigureOut">
               <a:rPr lang="ko-KR" altLang="en-US" smtClean="0"/>
-              <a:t>2022-11-27</a:t>
+              <a:t>2022-11-30</a:t>
             </a:fld>
             <a:endParaRPr lang="ko-KR" altLang="en-US"/>
           </a:p>
@@ -659,7 +649,7 @@
           <a:p>
             <a:fld id="{C33163C4-65CF-48D2-8124-E2CEDBD7A0C5}" type="datetimeFigureOut">
               <a:rPr lang="ko-KR" altLang="en-US" smtClean="0"/>
-              <a:t>2022-11-27</a:t>
+              <a:t>2022-11-30</a:t>
             </a:fld>
             <a:endParaRPr lang="ko-KR" altLang="en-US"/>
           </a:p>
@@ -981,7 +971,7 @@
           <a:p>
             <a:fld id="{C33163C4-65CF-48D2-8124-E2CEDBD7A0C5}" type="datetimeFigureOut">
               <a:rPr lang="ko-KR" altLang="en-US" smtClean="0"/>
-              <a:t>2022-11-27</a:t>
+              <a:t>2022-11-30</a:t>
             </a:fld>
             <a:endParaRPr lang="ko-KR" altLang="en-US"/>
           </a:p>
@@ -1159,7 +1149,7 @@
           <a:p>
             <a:fld id="{C33163C4-65CF-48D2-8124-E2CEDBD7A0C5}" type="datetimeFigureOut">
               <a:rPr lang="ko-KR" altLang="en-US" smtClean="0"/>
-              <a:t>2022-11-27</a:t>
+              <a:t>2022-11-30</a:t>
             </a:fld>
             <a:endParaRPr lang="ko-KR" altLang="en-US"/>
           </a:p>
@@ -1399,7 +1389,7 @@
           <a:p>
             <a:fld id="{29936F60-83FB-4643-B7D2-F169DF4090A4}" type="datetimeFigureOut">
               <a:rPr lang="ko-KR" altLang="en-US" smtClean="0"/>
-              <a:t>2022-11-27</a:t>
+              <a:t>2022-11-30</a:t>
             </a:fld>
             <a:endParaRPr lang="ko-KR" altLang="en-US"/>
           </a:p>
@@ -1567,7 +1557,7 @@
           <a:p>
             <a:fld id="{29936F60-83FB-4643-B7D2-F169DF4090A4}" type="datetimeFigureOut">
               <a:rPr lang="ko-KR" altLang="en-US" smtClean="0"/>
-              <a:t>2022-11-27</a:t>
+              <a:t>2022-11-30</a:t>
             </a:fld>
             <a:endParaRPr lang="ko-KR" altLang="en-US"/>
           </a:p>
@@ -1812,7 +1802,7 @@
           <a:p>
             <a:fld id="{29936F60-83FB-4643-B7D2-F169DF4090A4}" type="datetimeFigureOut">
               <a:rPr lang="ko-KR" altLang="en-US" smtClean="0"/>
-              <a:t>2022-11-27</a:t>
+              <a:t>2022-11-30</a:t>
             </a:fld>
             <a:endParaRPr lang="ko-KR" altLang="en-US"/>
           </a:p>
@@ -2097,7 +2087,7 @@
           <a:p>
             <a:fld id="{29936F60-83FB-4643-B7D2-F169DF4090A4}" type="datetimeFigureOut">
               <a:rPr lang="ko-KR" altLang="en-US" smtClean="0"/>
-              <a:t>2022-11-27</a:t>
+              <a:t>2022-11-30</a:t>
             </a:fld>
             <a:endParaRPr lang="ko-KR" altLang="en-US"/>
           </a:p>
@@ -2516,7 +2506,7 @@
           <a:p>
             <a:fld id="{29936F60-83FB-4643-B7D2-F169DF4090A4}" type="datetimeFigureOut">
               <a:rPr lang="ko-KR" altLang="en-US" smtClean="0"/>
-              <a:t>2022-11-27</a:t>
+              <a:t>2022-11-30</a:t>
             </a:fld>
             <a:endParaRPr lang="ko-KR" altLang="en-US"/>
           </a:p>
@@ -2633,7 +2623,7 @@
           <a:p>
             <a:fld id="{29936F60-83FB-4643-B7D2-F169DF4090A4}" type="datetimeFigureOut">
               <a:rPr lang="ko-KR" altLang="en-US" smtClean="0"/>
-              <a:t>2022-11-27</a:t>
+              <a:t>2022-11-30</a:t>
             </a:fld>
             <a:endParaRPr lang="ko-KR" altLang="en-US"/>
           </a:p>
@@ -2728,7 +2718,7 @@
           <a:p>
             <a:fld id="{29936F60-83FB-4643-B7D2-F169DF4090A4}" type="datetimeFigureOut">
               <a:rPr lang="ko-KR" altLang="en-US" smtClean="0"/>
-              <a:t>2022-11-27</a:t>
+              <a:t>2022-11-30</a:t>
             </a:fld>
             <a:endParaRPr lang="ko-KR" altLang="en-US"/>
           </a:p>
@@ -3003,7 +2993,7 @@
           <a:p>
             <a:fld id="{29936F60-83FB-4643-B7D2-F169DF4090A4}" type="datetimeFigureOut">
               <a:rPr lang="ko-KR" altLang="en-US" smtClean="0"/>
-              <a:t>2022-11-27</a:t>
+              <a:t>2022-11-30</a:t>
             </a:fld>
             <a:endParaRPr lang="ko-KR" altLang="en-US"/>
           </a:p>
@@ -3193,7 +3183,7 @@
           <a:p>
             <a:fld id="{C33163C4-65CF-48D2-8124-E2CEDBD7A0C5}" type="datetimeFigureOut">
               <a:rPr lang="ko-KR" altLang="en-US" smtClean="0"/>
-              <a:t>2022-11-27</a:t>
+              <a:t>2022-11-30</a:t>
             </a:fld>
             <a:endParaRPr lang="ko-KR" altLang="en-US"/>
           </a:p>
@@ -3806,7 +3796,7 @@
           <a:p>
             <a:fld id="{29936F60-83FB-4643-B7D2-F169DF4090A4}" type="datetimeFigureOut">
               <a:rPr lang="ko-KR" altLang="en-US" smtClean="0"/>
-              <a:t>2022-11-27</a:t>
+              <a:t>2022-11-30</a:t>
             </a:fld>
             <a:endParaRPr lang="ko-KR" altLang="en-US"/>
           </a:p>
@@ -3974,7 +3964,7 @@
           <a:p>
             <a:fld id="{29936F60-83FB-4643-B7D2-F169DF4090A4}" type="datetimeFigureOut">
               <a:rPr lang="ko-KR" altLang="en-US" smtClean="0"/>
-              <a:t>2022-11-27</a:t>
+              <a:t>2022-11-30</a:t>
             </a:fld>
             <a:endParaRPr lang="ko-KR" altLang="en-US"/>
           </a:p>
@@ -4152,7 +4142,7 @@
           <a:p>
             <a:fld id="{29936F60-83FB-4643-B7D2-F169DF4090A4}" type="datetimeFigureOut">
               <a:rPr lang="ko-KR" altLang="en-US" smtClean="0"/>
-              <a:t>2022-11-27</a:t>
+              <a:t>2022-11-30</a:t>
             </a:fld>
             <a:endParaRPr lang="ko-KR" altLang="en-US"/>
           </a:p>
@@ -4397,7 +4387,7 @@
           <a:p>
             <a:fld id="{C33163C4-65CF-48D2-8124-E2CEDBD7A0C5}" type="datetimeFigureOut">
               <a:rPr lang="ko-KR" altLang="en-US" smtClean="0"/>
-              <a:t>2022-11-27</a:t>
+              <a:t>2022-11-30</a:t>
             </a:fld>
             <a:endParaRPr lang="ko-KR" altLang="en-US"/>
           </a:p>
@@ -4523,7 +4513,7 @@
           <a:p>
             <a:fld id="{C33163C4-65CF-48D2-8124-E2CEDBD7A0C5}" type="datetimeFigureOut">
               <a:rPr lang="ko-KR" altLang="en-US" smtClean="0"/>
-              <a:t>2022-11-27</a:t>
+              <a:t>2022-11-30</a:t>
             </a:fld>
             <a:endParaRPr lang="ko-KR" altLang="en-US"/>
           </a:p>
@@ -5426,7 +5416,7 @@
           <a:p>
             <a:fld id="{C33163C4-65CF-48D2-8124-E2CEDBD7A0C5}" type="datetimeFigureOut">
               <a:rPr lang="ko-KR" altLang="en-US" smtClean="0"/>
-              <a:t>2022-11-27</a:t>
+              <a:t>2022-11-30</a:t>
             </a:fld>
             <a:endParaRPr lang="ko-KR" altLang="en-US"/>
           </a:p>
@@ -5543,7 +5533,7 @@
           <a:p>
             <a:fld id="{C33163C4-65CF-48D2-8124-E2CEDBD7A0C5}" type="datetimeFigureOut">
               <a:rPr lang="ko-KR" altLang="en-US" smtClean="0"/>
-              <a:t>2022-11-27</a:t>
+              <a:t>2022-11-30</a:t>
             </a:fld>
             <a:endParaRPr lang="ko-KR" altLang="en-US"/>
           </a:p>
@@ -5638,7 +5628,7 @@
           <a:p>
             <a:fld id="{C33163C4-65CF-48D2-8124-E2CEDBD7A0C5}" type="datetimeFigureOut">
               <a:rPr lang="ko-KR" altLang="en-US" smtClean="0"/>
-              <a:t>2022-11-27</a:t>
+              <a:t>2022-11-30</a:t>
             </a:fld>
             <a:endParaRPr lang="ko-KR" altLang="en-US"/>
           </a:p>
@@ -5913,7 +5903,7 @@
           <a:p>
             <a:fld id="{C33163C4-65CF-48D2-8124-E2CEDBD7A0C5}" type="datetimeFigureOut">
               <a:rPr lang="ko-KR" altLang="en-US" smtClean="0"/>
-              <a:t>2022-11-27</a:t>
+              <a:t>2022-11-30</a:t>
             </a:fld>
             <a:endParaRPr lang="ko-KR" altLang="en-US"/>
           </a:p>
@@ -6165,7 +6155,7 @@
           <a:p>
             <a:fld id="{C33163C4-65CF-48D2-8124-E2CEDBD7A0C5}" type="datetimeFigureOut">
               <a:rPr lang="ko-KR" altLang="en-US" smtClean="0"/>
-              <a:t>2022-11-27</a:t>
+              <a:t>2022-11-30</a:t>
             </a:fld>
             <a:endParaRPr lang="ko-KR" altLang="en-US"/>
           </a:p>
@@ -6400,7 +6390,7 @@
           <a:p>
             <a:fld id="{C33163C4-65CF-48D2-8124-E2CEDBD7A0C5}" type="datetimeFigureOut">
               <a:rPr lang="ko-KR" altLang="en-US" smtClean="0"/>
-              <a:t>2022-11-27</a:t>
+              <a:t>2022-11-30</a:t>
             </a:fld>
             <a:endParaRPr lang="ko-KR" altLang="en-US"/>
           </a:p>
@@ -6910,7 +6900,7 @@
           <a:p>
             <a:fld id="{29936F60-83FB-4643-B7D2-F169DF4090A4}" type="datetimeFigureOut">
               <a:rPr lang="ko-KR" altLang="en-US" smtClean="0"/>
-              <a:t>2022-11-27</a:t>
+              <a:t>2022-11-30</a:t>
             </a:fld>
             <a:endParaRPr lang="ko-KR" altLang="en-US"/>
           </a:p>
@@ -8982,6 +8972,703 @@
     <p:extLst>
       <p:ext uri="{BB962C8B-B14F-4D97-AF65-F5344CB8AC3E}">
         <p14:creationId xmlns:p14="http://schemas.microsoft.com/office/powerpoint/2010/main" val="2596662696"/>
+      </p:ext>
+    </p:extLst>
+  </p:cSld>
+  <p:clrMapOvr>
+    <a:masterClrMapping/>
+  </p:clrMapOvr>
+</p:sld>
+</file>
+
+<file path=ppt/slides/slide3.xml><?xml version="1.0" encoding="utf-8"?>
+<p:sld xmlns:a="http://schemas.openxmlformats.org/drawingml/2006/main" xmlns:r="http://schemas.openxmlformats.org/officeDocument/2006/relationships" xmlns:p="http://schemas.openxmlformats.org/presentationml/2006/main">
+  <p:cSld>
+    <p:spTree>
+      <p:nvGrpSpPr>
+        <p:cNvPr id="1" name=""/>
+        <p:cNvGrpSpPr/>
+        <p:nvPr/>
+      </p:nvGrpSpPr>
+      <p:grpSpPr>
+        <a:xfrm>
+          <a:off x="0" y="0"/>
+          <a:ext cx="0" cy="0"/>
+          <a:chOff x="0" y="0"/>
+          <a:chExt cx="0" cy="0"/>
+        </a:xfrm>
+      </p:grpSpPr>
+      <p:sp>
+        <p:nvSpPr>
+          <p:cNvPr id="3" name="슬라이드 번호 개체 틀 2"/>
+          <p:cNvSpPr>
+            <a:spLocks noGrp="1"/>
+          </p:cNvSpPr>
+          <p:nvPr>
+            <p:ph type="sldNum" sz="quarter" idx="12"/>
+          </p:nvPr>
+        </p:nvSpPr>
+        <p:spPr/>
+        <p:txBody>
+          <a:bodyPr/>
+          <a:lstStyle/>
+          <a:p>
+            <a:fld id="{83FD6675-1775-473F-B12B-1A4033AC630B}" type="slidenum">
+              <a:rPr lang="ko-KR" altLang="en-US" smtClean="0"/>
+              <a:t>3</a:t>
+            </a:fld>
+            <a:endParaRPr lang="ko-KR" altLang="en-US"/>
+          </a:p>
+        </p:txBody>
+      </p:sp>
+      <p:sp>
+        <p:nvSpPr>
+          <p:cNvPr id="4" name="제목 3"/>
+          <p:cNvSpPr>
+            <a:spLocks noGrp="1"/>
+          </p:cNvSpPr>
+          <p:nvPr>
+            <p:ph type="title"/>
+          </p:nvPr>
+        </p:nvSpPr>
+        <p:spPr/>
+        <p:txBody>
+          <a:bodyPr/>
+          <a:lstStyle/>
+          <a:p>
+            <a:endParaRPr lang="ko-KR" altLang="en-US"/>
+          </a:p>
+        </p:txBody>
+      </p:sp>
+      <p:pic>
+        <p:nvPicPr>
+          <p:cNvPr id="5" name="그림 4"/>
+          <p:cNvPicPr>
+            <a:picLocks noChangeAspect="1"/>
+          </p:cNvPicPr>
+          <p:nvPr/>
+        </p:nvPicPr>
+        <p:blipFill>
+          <a:blip r:embed="rId2">
+            <a:extLst>
+              <a:ext uri="{28A0092B-C50C-407E-A947-70E740481C1C}">
+                <a14:useLocalDpi xmlns:a14="http://schemas.microsoft.com/office/drawing/2010/main" val="0"/>
+              </a:ext>
+            </a:extLst>
+          </a:blip>
+          <a:stretch>
+            <a:fillRect/>
+          </a:stretch>
+        </p:blipFill>
+        <p:spPr>
+          <a:xfrm>
+            <a:off x="508382" y="1880470"/>
+            <a:ext cx="17271235" cy="10278909"/>
+          </a:xfrm>
+          <a:prstGeom prst="rect">
+            <a:avLst/>
+          </a:prstGeom>
+        </p:spPr>
+      </p:pic>
+      <p:pic>
+        <p:nvPicPr>
+          <p:cNvPr id="6" name="그림 5"/>
+          <p:cNvPicPr>
+            <a:picLocks noChangeAspect="1"/>
+          </p:cNvPicPr>
+          <p:nvPr/>
+        </p:nvPicPr>
+        <p:blipFill>
+          <a:blip r:embed="rId3">
+            <a:extLst>
+              <a:ext uri="{28A0092B-C50C-407E-A947-70E740481C1C}">
+                <a14:useLocalDpi xmlns:a14="http://schemas.microsoft.com/office/drawing/2010/main" val="0"/>
+              </a:ext>
+            </a:extLst>
+          </a:blip>
+          <a:stretch>
+            <a:fillRect/>
+          </a:stretch>
+        </p:blipFill>
+        <p:spPr>
+          <a:xfrm>
+            <a:off x="10521950" y="2915729"/>
+            <a:ext cx="7066643" cy="6444716"/>
+          </a:xfrm>
+          <a:prstGeom prst="rect">
+            <a:avLst/>
+          </a:prstGeom>
+          <a:ln w="63500">
+            <a:solidFill>
+              <a:srgbClr val="C00000"/>
+            </a:solidFill>
+          </a:ln>
+        </p:spPr>
+      </p:pic>
+      <p:sp>
+        <p:nvSpPr>
+          <p:cNvPr id="7" name="직사각형 6"/>
+          <p:cNvSpPr/>
+          <p:nvPr/>
+        </p:nvSpPr>
+        <p:spPr>
+          <a:xfrm>
+            <a:off x="791072" y="11088377"/>
+            <a:ext cx="1008112" cy="324036"/>
+          </a:xfrm>
+          <a:prstGeom prst="rect">
+            <a:avLst/>
+          </a:prstGeom>
+          <a:noFill/>
+          <a:ln>
+            <a:solidFill>
+              <a:srgbClr val="C00000"/>
+            </a:solidFill>
+          </a:ln>
+        </p:spPr>
+        <p:style>
+          <a:lnRef idx="2">
+            <a:schemeClr val="accent1">
+              <a:shade val="50000"/>
+            </a:schemeClr>
+          </a:lnRef>
+          <a:fillRef idx="1">
+            <a:schemeClr val="accent1"/>
+          </a:fillRef>
+          <a:effectRef idx="0">
+            <a:schemeClr val="accent1"/>
+          </a:effectRef>
+          <a:fontRef idx="minor">
+            <a:schemeClr val="lt1"/>
+          </a:fontRef>
+        </p:style>
+        <p:txBody>
+          <a:bodyPr rtlCol="0" anchor="ctr"/>
+          <a:lstStyle/>
+          <a:p>
+            <a:pPr algn="ctr"/>
+            <a:endParaRPr lang="ko-KR" altLang="en-US"/>
+          </a:p>
+        </p:txBody>
+      </p:sp>
+      <p:sp>
+        <p:nvSpPr>
+          <p:cNvPr id="8" name="직사각형 7"/>
+          <p:cNvSpPr/>
+          <p:nvPr/>
+        </p:nvSpPr>
+        <p:spPr>
+          <a:xfrm>
+            <a:off x="508381" y="11968786"/>
+            <a:ext cx="2872993" cy="185114"/>
+          </a:xfrm>
+          <a:prstGeom prst="rect">
+            <a:avLst/>
+          </a:prstGeom>
+          <a:noFill/>
+          <a:ln>
+            <a:solidFill>
+              <a:srgbClr val="C00000"/>
+            </a:solidFill>
+          </a:ln>
+        </p:spPr>
+        <p:style>
+          <a:lnRef idx="2">
+            <a:schemeClr val="accent1">
+              <a:shade val="50000"/>
+            </a:schemeClr>
+          </a:lnRef>
+          <a:fillRef idx="1">
+            <a:schemeClr val="accent1"/>
+          </a:fillRef>
+          <a:effectRef idx="0">
+            <a:schemeClr val="accent1"/>
+          </a:effectRef>
+          <a:fontRef idx="minor">
+            <a:schemeClr val="lt1"/>
+          </a:fontRef>
+        </p:style>
+        <p:txBody>
+          <a:bodyPr rtlCol="0" anchor="ctr"/>
+          <a:lstStyle/>
+          <a:p>
+            <a:pPr algn="ctr"/>
+            <a:endParaRPr lang="ko-KR" altLang="en-US"/>
+          </a:p>
+        </p:txBody>
+      </p:sp>
+      <p:sp>
+        <p:nvSpPr>
+          <p:cNvPr id="11" name="직사각형 10"/>
+          <p:cNvSpPr/>
+          <p:nvPr/>
+        </p:nvSpPr>
+        <p:spPr>
+          <a:xfrm>
+            <a:off x="1799184" y="2295525"/>
+            <a:ext cx="10081120" cy="152400"/>
+          </a:xfrm>
+          <a:prstGeom prst="rect">
+            <a:avLst/>
+          </a:prstGeom>
+          <a:solidFill>
+            <a:schemeClr val="tx1"/>
+          </a:solidFill>
+          <a:ln>
+            <a:noFill/>
+          </a:ln>
+        </p:spPr>
+        <p:style>
+          <a:lnRef idx="2">
+            <a:schemeClr val="accent1">
+              <a:shade val="50000"/>
+            </a:schemeClr>
+          </a:lnRef>
+          <a:fillRef idx="1">
+            <a:schemeClr val="accent1"/>
+          </a:fillRef>
+          <a:effectRef idx="0">
+            <a:schemeClr val="accent1"/>
+          </a:effectRef>
+          <a:fontRef idx="minor">
+            <a:schemeClr val="lt1"/>
+          </a:fontRef>
+        </p:style>
+        <p:txBody>
+          <a:bodyPr rtlCol="0" anchor="ctr"/>
+          <a:lstStyle/>
+          <a:p>
+            <a:pPr algn="ctr"/>
+            <a:endParaRPr lang="ko-KR" altLang="en-US"/>
+          </a:p>
+        </p:txBody>
+      </p:sp>
+      <p:sp>
+        <p:nvSpPr>
+          <p:cNvPr id="13" name="직사각형 12"/>
+          <p:cNvSpPr/>
+          <p:nvPr/>
+        </p:nvSpPr>
+        <p:spPr>
+          <a:xfrm>
+            <a:off x="646659" y="1952625"/>
+            <a:ext cx="1886991" cy="171450"/>
+          </a:xfrm>
+          <a:prstGeom prst="rect">
+            <a:avLst/>
+          </a:prstGeom>
+          <a:solidFill>
+            <a:schemeClr val="tx1"/>
+          </a:solidFill>
+          <a:ln>
+            <a:noFill/>
+          </a:ln>
+        </p:spPr>
+        <p:style>
+          <a:lnRef idx="2">
+            <a:schemeClr val="accent1">
+              <a:shade val="50000"/>
+            </a:schemeClr>
+          </a:lnRef>
+          <a:fillRef idx="1">
+            <a:schemeClr val="accent1"/>
+          </a:fillRef>
+          <a:effectRef idx="0">
+            <a:schemeClr val="accent1"/>
+          </a:effectRef>
+          <a:fontRef idx="minor">
+            <a:schemeClr val="lt1"/>
+          </a:fontRef>
+        </p:style>
+        <p:txBody>
+          <a:bodyPr rtlCol="0" anchor="ctr"/>
+          <a:lstStyle/>
+          <a:p>
+            <a:pPr algn="ctr"/>
+            <a:endParaRPr lang="ko-KR" altLang="en-US"/>
+          </a:p>
+        </p:txBody>
+      </p:sp>
+      <p:sp>
+        <p:nvSpPr>
+          <p:cNvPr id="14" name="직사각형 13"/>
+          <p:cNvSpPr/>
+          <p:nvPr/>
+        </p:nvSpPr>
+        <p:spPr>
+          <a:xfrm>
+            <a:off x="10575715" y="2971800"/>
+            <a:ext cx="1628986" cy="165100"/>
+          </a:xfrm>
+          <a:prstGeom prst="rect">
+            <a:avLst/>
+          </a:prstGeom>
+          <a:solidFill>
+            <a:schemeClr val="tx1"/>
+          </a:solidFill>
+          <a:ln>
+            <a:noFill/>
+          </a:ln>
+        </p:spPr>
+        <p:style>
+          <a:lnRef idx="2">
+            <a:schemeClr val="accent1">
+              <a:shade val="50000"/>
+            </a:schemeClr>
+          </a:lnRef>
+          <a:fillRef idx="1">
+            <a:schemeClr val="accent1"/>
+          </a:fillRef>
+          <a:effectRef idx="0">
+            <a:schemeClr val="accent1"/>
+          </a:effectRef>
+          <a:fontRef idx="minor">
+            <a:schemeClr val="lt1"/>
+          </a:fontRef>
+        </p:style>
+        <p:txBody>
+          <a:bodyPr rtlCol="0" anchor="ctr"/>
+          <a:lstStyle/>
+          <a:p>
+            <a:pPr algn="ctr"/>
+            <a:endParaRPr lang="ko-KR" altLang="en-US"/>
+          </a:p>
+        </p:txBody>
+      </p:sp>
+      <p:cxnSp>
+        <p:nvCxnSpPr>
+          <p:cNvPr id="16" name="직선 화살표 연결선 15"/>
+          <p:cNvCxnSpPr>
+            <a:stCxn id="7" idx="2"/>
+          </p:cNvCxnSpPr>
+          <p:nvPr/>
+        </p:nvCxnSpPr>
+        <p:spPr>
+          <a:xfrm>
+            <a:off x="1295128" y="11412413"/>
+            <a:ext cx="0" cy="556373"/>
+          </a:xfrm>
+          <a:prstGeom prst="straightConnector1">
+            <a:avLst/>
+          </a:prstGeom>
+          <a:noFill/>
+          <a:ln w="50800">
+            <a:solidFill>
+              <a:srgbClr val="C00000"/>
+            </a:solidFill>
+            <a:tailEnd type="triangle"/>
+          </a:ln>
+        </p:spPr>
+        <p:style>
+          <a:lnRef idx="2">
+            <a:schemeClr val="accent1">
+              <a:shade val="50000"/>
+            </a:schemeClr>
+          </a:lnRef>
+          <a:fillRef idx="1">
+            <a:schemeClr val="accent1"/>
+          </a:fillRef>
+          <a:effectRef idx="0">
+            <a:schemeClr val="accent1"/>
+          </a:effectRef>
+          <a:fontRef idx="minor">
+            <a:schemeClr val="lt1"/>
+          </a:fontRef>
+        </p:style>
+      </p:cxnSp>
+      <p:cxnSp>
+        <p:nvCxnSpPr>
+          <p:cNvPr id="18" name="꺾인 연결선 17"/>
+          <p:cNvCxnSpPr>
+            <a:stCxn id="31" idx="0"/>
+            <a:endCxn id="28" idx="2"/>
+          </p:cNvCxnSpPr>
+          <p:nvPr/>
+        </p:nvCxnSpPr>
+        <p:spPr>
+          <a:xfrm rot="5400000" flipH="1" flipV="1">
+            <a:off x="5975309" y="6262454"/>
+            <a:ext cx="2604830" cy="8800812"/>
+          </a:xfrm>
+          <a:prstGeom prst="bentConnector3">
+            <a:avLst>
+              <a:gd name="adj1" fmla="val 12981"/>
+            </a:avLst>
+          </a:prstGeom>
+          <a:noFill/>
+          <a:ln w="50800">
+            <a:solidFill>
+              <a:srgbClr val="C00000"/>
+            </a:solidFill>
+            <a:tailEnd type="triangle"/>
+          </a:ln>
+        </p:spPr>
+        <p:style>
+          <a:lnRef idx="2">
+            <a:schemeClr val="accent1">
+              <a:shade val="50000"/>
+            </a:schemeClr>
+          </a:lnRef>
+          <a:fillRef idx="1">
+            <a:schemeClr val="accent1"/>
+          </a:fillRef>
+          <a:effectRef idx="0">
+            <a:schemeClr val="accent1"/>
+          </a:effectRef>
+          <a:fontRef idx="minor">
+            <a:schemeClr val="lt1"/>
+          </a:fontRef>
+        </p:style>
+      </p:cxnSp>
+      <p:sp>
+        <p:nvSpPr>
+          <p:cNvPr id="24" name="TextBox 23"/>
+          <p:cNvSpPr txBox="1"/>
+          <p:nvPr/>
+        </p:nvSpPr>
+        <p:spPr>
+          <a:xfrm>
+            <a:off x="1837652" y="11166192"/>
+            <a:ext cx="1689723" cy="307777"/>
+          </a:xfrm>
+          <a:prstGeom prst="rect">
+            <a:avLst/>
+          </a:prstGeom>
+          <a:noFill/>
+        </p:spPr>
+        <p:txBody>
+          <a:bodyPr wrap="square" lIns="0" tIns="0" rIns="0" bIns="0" rtlCol="0">
+            <a:spAutoFit/>
+          </a:bodyPr>
+          <a:lstStyle/>
+          <a:p>
+            <a:pPr algn="ctr"/>
+            <a:r>
+              <a:rPr lang="ko-KR" altLang="en-US" sz="2000" b="1" smtClean="0">
+                <a:solidFill>
+                  <a:srgbClr val="C00000"/>
+                </a:solidFill>
+              </a:rPr>
+              <a:t>①이슈클릭 </a:t>
+            </a:r>
+            <a:r>
+              <a:rPr lang="ko-KR" altLang="en-US" sz="2000" b="1">
+                <a:solidFill>
+                  <a:srgbClr val="C00000"/>
+                </a:solidFill>
+              </a:rPr>
+              <a:t>시</a:t>
+            </a:r>
+            <a:endParaRPr lang="ko-KR" altLang="en-US" sz="2000" b="1" smtClean="0">
+              <a:solidFill>
+                <a:srgbClr val="C00000"/>
+              </a:solidFill>
+            </a:endParaRPr>
+          </a:p>
+        </p:txBody>
+      </p:sp>
+      <p:sp>
+        <p:nvSpPr>
+          <p:cNvPr id="25" name="TextBox 24"/>
+          <p:cNvSpPr txBox="1"/>
+          <p:nvPr/>
+        </p:nvSpPr>
+        <p:spPr>
+          <a:xfrm>
+            <a:off x="3668334" y="11683462"/>
+            <a:ext cx="2919381" cy="307777"/>
+          </a:xfrm>
+          <a:prstGeom prst="rect">
+            <a:avLst/>
+          </a:prstGeom>
+          <a:noFill/>
+        </p:spPr>
+        <p:txBody>
+          <a:bodyPr wrap="square" lIns="0" tIns="0" rIns="0" bIns="0" rtlCol="0">
+            <a:spAutoFit/>
+          </a:bodyPr>
+          <a:lstStyle/>
+          <a:p>
+            <a:pPr algn="ctr"/>
+            <a:r>
+              <a:rPr lang="ko-KR" altLang="en-US" sz="2000" b="1" smtClean="0">
+                <a:solidFill>
+                  <a:srgbClr val="C00000"/>
+                </a:solidFill>
+              </a:rPr>
+              <a:t>②링크된 </a:t>
+            </a:r>
+            <a:r>
+              <a:rPr lang="en-US" altLang="ko-KR" sz="2000" b="1">
+                <a:solidFill>
+                  <a:srgbClr val="C00000"/>
+                </a:solidFill>
+              </a:rPr>
+              <a:t>Github </a:t>
+            </a:r>
+            <a:r>
+              <a:rPr lang="ko-KR" altLang="en-US" sz="2000" b="1" smtClean="0">
+                <a:solidFill>
+                  <a:srgbClr val="C00000"/>
+                </a:solidFill>
+              </a:rPr>
+              <a:t>이슈를</a:t>
+            </a:r>
+            <a:endParaRPr lang="ko-KR" altLang="en-US" sz="2000" b="1" smtClean="0">
+              <a:solidFill>
+                <a:srgbClr val="C00000"/>
+              </a:solidFill>
+            </a:endParaRPr>
+          </a:p>
+        </p:txBody>
+      </p:sp>
+      <p:sp>
+        <p:nvSpPr>
+          <p:cNvPr id="26" name="TextBox 25"/>
+          <p:cNvSpPr txBox="1"/>
+          <p:nvPr/>
+        </p:nvSpPr>
+        <p:spPr>
+          <a:xfrm>
+            <a:off x="11880304" y="9432193"/>
+            <a:ext cx="3316283" cy="615553"/>
+          </a:xfrm>
+          <a:prstGeom prst="rect">
+            <a:avLst/>
+          </a:prstGeom>
+          <a:noFill/>
+        </p:spPr>
+        <p:txBody>
+          <a:bodyPr wrap="square" lIns="0" tIns="0" rIns="0" bIns="0" rtlCol="0">
+            <a:spAutoFit/>
+          </a:bodyPr>
+          <a:lstStyle/>
+          <a:p>
+            <a:pPr algn="ctr"/>
+            <a:r>
+              <a:rPr lang="ko-KR" altLang="en-US" sz="2000" b="1" smtClean="0">
+                <a:solidFill>
+                  <a:srgbClr val="C00000"/>
+                </a:solidFill>
+              </a:rPr>
+              <a:t>③ 새창에 열어 이슈상세를 </a:t>
+            </a:r>
+            <a:r>
+              <a:rPr lang="en-US" altLang="ko-KR" sz="2000" b="1" smtClean="0">
+                <a:solidFill>
+                  <a:srgbClr val="C00000"/>
+                </a:solidFill>
+              </a:rPr>
+              <a:t>OneClick</a:t>
+            </a:r>
+            <a:r>
+              <a:rPr lang="ko-KR" altLang="en-US" sz="2000" b="1" smtClean="0">
+                <a:solidFill>
+                  <a:srgbClr val="C00000"/>
+                </a:solidFill>
+              </a:rPr>
+              <a:t>으로 확인가능</a:t>
+            </a:r>
+            <a:endParaRPr lang="ko-KR" altLang="en-US" sz="2000" b="1" smtClean="0">
+              <a:solidFill>
+                <a:srgbClr val="C00000"/>
+              </a:solidFill>
+            </a:endParaRPr>
+          </a:p>
+        </p:txBody>
+      </p:sp>
+      <p:sp>
+        <p:nvSpPr>
+          <p:cNvPr id="28" name="직사각형 27"/>
+          <p:cNvSpPr/>
+          <p:nvPr/>
+        </p:nvSpPr>
+        <p:spPr>
+          <a:xfrm>
+            <a:off x="11174074" y="9036409"/>
+            <a:ext cx="1008112" cy="324036"/>
+          </a:xfrm>
+          <a:prstGeom prst="rect">
+            <a:avLst/>
+          </a:prstGeom>
+          <a:noFill/>
+          <a:ln>
+            <a:noFill/>
+          </a:ln>
+        </p:spPr>
+        <p:style>
+          <a:lnRef idx="2">
+            <a:schemeClr val="accent1">
+              <a:shade val="50000"/>
+            </a:schemeClr>
+          </a:lnRef>
+          <a:fillRef idx="1">
+            <a:schemeClr val="accent1"/>
+          </a:fillRef>
+          <a:effectRef idx="0">
+            <a:schemeClr val="accent1"/>
+          </a:effectRef>
+          <a:fontRef idx="minor">
+            <a:schemeClr val="lt1"/>
+          </a:fontRef>
+        </p:style>
+        <p:txBody>
+          <a:bodyPr rtlCol="0" anchor="ctr"/>
+          <a:lstStyle/>
+          <a:p>
+            <a:pPr algn="ctr"/>
+            <a:endParaRPr lang="ko-KR" altLang="en-US"/>
+          </a:p>
+        </p:txBody>
+      </p:sp>
+      <p:sp>
+        <p:nvSpPr>
+          <p:cNvPr id="31" name="직사각형 30"/>
+          <p:cNvSpPr/>
+          <p:nvPr/>
+        </p:nvSpPr>
+        <p:spPr>
+          <a:xfrm>
+            <a:off x="2373262" y="11965275"/>
+            <a:ext cx="1008112" cy="324036"/>
+          </a:xfrm>
+          <a:prstGeom prst="rect">
+            <a:avLst/>
+          </a:prstGeom>
+          <a:noFill/>
+          <a:ln>
+            <a:noFill/>
+          </a:ln>
+        </p:spPr>
+        <p:style>
+          <a:lnRef idx="2">
+            <a:schemeClr val="accent1">
+              <a:shade val="50000"/>
+            </a:schemeClr>
+          </a:lnRef>
+          <a:fillRef idx="1">
+            <a:schemeClr val="accent1"/>
+          </a:fillRef>
+          <a:effectRef idx="0">
+            <a:schemeClr val="accent1"/>
+          </a:effectRef>
+          <a:fontRef idx="minor">
+            <a:schemeClr val="lt1"/>
+          </a:fontRef>
+        </p:style>
+        <p:txBody>
+          <a:bodyPr rtlCol="0" anchor="ctr"/>
+          <a:lstStyle/>
+          <a:p>
+            <a:pPr algn="ctr"/>
+            <a:endParaRPr lang="ko-KR" altLang="en-US"/>
+          </a:p>
+        </p:txBody>
+      </p:sp>
+    </p:spTree>
+    <p:extLst>
+      <p:ext uri="{BB962C8B-B14F-4D97-AF65-F5344CB8AC3E}">
+        <p14:creationId xmlns:p14="http://schemas.microsoft.com/office/powerpoint/2010/main" val="81347763"/>
       </p:ext>
     </p:extLst>
   </p:cSld>

</xml_diff>

<commit_message>
Deploy website - based on 2538914e78f2e9eb24d4d4fa9c808e7c8cbdce16
</commit_message>
<xml_diff>
--- a/assets/1_process_img.pptx
+++ b/assets/1_process_img.pptx
@@ -203,7 +203,7 @@
           <a:p>
             <a:fld id="{CABFA58B-201B-41D2-AA3E-28483B84FD7B}" type="datetimeFigureOut">
               <a:rPr lang="ko-KR" altLang="en-US" smtClean="0"/>
-              <a:t>2022-11-30</a:t>
+              <a:t>2023-01-06</a:t>
             </a:fld>
             <a:endParaRPr lang="ko-KR" altLang="en-US"/>
           </a:p>
@@ -649,7 +649,7 @@
           <a:p>
             <a:fld id="{C33163C4-65CF-48D2-8124-E2CEDBD7A0C5}" type="datetimeFigureOut">
               <a:rPr lang="ko-KR" altLang="en-US" smtClean="0"/>
-              <a:t>2022-11-30</a:t>
+              <a:t>2023-01-06</a:t>
             </a:fld>
             <a:endParaRPr lang="ko-KR" altLang="en-US"/>
           </a:p>
@@ -971,7 +971,7 @@
           <a:p>
             <a:fld id="{C33163C4-65CF-48D2-8124-E2CEDBD7A0C5}" type="datetimeFigureOut">
               <a:rPr lang="ko-KR" altLang="en-US" smtClean="0"/>
-              <a:t>2022-11-30</a:t>
+              <a:t>2023-01-06</a:t>
             </a:fld>
             <a:endParaRPr lang="ko-KR" altLang="en-US"/>
           </a:p>
@@ -1149,7 +1149,7 @@
           <a:p>
             <a:fld id="{C33163C4-65CF-48D2-8124-E2CEDBD7A0C5}" type="datetimeFigureOut">
               <a:rPr lang="ko-KR" altLang="en-US" smtClean="0"/>
-              <a:t>2022-11-30</a:t>
+              <a:t>2023-01-06</a:t>
             </a:fld>
             <a:endParaRPr lang="ko-KR" altLang="en-US"/>
           </a:p>
@@ -1389,7 +1389,7 @@
           <a:p>
             <a:fld id="{29936F60-83FB-4643-B7D2-F169DF4090A4}" type="datetimeFigureOut">
               <a:rPr lang="ko-KR" altLang="en-US" smtClean="0"/>
-              <a:t>2022-11-30</a:t>
+              <a:t>2023-01-06</a:t>
             </a:fld>
             <a:endParaRPr lang="ko-KR" altLang="en-US"/>
           </a:p>
@@ -1557,7 +1557,7 @@
           <a:p>
             <a:fld id="{29936F60-83FB-4643-B7D2-F169DF4090A4}" type="datetimeFigureOut">
               <a:rPr lang="ko-KR" altLang="en-US" smtClean="0"/>
-              <a:t>2022-11-30</a:t>
+              <a:t>2023-01-06</a:t>
             </a:fld>
             <a:endParaRPr lang="ko-KR" altLang="en-US"/>
           </a:p>
@@ -1802,7 +1802,7 @@
           <a:p>
             <a:fld id="{29936F60-83FB-4643-B7D2-F169DF4090A4}" type="datetimeFigureOut">
               <a:rPr lang="ko-KR" altLang="en-US" smtClean="0"/>
-              <a:t>2022-11-30</a:t>
+              <a:t>2023-01-06</a:t>
             </a:fld>
             <a:endParaRPr lang="ko-KR" altLang="en-US"/>
           </a:p>
@@ -2087,7 +2087,7 @@
           <a:p>
             <a:fld id="{29936F60-83FB-4643-B7D2-F169DF4090A4}" type="datetimeFigureOut">
               <a:rPr lang="ko-KR" altLang="en-US" smtClean="0"/>
-              <a:t>2022-11-30</a:t>
+              <a:t>2023-01-06</a:t>
             </a:fld>
             <a:endParaRPr lang="ko-KR" altLang="en-US"/>
           </a:p>
@@ -2506,7 +2506,7 @@
           <a:p>
             <a:fld id="{29936F60-83FB-4643-B7D2-F169DF4090A4}" type="datetimeFigureOut">
               <a:rPr lang="ko-KR" altLang="en-US" smtClean="0"/>
-              <a:t>2022-11-30</a:t>
+              <a:t>2023-01-06</a:t>
             </a:fld>
             <a:endParaRPr lang="ko-KR" altLang="en-US"/>
           </a:p>
@@ -2623,7 +2623,7 @@
           <a:p>
             <a:fld id="{29936F60-83FB-4643-B7D2-F169DF4090A4}" type="datetimeFigureOut">
               <a:rPr lang="ko-KR" altLang="en-US" smtClean="0"/>
-              <a:t>2022-11-30</a:t>
+              <a:t>2023-01-06</a:t>
             </a:fld>
             <a:endParaRPr lang="ko-KR" altLang="en-US"/>
           </a:p>
@@ -2718,7 +2718,7 @@
           <a:p>
             <a:fld id="{29936F60-83FB-4643-B7D2-F169DF4090A4}" type="datetimeFigureOut">
               <a:rPr lang="ko-KR" altLang="en-US" smtClean="0"/>
-              <a:t>2022-11-30</a:t>
+              <a:t>2023-01-06</a:t>
             </a:fld>
             <a:endParaRPr lang="ko-KR" altLang="en-US"/>
           </a:p>
@@ -2993,7 +2993,7 @@
           <a:p>
             <a:fld id="{29936F60-83FB-4643-B7D2-F169DF4090A4}" type="datetimeFigureOut">
               <a:rPr lang="ko-KR" altLang="en-US" smtClean="0"/>
-              <a:t>2022-11-30</a:t>
+              <a:t>2023-01-06</a:t>
             </a:fld>
             <a:endParaRPr lang="ko-KR" altLang="en-US"/>
           </a:p>
@@ -3183,7 +3183,7 @@
           <a:p>
             <a:fld id="{C33163C4-65CF-48D2-8124-E2CEDBD7A0C5}" type="datetimeFigureOut">
               <a:rPr lang="ko-KR" altLang="en-US" smtClean="0"/>
-              <a:t>2022-11-30</a:t>
+              <a:t>2023-01-06</a:t>
             </a:fld>
             <a:endParaRPr lang="ko-KR" altLang="en-US"/>
           </a:p>
@@ -3796,7 +3796,7 @@
           <a:p>
             <a:fld id="{29936F60-83FB-4643-B7D2-F169DF4090A4}" type="datetimeFigureOut">
               <a:rPr lang="ko-KR" altLang="en-US" smtClean="0"/>
-              <a:t>2022-11-30</a:t>
+              <a:t>2023-01-06</a:t>
             </a:fld>
             <a:endParaRPr lang="ko-KR" altLang="en-US"/>
           </a:p>
@@ -3964,7 +3964,7 @@
           <a:p>
             <a:fld id="{29936F60-83FB-4643-B7D2-F169DF4090A4}" type="datetimeFigureOut">
               <a:rPr lang="ko-KR" altLang="en-US" smtClean="0"/>
-              <a:t>2022-11-30</a:t>
+              <a:t>2023-01-06</a:t>
             </a:fld>
             <a:endParaRPr lang="ko-KR" altLang="en-US"/>
           </a:p>
@@ -4142,7 +4142,7 @@
           <a:p>
             <a:fld id="{29936F60-83FB-4643-B7D2-F169DF4090A4}" type="datetimeFigureOut">
               <a:rPr lang="ko-KR" altLang="en-US" smtClean="0"/>
-              <a:t>2022-11-30</a:t>
+              <a:t>2023-01-06</a:t>
             </a:fld>
             <a:endParaRPr lang="ko-KR" altLang="en-US"/>
           </a:p>
@@ -4387,7 +4387,7 @@
           <a:p>
             <a:fld id="{C33163C4-65CF-48D2-8124-E2CEDBD7A0C5}" type="datetimeFigureOut">
               <a:rPr lang="ko-KR" altLang="en-US" smtClean="0"/>
-              <a:t>2022-11-30</a:t>
+              <a:t>2023-01-06</a:t>
             </a:fld>
             <a:endParaRPr lang="ko-KR" altLang="en-US"/>
           </a:p>
@@ -4513,7 +4513,7 @@
           <a:p>
             <a:fld id="{C33163C4-65CF-48D2-8124-E2CEDBD7A0C5}" type="datetimeFigureOut">
               <a:rPr lang="ko-KR" altLang="en-US" smtClean="0"/>
-              <a:t>2022-11-30</a:t>
+              <a:t>2023-01-06</a:t>
             </a:fld>
             <a:endParaRPr lang="ko-KR" altLang="en-US"/>
           </a:p>
@@ -5416,7 +5416,7 @@
           <a:p>
             <a:fld id="{C33163C4-65CF-48D2-8124-E2CEDBD7A0C5}" type="datetimeFigureOut">
               <a:rPr lang="ko-KR" altLang="en-US" smtClean="0"/>
-              <a:t>2022-11-30</a:t>
+              <a:t>2023-01-06</a:t>
             </a:fld>
             <a:endParaRPr lang="ko-KR" altLang="en-US"/>
           </a:p>
@@ -5533,7 +5533,7 @@
           <a:p>
             <a:fld id="{C33163C4-65CF-48D2-8124-E2CEDBD7A0C5}" type="datetimeFigureOut">
               <a:rPr lang="ko-KR" altLang="en-US" smtClean="0"/>
-              <a:t>2022-11-30</a:t>
+              <a:t>2023-01-06</a:t>
             </a:fld>
             <a:endParaRPr lang="ko-KR" altLang="en-US"/>
           </a:p>
@@ -5628,7 +5628,7 @@
           <a:p>
             <a:fld id="{C33163C4-65CF-48D2-8124-E2CEDBD7A0C5}" type="datetimeFigureOut">
               <a:rPr lang="ko-KR" altLang="en-US" smtClean="0"/>
-              <a:t>2022-11-30</a:t>
+              <a:t>2023-01-06</a:t>
             </a:fld>
             <a:endParaRPr lang="ko-KR" altLang="en-US"/>
           </a:p>
@@ -5903,7 +5903,7 @@
           <a:p>
             <a:fld id="{C33163C4-65CF-48D2-8124-E2CEDBD7A0C5}" type="datetimeFigureOut">
               <a:rPr lang="ko-KR" altLang="en-US" smtClean="0"/>
-              <a:t>2022-11-30</a:t>
+              <a:t>2023-01-06</a:t>
             </a:fld>
             <a:endParaRPr lang="ko-KR" altLang="en-US"/>
           </a:p>
@@ -6155,7 +6155,7 @@
           <a:p>
             <a:fld id="{C33163C4-65CF-48D2-8124-E2CEDBD7A0C5}" type="datetimeFigureOut">
               <a:rPr lang="ko-KR" altLang="en-US" smtClean="0"/>
-              <a:t>2022-11-30</a:t>
+              <a:t>2023-01-06</a:t>
             </a:fld>
             <a:endParaRPr lang="ko-KR" altLang="en-US"/>
           </a:p>
@@ -6390,7 +6390,7 @@
           <a:p>
             <a:fld id="{C33163C4-65CF-48D2-8124-E2CEDBD7A0C5}" type="datetimeFigureOut">
               <a:rPr lang="ko-KR" altLang="en-US" smtClean="0"/>
-              <a:t>2022-11-30</a:t>
+              <a:t>2023-01-06</a:t>
             </a:fld>
             <a:endParaRPr lang="ko-KR" altLang="en-US"/>
           </a:p>
@@ -6900,7 +6900,7 @@
           <a:p>
             <a:fld id="{29936F60-83FB-4643-B7D2-F169DF4090A4}" type="datetimeFigureOut">
               <a:rPr lang="ko-KR" altLang="en-US" smtClean="0"/>
-              <a:t>2022-11-30</a:t>
+              <a:t>2023-01-06</a:t>
             </a:fld>
             <a:endParaRPr lang="ko-KR" altLang="en-US"/>
           </a:p>
@@ -9040,631 +9040,742 @@
           </a:p>
         </p:txBody>
       </p:sp>
-      <p:pic>
-        <p:nvPicPr>
-          <p:cNvPr id="5" name="그림 4"/>
-          <p:cNvPicPr>
-            <a:picLocks noChangeAspect="1"/>
-          </p:cNvPicPr>
+      <p:grpSp>
+        <p:nvGrpSpPr>
+          <p:cNvPr id="20" name="그룹 19"/>
+          <p:cNvGrpSpPr/>
           <p:nvPr/>
-        </p:nvPicPr>
-        <p:blipFill>
-          <a:blip r:embed="rId2">
-            <a:extLst>
-              <a:ext uri="{28A0092B-C50C-407E-A947-70E740481C1C}">
-                <a14:useLocalDpi xmlns:a14="http://schemas.microsoft.com/office/drawing/2010/main" val="0"/>
-              </a:ext>
-            </a:extLst>
-          </a:blip>
-          <a:stretch>
-            <a:fillRect/>
-          </a:stretch>
-        </p:blipFill>
-        <p:spPr>
+        </p:nvGrpSpPr>
+        <p:grpSpPr>
           <a:xfrm>
-            <a:off x="508382" y="1880470"/>
-            <a:ext cx="17271235" cy="10278909"/>
+            <a:off x="508381" y="1880470"/>
+            <a:ext cx="17271236" cy="10408841"/>
+            <a:chOff x="508381" y="1880470"/>
+            <a:chExt cx="17271236" cy="10408841"/>
           </a:xfrm>
-          <a:prstGeom prst="rect">
-            <a:avLst/>
-          </a:prstGeom>
-        </p:spPr>
-      </p:pic>
-      <p:pic>
-        <p:nvPicPr>
-          <p:cNvPr id="6" name="그림 5"/>
-          <p:cNvPicPr>
-            <a:picLocks noChangeAspect="1"/>
-          </p:cNvPicPr>
-          <p:nvPr/>
-        </p:nvPicPr>
-        <p:blipFill>
-          <a:blip r:embed="rId3">
-            <a:extLst>
-              <a:ext uri="{28A0092B-C50C-407E-A947-70E740481C1C}">
-                <a14:useLocalDpi xmlns:a14="http://schemas.microsoft.com/office/drawing/2010/main" val="0"/>
-              </a:ext>
-            </a:extLst>
-          </a:blip>
-          <a:stretch>
-            <a:fillRect/>
-          </a:stretch>
-        </p:blipFill>
-        <p:spPr>
-          <a:xfrm>
-            <a:off x="10521950" y="2915729"/>
-            <a:ext cx="7066643" cy="6444716"/>
-          </a:xfrm>
-          <a:prstGeom prst="rect">
-            <a:avLst/>
-          </a:prstGeom>
-          <a:ln w="63500">
-            <a:solidFill>
-              <a:srgbClr val="C00000"/>
-            </a:solidFill>
-          </a:ln>
-        </p:spPr>
-      </p:pic>
-      <p:sp>
-        <p:nvSpPr>
-          <p:cNvPr id="7" name="직사각형 6"/>
-          <p:cNvSpPr/>
-          <p:nvPr/>
-        </p:nvSpPr>
-        <p:spPr>
-          <a:xfrm>
-            <a:off x="791072" y="11088377"/>
-            <a:ext cx="1008112" cy="324036"/>
-          </a:xfrm>
-          <a:prstGeom prst="rect">
-            <a:avLst/>
-          </a:prstGeom>
-          <a:noFill/>
-          <a:ln>
-            <a:solidFill>
-              <a:srgbClr val="C00000"/>
-            </a:solidFill>
-          </a:ln>
-        </p:spPr>
-        <p:style>
-          <a:lnRef idx="2">
-            <a:schemeClr val="accent1">
-              <a:shade val="50000"/>
-            </a:schemeClr>
-          </a:lnRef>
-          <a:fillRef idx="1">
-            <a:schemeClr val="accent1"/>
-          </a:fillRef>
-          <a:effectRef idx="0">
-            <a:schemeClr val="accent1"/>
-          </a:effectRef>
-          <a:fontRef idx="minor">
-            <a:schemeClr val="lt1"/>
-          </a:fontRef>
-        </p:style>
-        <p:txBody>
-          <a:bodyPr rtlCol="0" anchor="ctr"/>
-          <a:lstStyle/>
-          <a:p>
-            <a:pPr algn="ctr"/>
-            <a:endParaRPr lang="ko-KR" altLang="en-US"/>
-          </a:p>
-        </p:txBody>
-      </p:sp>
-      <p:sp>
-        <p:nvSpPr>
-          <p:cNvPr id="8" name="직사각형 7"/>
-          <p:cNvSpPr/>
-          <p:nvPr/>
-        </p:nvSpPr>
-        <p:spPr>
-          <a:xfrm>
-            <a:off x="508381" y="11968786"/>
-            <a:ext cx="2872993" cy="185114"/>
-          </a:xfrm>
-          <a:prstGeom prst="rect">
-            <a:avLst/>
-          </a:prstGeom>
-          <a:noFill/>
-          <a:ln>
-            <a:solidFill>
-              <a:srgbClr val="C00000"/>
-            </a:solidFill>
-          </a:ln>
-        </p:spPr>
-        <p:style>
-          <a:lnRef idx="2">
-            <a:schemeClr val="accent1">
-              <a:shade val="50000"/>
-            </a:schemeClr>
-          </a:lnRef>
-          <a:fillRef idx="1">
-            <a:schemeClr val="accent1"/>
-          </a:fillRef>
-          <a:effectRef idx="0">
-            <a:schemeClr val="accent1"/>
-          </a:effectRef>
-          <a:fontRef idx="minor">
-            <a:schemeClr val="lt1"/>
-          </a:fontRef>
-        </p:style>
-        <p:txBody>
-          <a:bodyPr rtlCol="0" anchor="ctr"/>
-          <a:lstStyle/>
-          <a:p>
-            <a:pPr algn="ctr"/>
-            <a:endParaRPr lang="ko-KR" altLang="en-US"/>
-          </a:p>
-        </p:txBody>
-      </p:sp>
-      <p:sp>
-        <p:nvSpPr>
-          <p:cNvPr id="11" name="직사각형 10"/>
-          <p:cNvSpPr/>
-          <p:nvPr/>
-        </p:nvSpPr>
-        <p:spPr>
-          <a:xfrm>
-            <a:off x="1799184" y="2295525"/>
-            <a:ext cx="10081120" cy="152400"/>
-          </a:xfrm>
-          <a:prstGeom prst="rect">
-            <a:avLst/>
-          </a:prstGeom>
-          <a:solidFill>
-            <a:schemeClr val="tx1"/>
-          </a:solidFill>
-          <a:ln>
-            <a:noFill/>
-          </a:ln>
-        </p:spPr>
-        <p:style>
-          <a:lnRef idx="2">
-            <a:schemeClr val="accent1">
-              <a:shade val="50000"/>
-            </a:schemeClr>
-          </a:lnRef>
-          <a:fillRef idx="1">
-            <a:schemeClr val="accent1"/>
-          </a:fillRef>
-          <a:effectRef idx="0">
-            <a:schemeClr val="accent1"/>
-          </a:effectRef>
-          <a:fontRef idx="minor">
-            <a:schemeClr val="lt1"/>
-          </a:fontRef>
-        </p:style>
-        <p:txBody>
-          <a:bodyPr rtlCol="0" anchor="ctr"/>
-          <a:lstStyle/>
-          <a:p>
-            <a:pPr algn="ctr"/>
-            <a:endParaRPr lang="ko-KR" altLang="en-US"/>
-          </a:p>
-        </p:txBody>
-      </p:sp>
-      <p:sp>
-        <p:nvSpPr>
-          <p:cNvPr id="13" name="직사각형 12"/>
-          <p:cNvSpPr/>
-          <p:nvPr/>
-        </p:nvSpPr>
-        <p:spPr>
-          <a:xfrm>
-            <a:off x="646659" y="1952625"/>
-            <a:ext cx="1886991" cy="171450"/>
-          </a:xfrm>
-          <a:prstGeom prst="rect">
-            <a:avLst/>
-          </a:prstGeom>
-          <a:solidFill>
-            <a:schemeClr val="tx1"/>
-          </a:solidFill>
-          <a:ln>
-            <a:noFill/>
-          </a:ln>
-        </p:spPr>
-        <p:style>
-          <a:lnRef idx="2">
-            <a:schemeClr val="accent1">
-              <a:shade val="50000"/>
-            </a:schemeClr>
-          </a:lnRef>
-          <a:fillRef idx="1">
-            <a:schemeClr val="accent1"/>
-          </a:fillRef>
-          <a:effectRef idx="0">
-            <a:schemeClr val="accent1"/>
-          </a:effectRef>
-          <a:fontRef idx="minor">
-            <a:schemeClr val="lt1"/>
-          </a:fontRef>
-        </p:style>
-        <p:txBody>
-          <a:bodyPr rtlCol="0" anchor="ctr"/>
-          <a:lstStyle/>
-          <a:p>
-            <a:pPr algn="ctr"/>
-            <a:endParaRPr lang="ko-KR" altLang="en-US"/>
-          </a:p>
-        </p:txBody>
-      </p:sp>
-      <p:sp>
-        <p:nvSpPr>
-          <p:cNvPr id="14" name="직사각형 13"/>
-          <p:cNvSpPr/>
-          <p:nvPr/>
-        </p:nvSpPr>
-        <p:spPr>
-          <a:xfrm>
-            <a:off x="10575715" y="2971800"/>
-            <a:ext cx="1628986" cy="165100"/>
-          </a:xfrm>
-          <a:prstGeom prst="rect">
-            <a:avLst/>
-          </a:prstGeom>
-          <a:solidFill>
-            <a:schemeClr val="tx1"/>
-          </a:solidFill>
-          <a:ln>
-            <a:noFill/>
-          </a:ln>
-        </p:spPr>
-        <p:style>
-          <a:lnRef idx="2">
-            <a:schemeClr val="accent1">
-              <a:shade val="50000"/>
-            </a:schemeClr>
-          </a:lnRef>
-          <a:fillRef idx="1">
-            <a:schemeClr val="accent1"/>
-          </a:fillRef>
-          <a:effectRef idx="0">
-            <a:schemeClr val="accent1"/>
-          </a:effectRef>
-          <a:fontRef idx="minor">
-            <a:schemeClr val="lt1"/>
-          </a:fontRef>
-        </p:style>
-        <p:txBody>
-          <a:bodyPr rtlCol="0" anchor="ctr"/>
-          <a:lstStyle/>
-          <a:p>
-            <a:pPr algn="ctr"/>
-            <a:endParaRPr lang="ko-KR" altLang="en-US"/>
-          </a:p>
-        </p:txBody>
-      </p:sp>
-      <p:cxnSp>
-        <p:nvCxnSpPr>
-          <p:cNvPr id="16" name="직선 화살표 연결선 15"/>
-          <p:cNvCxnSpPr>
-            <a:stCxn id="7" idx="2"/>
-          </p:cNvCxnSpPr>
-          <p:nvPr/>
-        </p:nvCxnSpPr>
-        <p:spPr>
-          <a:xfrm>
-            <a:off x="1295128" y="11412413"/>
-            <a:ext cx="0" cy="556373"/>
-          </a:xfrm>
-          <a:prstGeom prst="straightConnector1">
-            <a:avLst/>
-          </a:prstGeom>
-          <a:noFill/>
-          <a:ln w="50800">
-            <a:solidFill>
-              <a:srgbClr val="C00000"/>
-            </a:solidFill>
-            <a:tailEnd type="triangle"/>
-          </a:ln>
-        </p:spPr>
-        <p:style>
-          <a:lnRef idx="2">
-            <a:schemeClr val="accent1">
-              <a:shade val="50000"/>
-            </a:schemeClr>
-          </a:lnRef>
-          <a:fillRef idx="1">
-            <a:schemeClr val="accent1"/>
-          </a:fillRef>
-          <a:effectRef idx="0">
-            <a:schemeClr val="accent1"/>
-          </a:effectRef>
-          <a:fontRef idx="minor">
-            <a:schemeClr val="lt1"/>
-          </a:fontRef>
-        </p:style>
-      </p:cxnSp>
-      <p:cxnSp>
-        <p:nvCxnSpPr>
-          <p:cNvPr id="18" name="꺾인 연결선 17"/>
-          <p:cNvCxnSpPr>
-            <a:stCxn id="31" idx="0"/>
-            <a:endCxn id="28" idx="2"/>
-          </p:cNvCxnSpPr>
-          <p:nvPr/>
-        </p:nvCxnSpPr>
-        <p:spPr>
-          <a:xfrm rot="5400000" flipH="1" flipV="1">
-            <a:off x="5975309" y="6262454"/>
-            <a:ext cx="2604830" cy="8800812"/>
-          </a:xfrm>
-          <a:prstGeom prst="bentConnector3">
-            <a:avLst>
-              <a:gd name="adj1" fmla="val 12981"/>
-            </a:avLst>
-          </a:prstGeom>
-          <a:noFill/>
-          <a:ln w="50800">
-            <a:solidFill>
-              <a:srgbClr val="C00000"/>
-            </a:solidFill>
-            <a:tailEnd type="triangle"/>
-          </a:ln>
-        </p:spPr>
-        <p:style>
-          <a:lnRef idx="2">
-            <a:schemeClr val="accent1">
-              <a:shade val="50000"/>
-            </a:schemeClr>
-          </a:lnRef>
-          <a:fillRef idx="1">
-            <a:schemeClr val="accent1"/>
-          </a:fillRef>
-          <a:effectRef idx="0">
-            <a:schemeClr val="accent1"/>
-          </a:effectRef>
-          <a:fontRef idx="minor">
-            <a:schemeClr val="lt1"/>
-          </a:fontRef>
-        </p:style>
-      </p:cxnSp>
-      <p:sp>
-        <p:nvSpPr>
-          <p:cNvPr id="24" name="TextBox 23"/>
-          <p:cNvSpPr txBox="1"/>
-          <p:nvPr/>
-        </p:nvSpPr>
-        <p:spPr>
-          <a:xfrm>
-            <a:off x="1837652" y="11166192"/>
-            <a:ext cx="1689723" cy="307777"/>
-          </a:xfrm>
-          <a:prstGeom prst="rect">
-            <a:avLst/>
-          </a:prstGeom>
-          <a:noFill/>
-        </p:spPr>
-        <p:txBody>
-          <a:bodyPr wrap="square" lIns="0" tIns="0" rIns="0" bIns="0" rtlCol="0">
-            <a:spAutoFit/>
-          </a:bodyPr>
-          <a:lstStyle/>
-          <a:p>
-            <a:pPr algn="ctr"/>
-            <a:r>
-              <a:rPr lang="ko-KR" altLang="en-US" sz="2000" b="1" smtClean="0">
-                <a:solidFill>
-                  <a:srgbClr val="C00000"/>
-                </a:solidFill>
-              </a:rPr>
-              <a:t>①이슈클릭 </a:t>
-            </a:r>
-            <a:r>
-              <a:rPr lang="ko-KR" altLang="en-US" sz="2000" b="1">
-                <a:solidFill>
-                  <a:srgbClr val="C00000"/>
-                </a:solidFill>
-              </a:rPr>
-              <a:t>시</a:t>
-            </a:r>
-            <a:endParaRPr lang="ko-KR" altLang="en-US" sz="2000" b="1" smtClean="0">
+        </p:grpSpPr>
+        <p:pic>
+          <p:nvPicPr>
+            <p:cNvPr id="5" name="그림 4"/>
+            <p:cNvPicPr>
+              <a:picLocks noChangeAspect="1"/>
+            </p:cNvPicPr>
+            <p:nvPr/>
+          </p:nvPicPr>
+          <p:blipFill>
+            <a:blip r:embed="rId2">
+              <a:extLst>
+                <a:ext uri="{28A0092B-C50C-407E-A947-70E740481C1C}">
+                  <a14:useLocalDpi xmlns:a14="http://schemas.microsoft.com/office/drawing/2010/main" val="0"/>
+                </a:ext>
+              </a:extLst>
+            </a:blip>
+            <a:stretch>
+              <a:fillRect/>
+            </a:stretch>
+          </p:blipFill>
+          <p:spPr>
+            <a:xfrm>
+              <a:off x="508382" y="1880470"/>
+              <a:ext cx="17271235" cy="10278909"/>
+            </a:xfrm>
+            <a:prstGeom prst="rect">
+              <a:avLst/>
+            </a:prstGeom>
+          </p:spPr>
+        </p:pic>
+        <p:pic>
+          <p:nvPicPr>
+            <p:cNvPr id="6" name="그림 5"/>
+            <p:cNvPicPr>
+              <a:picLocks noChangeAspect="1"/>
+            </p:cNvPicPr>
+            <p:nvPr/>
+          </p:nvPicPr>
+          <p:blipFill>
+            <a:blip r:embed="rId3">
+              <a:extLst>
+                <a:ext uri="{28A0092B-C50C-407E-A947-70E740481C1C}">
+                  <a14:useLocalDpi xmlns:a14="http://schemas.microsoft.com/office/drawing/2010/main" val="0"/>
+                </a:ext>
+              </a:extLst>
+            </a:blip>
+            <a:stretch>
+              <a:fillRect/>
+            </a:stretch>
+          </p:blipFill>
+          <p:spPr>
+            <a:xfrm>
+              <a:off x="11556899" y="2023407"/>
+              <a:ext cx="6111343" cy="5573491"/>
+            </a:xfrm>
+            <a:prstGeom prst="rect">
+              <a:avLst/>
+            </a:prstGeom>
+            <a:ln w="50800">
               <a:solidFill>
                 <a:srgbClr val="C00000"/>
               </a:solidFill>
-            </a:endParaRPr>
-          </a:p>
-        </p:txBody>
-      </p:sp>
-      <p:sp>
-        <p:nvSpPr>
-          <p:cNvPr id="25" name="TextBox 24"/>
-          <p:cNvSpPr txBox="1"/>
-          <p:nvPr/>
-        </p:nvSpPr>
-        <p:spPr>
-          <a:xfrm>
-            <a:off x="3668334" y="11683462"/>
-            <a:ext cx="2919381" cy="307777"/>
-          </a:xfrm>
-          <a:prstGeom prst="rect">
-            <a:avLst/>
-          </a:prstGeom>
-          <a:noFill/>
-        </p:spPr>
-        <p:txBody>
-          <a:bodyPr wrap="square" lIns="0" tIns="0" rIns="0" bIns="0" rtlCol="0">
-            <a:spAutoFit/>
-          </a:bodyPr>
-          <a:lstStyle/>
-          <a:p>
-            <a:pPr algn="ctr"/>
-            <a:r>
-              <a:rPr lang="ko-KR" altLang="en-US" sz="2000" b="1" smtClean="0">
-                <a:solidFill>
-                  <a:srgbClr val="C00000"/>
-                </a:solidFill>
-              </a:rPr>
-              <a:t>②링크된 </a:t>
-            </a:r>
-            <a:r>
-              <a:rPr lang="en-US" altLang="ko-KR" sz="2000" b="1">
-                <a:solidFill>
-                  <a:srgbClr val="C00000"/>
-                </a:solidFill>
-              </a:rPr>
-              <a:t>Github </a:t>
-            </a:r>
-            <a:r>
-              <a:rPr lang="ko-KR" altLang="en-US" sz="2000" b="1" smtClean="0">
-                <a:solidFill>
-                  <a:srgbClr val="C00000"/>
-                </a:solidFill>
-              </a:rPr>
-              <a:t>이슈를</a:t>
-            </a:r>
-            <a:endParaRPr lang="ko-KR" altLang="en-US" sz="2000" b="1" smtClean="0">
+            </a:ln>
+          </p:spPr>
+        </p:pic>
+        <p:sp>
+          <p:nvSpPr>
+            <p:cNvPr id="7" name="직사각형 6"/>
+            <p:cNvSpPr/>
+            <p:nvPr/>
+          </p:nvSpPr>
+          <p:spPr>
+            <a:xfrm>
+              <a:off x="791072" y="11088377"/>
+              <a:ext cx="1008112" cy="324036"/>
+            </a:xfrm>
+            <a:prstGeom prst="rect">
+              <a:avLst/>
+            </a:prstGeom>
+            <a:noFill/>
+            <a:ln>
               <a:solidFill>
                 <a:srgbClr val="C00000"/>
               </a:solidFill>
-            </a:endParaRPr>
-          </a:p>
-        </p:txBody>
-      </p:sp>
-      <p:sp>
-        <p:nvSpPr>
-          <p:cNvPr id="26" name="TextBox 25"/>
-          <p:cNvSpPr txBox="1"/>
-          <p:nvPr/>
-        </p:nvSpPr>
-        <p:spPr>
-          <a:xfrm>
-            <a:off x="11880304" y="9432193"/>
-            <a:ext cx="3316283" cy="615553"/>
-          </a:xfrm>
-          <a:prstGeom prst="rect">
-            <a:avLst/>
-          </a:prstGeom>
-          <a:noFill/>
-        </p:spPr>
-        <p:txBody>
-          <a:bodyPr wrap="square" lIns="0" tIns="0" rIns="0" bIns="0" rtlCol="0">
-            <a:spAutoFit/>
-          </a:bodyPr>
-          <a:lstStyle/>
-          <a:p>
-            <a:pPr algn="ctr"/>
-            <a:r>
-              <a:rPr lang="ko-KR" altLang="en-US" sz="2000" b="1" smtClean="0">
-                <a:solidFill>
-                  <a:srgbClr val="C00000"/>
-                </a:solidFill>
-              </a:rPr>
-              <a:t>③ 새창에 열어 이슈상세를 </a:t>
-            </a:r>
-            <a:r>
-              <a:rPr lang="en-US" altLang="ko-KR" sz="2000" b="1" smtClean="0">
-                <a:solidFill>
-                  <a:srgbClr val="C00000"/>
-                </a:solidFill>
-              </a:rPr>
-              <a:t>OneClick</a:t>
-            </a:r>
-            <a:r>
-              <a:rPr lang="ko-KR" altLang="en-US" sz="2000" b="1" smtClean="0">
-                <a:solidFill>
-                  <a:srgbClr val="C00000"/>
-                </a:solidFill>
-              </a:rPr>
-              <a:t>으로 확인가능</a:t>
-            </a:r>
-            <a:endParaRPr lang="ko-KR" altLang="en-US" sz="2000" b="1" smtClean="0">
+            </a:ln>
+          </p:spPr>
+          <p:style>
+            <a:lnRef idx="2">
+              <a:schemeClr val="accent1">
+                <a:shade val="50000"/>
+              </a:schemeClr>
+            </a:lnRef>
+            <a:fillRef idx="1">
+              <a:schemeClr val="accent1"/>
+            </a:fillRef>
+            <a:effectRef idx="0">
+              <a:schemeClr val="accent1"/>
+            </a:effectRef>
+            <a:fontRef idx="minor">
+              <a:schemeClr val="lt1"/>
+            </a:fontRef>
+          </p:style>
+          <p:txBody>
+            <a:bodyPr rtlCol="0" anchor="ctr"/>
+            <a:lstStyle/>
+            <a:p>
+              <a:pPr algn="ctr"/>
+              <a:endParaRPr lang="ko-KR" altLang="en-US"/>
+            </a:p>
+          </p:txBody>
+        </p:sp>
+        <p:sp>
+          <p:nvSpPr>
+            <p:cNvPr id="8" name="직사각형 7"/>
+            <p:cNvSpPr/>
+            <p:nvPr/>
+          </p:nvSpPr>
+          <p:spPr>
+            <a:xfrm>
+              <a:off x="508381" y="11968786"/>
+              <a:ext cx="2872993" cy="185114"/>
+            </a:xfrm>
+            <a:prstGeom prst="rect">
+              <a:avLst/>
+            </a:prstGeom>
+            <a:noFill/>
+            <a:ln>
               <a:solidFill>
                 <a:srgbClr val="C00000"/>
               </a:solidFill>
-            </a:endParaRPr>
-          </a:p>
-        </p:txBody>
-      </p:sp>
-      <p:sp>
-        <p:nvSpPr>
-          <p:cNvPr id="28" name="직사각형 27"/>
-          <p:cNvSpPr/>
-          <p:nvPr/>
-        </p:nvSpPr>
-        <p:spPr>
-          <a:xfrm>
-            <a:off x="11174074" y="9036409"/>
-            <a:ext cx="1008112" cy="324036"/>
-          </a:xfrm>
-          <a:prstGeom prst="rect">
-            <a:avLst/>
-          </a:prstGeom>
-          <a:noFill/>
-          <a:ln>
+            </a:ln>
+          </p:spPr>
+          <p:style>
+            <a:lnRef idx="2">
+              <a:schemeClr val="accent1">
+                <a:shade val="50000"/>
+              </a:schemeClr>
+            </a:lnRef>
+            <a:fillRef idx="1">
+              <a:schemeClr val="accent1"/>
+            </a:fillRef>
+            <a:effectRef idx="0">
+              <a:schemeClr val="accent1"/>
+            </a:effectRef>
+            <a:fontRef idx="minor">
+              <a:schemeClr val="lt1"/>
+            </a:fontRef>
+          </p:style>
+          <p:txBody>
+            <a:bodyPr rtlCol="0" anchor="ctr"/>
+            <a:lstStyle/>
+            <a:p>
+              <a:pPr algn="ctr"/>
+              <a:endParaRPr lang="ko-KR" altLang="en-US"/>
+            </a:p>
+          </p:txBody>
+        </p:sp>
+        <p:sp>
+          <p:nvSpPr>
+            <p:cNvPr id="11" name="직사각형 10"/>
+            <p:cNvSpPr/>
+            <p:nvPr/>
+          </p:nvSpPr>
+          <p:spPr>
+            <a:xfrm>
+              <a:off x="1799184" y="2295525"/>
+              <a:ext cx="10081120" cy="152400"/>
+            </a:xfrm>
+            <a:prstGeom prst="rect">
+              <a:avLst/>
+            </a:prstGeom>
+            <a:solidFill>
+              <a:schemeClr val="tx1"/>
+            </a:solidFill>
+            <a:ln>
+              <a:noFill/>
+            </a:ln>
+          </p:spPr>
+          <p:style>
+            <a:lnRef idx="2">
+              <a:schemeClr val="accent1">
+                <a:shade val="50000"/>
+              </a:schemeClr>
+            </a:lnRef>
+            <a:fillRef idx="1">
+              <a:schemeClr val="accent1"/>
+            </a:fillRef>
+            <a:effectRef idx="0">
+              <a:schemeClr val="accent1"/>
+            </a:effectRef>
+            <a:fontRef idx="minor">
+              <a:schemeClr val="lt1"/>
+            </a:fontRef>
+          </p:style>
+          <p:txBody>
+            <a:bodyPr rtlCol="0" anchor="ctr"/>
+            <a:lstStyle/>
+            <a:p>
+              <a:pPr algn="ctr"/>
+              <a:endParaRPr lang="ko-KR" altLang="en-US"/>
+            </a:p>
+          </p:txBody>
+        </p:sp>
+        <p:sp>
+          <p:nvSpPr>
+            <p:cNvPr id="13" name="직사각형 12"/>
+            <p:cNvSpPr/>
+            <p:nvPr/>
+          </p:nvSpPr>
+          <p:spPr>
+            <a:xfrm>
+              <a:off x="646659" y="1952625"/>
+              <a:ext cx="1886991" cy="171450"/>
+            </a:xfrm>
+            <a:prstGeom prst="rect">
+              <a:avLst/>
+            </a:prstGeom>
+            <a:solidFill>
+              <a:schemeClr val="tx1"/>
+            </a:solidFill>
+            <a:ln>
+              <a:noFill/>
+            </a:ln>
+          </p:spPr>
+          <p:style>
+            <a:lnRef idx="2">
+              <a:schemeClr val="accent1">
+                <a:shade val="50000"/>
+              </a:schemeClr>
+            </a:lnRef>
+            <a:fillRef idx="1">
+              <a:schemeClr val="accent1"/>
+            </a:fillRef>
+            <a:effectRef idx="0">
+              <a:schemeClr val="accent1"/>
+            </a:effectRef>
+            <a:fontRef idx="minor">
+              <a:schemeClr val="lt1"/>
+            </a:fontRef>
+          </p:style>
+          <p:txBody>
+            <a:bodyPr rtlCol="0" anchor="ctr"/>
+            <a:lstStyle/>
+            <a:p>
+              <a:pPr algn="ctr"/>
+              <a:endParaRPr lang="ko-KR" altLang="en-US"/>
+            </a:p>
+          </p:txBody>
+        </p:sp>
+        <p:sp>
+          <p:nvSpPr>
+            <p:cNvPr id="14" name="직사각형 13"/>
+            <p:cNvSpPr/>
+            <p:nvPr/>
+          </p:nvSpPr>
+          <p:spPr>
+            <a:xfrm>
+              <a:off x="10575715" y="2971800"/>
+              <a:ext cx="1628986" cy="165100"/>
+            </a:xfrm>
+            <a:prstGeom prst="rect">
+              <a:avLst/>
+            </a:prstGeom>
+            <a:solidFill>
+              <a:schemeClr val="tx1"/>
+            </a:solidFill>
+            <a:ln>
+              <a:noFill/>
+            </a:ln>
+          </p:spPr>
+          <p:style>
+            <a:lnRef idx="2">
+              <a:schemeClr val="accent1">
+                <a:shade val="50000"/>
+              </a:schemeClr>
+            </a:lnRef>
+            <a:fillRef idx="1">
+              <a:schemeClr val="accent1"/>
+            </a:fillRef>
+            <a:effectRef idx="0">
+              <a:schemeClr val="accent1"/>
+            </a:effectRef>
+            <a:fontRef idx="minor">
+              <a:schemeClr val="lt1"/>
+            </a:fontRef>
+          </p:style>
+          <p:txBody>
+            <a:bodyPr rtlCol="0" anchor="ctr"/>
+            <a:lstStyle/>
+            <a:p>
+              <a:pPr algn="ctr"/>
+              <a:endParaRPr lang="ko-KR" altLang="en-US"/>
+            </a:p>
+          </p:txBody>
+        </p:sp>
+        <p:cxnSp>
+          <p:nvCxnSpPr>
+            <p:cNvPr id="16" name="직선 화살표 연결선 15"/>
+            <p:cNvCxnSpPr>
+              <a:stCxn id="7" idx="2"/>
+            </p:cNvCxnSpPr>
+            <p:nvPr/>
+          </p:nvCxnSpPr>
+          <p:spPr>
+            <a:xfrm>
+              <a:off x="1295128" y="11412413"/>
+              <a:ext cx="0" cy="556373"/>
+            </a:xfrm>
+            <a:prstGeom prst="straightConnector1">
+              <a:avLst/>
+            </a:prstGeom>
             <a:noFill/>
-          </a:ln>
-        </p:spPr>
-        <p:style>
-          <a:lnRef idx="2">
-            <a:schemeClr val="accent1">
-              <a:shade val="50000"/>
-            </a:schemeClr>
-          </a:lnRef>
-          <a:fillRef idx="1">
-            <a:schemeClr val="accent1"/>
-          </a:fillRef>
-          <a:effectRef idx="0">
-            <a:schemeClr val="accent1"/>
-          </a:effectRef>
-          <a:fontRef idx="minor">
-            <a:schemeClr val="lt1"/>
-          </a:fontRef>
-        </p:style>
-        <p:txBody>
-          <a:bodyPr rtlCol="0" anchor="ctr"/>
-          <a:lstStyle/>
-          <a:p>
-            <a:pPr algn="ctr"/>
-            <a:endParaRPr lang="ko-KR" altLang="en-US"/>
-          </a:p>
-        </p:txBody>
-      </p:sp>
-      <p:sp>
-        <p:nvSpPr>
-          <p:cNvPr id="31" name="직사각형 30"/>
-          <p:cNvSpPr/>
-          <p:nvPr/>
-        </p:nvSpPr>
-        <p:spPr>
-          <a:xfrm>
-            <a:off x="2373262" y="11965275"/>
-            <a:ext cx="1008112" cy="324036"/>
-          </a:xfrm>
-          <a:prstGeom prst="rect">
-            <a:avLst/>
-          </a:prstGeom>
-          <a:noFill/>
-          <a:ln>
+            <a:ln w="50800">
+              <a:solidFill>
+                <a:srgbClr val="C00000"/>
+              </a:solidFill>
+              <a:tailEnd type="triangle"/>
+            </a:ln>
+          </p:spPr>
+          <p:style>
+            <a:lnRef idx="2">
+              <a:schemeClr val="accent1">
+                <a:shade val="50000"/>
+              </a:schemeClr>
+            </a:lnRef>
+            <a:fillRef idx="1">
+              <a:schemeClr val="accent1"/>
+            </a:fillRef>
+            <a:effectRef idx="0">
+              <a:schemeClr val="accent1"/>
+            </a:effectRef>
+            <a:fontRef idx="minor">
+              <a:schemeClr val="lt1"/>
+            </a:fontRef>
+          </p:style>
+        </p:cxnSp>
+        <p:cxnSp>
+          <p:nvCxnSpPr>
+            <p:cNvPr id="18" name="꺾인 연결선 17"/>
+            <p:cNvCxnSpPr>
+              <a:stCxn id="8" idx="3"/>
+              <a:endCxn id="6" idx="1"/>
+            </p:cNvCxnSpPr>
+            <p:nvPr/>
+          </p:nvCxnSpPr>
+          <p:spPr>
+            <a:xfrm flipV="1">
+              <a:off x="3381374" y="4810153"/>
+              <a:ext cx="8175525" cy="7251190"/>
+            </a:xfrm>
+            <a:prstGeom prst="bentConnector3">
+              <a:avLst>
+                <a:gd name="adj1" fmla="val 50000"/>
+              </a:avLst>
+            </a:prstGeom>
             <a:noFill/>
-          </a:ln>
-        </p:spPr>
-        <p:style>
-          <a:lnRef idx="2">
-            <a:schemeClr val="accent1">
-              <a:shade val="50000"/>
-            </a:schemeClr>
-          </a:lnRef>
-          <a:fillRef idx="1">
-            <a:schemeClr val="accent1"/>
-          </a:fillRef>
-          <a:effectRef idx="0">
-            <a:schemeClr val="accent1"/>
-          </a:effectRef>
-          <a:fontRef idx="minor">
-            <a:schemeClr val="lt1"/>
-          </a:fontRef>
-        </p:style>
-        <p:txBody>
-          <a:bodyPr rtlCol="0" anchor="ctr"/>
-          <a:lstStyle/>
-          <a:p>
-            <a:pPr algn="ctr"/>
-            <a:endParaRPr lang="ko-KR" altLang="en-US"/>
-          </a:p>
-        </p:txBody>
-      </p:sp>
+            <a:ln w="50800">
+              <a:solidFill>
+                <a:srgbClr val="C00000"/>
+              </a:solidFill>
+              <a:tailEnd type="triangle"/>
+            </a:ln>
+          </p:spPr>
+          <p:style>
+            <a:lnRef idx="2">
+              <a:schemeClr val="accent1">
+                <a:shade val="50000"/>
+              </a:schemeClr>
+            </a:lnRef>
+            <a:fillRef idx="1">
+              <a:schemeClr val="accent1"/>
+            </a:fillRef>
+            <a:effectRef idx="0">
+              <a:schemeClr val="accent1"/>
+            </a:effectRef>
+            <a:fontRef idx="minor">
+              <a:schemeClr val="lt1"/>
+            </a:fontRef>
+          </p:style>
+        </p:cxnSp>
+        <p:sp>
+          <p:nvSpPr>
+            <p:cNvPr id="24" name="TextBox 23"/>
+            <p:cNvSpPr txBox="1"/>
+            <p:nvPr/>
+          </p:nvSpPr>
+          <p:spPr>
+            <a:xfrm>
+              <a:off x="508381" y="10518305"/>
+              <a:ext cx="2834524" cy="492443"/>
+            </a:xfrm>
+            <a:prstGeom prst="rect">
+              <a:avLst/>
+            </a:prstGeom>
+            <a:noFill/>
+          </p:spPr>
+          <p:txBody>
+            <a:bodyPr wrap="square" lIns="0" tIns="0" rIns="0" bIns="0" rtlCol="0">
+              <a:spAutoFit/>
+            </a:bodyPr>
+            <a:lstStyle/>
+            <a:p>
+              <a:pPr algn="ctr"/>
+              <a:r>
+                <a:rPr lang="ko-KR" altLang="en-US" sz="3200" b="1" smtClean="0">
+                  <a:solidFill>
+                    <a:srgbClr val="C00000"/>
+                  </a:solidFill>
+                </a:rPr>
+                <a:t>①이슈클릭 </a:t>
+              </a:r>
+              <a:r>
+                <a:rPr lang="ko-KR" altLang="en-US" sz="3200" b="1">
+                  <a:solidFill>
+                    <a:srgbClr val="C00000"/>
+                  </a:solidFill>
+                </a:rPr>
+                <a:t>시</a:t>
+              </a:r>
+              <a:endParaRPr lang="ko-KR" altLang="en-US" sz="3200" b="1" smtClean="0">
+                <a:solidFill>
+                  <a:srgbClr val="C00000"/>
+                </a:solidFill>
+              </a:endParaRPr>
+            </a:p>
+          </p:txBody>
+        </p:sp>
+        <p:sp>
+          <p:nvSpPr>
+            <p:cNvPr id="25" name="TextBox 24"/>
+            <p:cNvSpPr txBox="1"/>
+            <p:nvPr/>
+          </p:nvSpPr>
+          <p:spPr>
+            <a:xfrm>
+              <a:off x="2533650" y="11479597"/>
+              <a:ext cx="4818186" cy="492443"/>
+            </a:xfrm>
+            <a:prstGeom prst="rect">
+              <a:avLst/>
+            </a:prstGeom>
+            <a:noFill/>
+          </p:spPr>
+          <p:txBody>
+            <a:bodyPr wrap="square" lIns="0" tIns="0" rIns="0" bIns="0" rtlCol="0">
+              <a:spAutoFit/>
+            </a:bodyPr>
+            <a:lstStyle/>
+            <a:p>
+              <a:pPr algn="ctr"/>
+              <a:r>
+                <a:rPr lang="ko-KR" altLang="en-US" sz="3200" b="1" smtClean="0">
+                  <a:solidFill>
+                    <a:srgbClr val="C00000"/>
+                  </a:solidFill>
+                </a:rPr>
+                <a:t>②링크된 </a:t>
+              </a:r>
+              <a:r>
+                <a:rPr lang="en-US" altLang="ko-KR" sz="3200" b="1">
+                  <a:solidFill>
+                    <a:srgbClr val="C00000"/>
+                  </a:solidFill>
+                </a:rPr>
+                <a:t>Github </a:t>
+              </a:r>
+              <a:r>
+                <a:rPr lang="ko-KR" altLang="en-US" sz="3200" b="1" smtClean="0">
+                  <a:solidFill>
+                    <a:srgbClr val="C00000"/>
+                  </a:solidFill>
+                </a:rPr>
+                <a:t>이슈를</a:t>
+              </a:r>
+            </a:p>
+          </p:txBody>
+        </p:sp>
+        <p:sp>
+          <p:nvSpPr>
+            <p:cNvPr id="26" name="TextBox 25"/>
+            <p:cNvSpPr txBox="1"/>
+            <p:nvPr/>
+          </p:nvSpPr>
+          <p:spPr>
+            <a:xfrm>
+              <a:off x="6390545" y="3716669"/>
+              <a:ext cx="5473239" cy="984885"/>
+            </a:xfrm>
+            <a:prstGeom prst="rect">
+              <a:avLst/>
+            </a:prstGeom>
+            <a:noFill/>
+          </p:spPr>
+          <p:txBody>
+            <a:bodyPr wrap="square" lIns="0" tIns="0" rIns="0" bIns="0" rtlCol="0">
+              <a:spAutoFit/>
+            </a:bodyPr>
+            <a:lstStyle/>
+            <a:p>
+              <a:pPr algn="ctr"/>
+              <a:r>
+                <a:rPr lang="ko-KR" altLang="en-US" sz="3200" b="1" smtClean="0">
+                  <a:solidFill>
+                    <a:srgbClr val="C00000"/>
+                  </a:solidFill>
+                </a:rPr>
+                <a:t>③ 새창에 열어 </a:t>
+              </a:r>
+              <a:r>
+                <a:rPr lang="ko-KR" altLang="en-US" sz="3200" b="1" smtClean="0">
+                  <a:solidFill>
+                    <a:srgbClr val="C00000"/>
+                  </a:solidFill>
+                </a:rPr>
+                <a:t>이슈상세 </a:t>
+              </a:r>
+              <a:r>
+                <a:rPr lang="en-US" altLang="ko-KR" sz="3200" b="1" smtClean="0">
+                  <a:solidFill>
+                    <a:srgbClr val="C00000"/>
+                  </a:solidFill>
+                </a:rPr>
+                <a:t>OneClick</a:t>
+              </a:r>
+              <a:r>
+                <a:rPr lang="ko-KR" altLang="en-US" sz="3200" b="1" smtClean="0">
+                  <a:solidFill>
+                    <a:srgbClr val="C00000"/>
+                  </a:solidFill>
+                </a:rPr>
+                <a:t>으로 확인가능</a:t>
+              </a:r>
+            </a:p>
+          </p:txBody>
+        </p:sp>
+        <p:sp>
+          <p:nvSpPr>
+            <p:cNvPr id="28" name="직사각형 27"/>
+            <p:cNvSpPr/>
+            <p:nvPr/>
+          </p:nvSpPr>
+          <p:spPr>
+            <a:xfrm>
+              <a:off x="11174074" y="9036409"/>
+              <a:ext cx="1008112" cy="324036"/>
+            </a:xfrm>
+            <a:prstGeom prst="rect">
+              <a:avLst/>
+            </a:prstGeom>
+            <a:noFill/>
+            <a:ln>
+              <a:noFill/>
+            </a:ln>
+          </p:spPr>
+          <p:style>
+            <a:lnRef idx="2">
+              <a:schemeClr val="accent1">
+                <a:shade val="50000"/>
+              </a:schemeClr>
+            </a:lnRef>
+            <a:fillRef idx="1">
+              <a:schemeClr val="accent1"/>
+            </a:fillRef>
+            <a:effectRef idx="0">
+              <a:schemeClr val="accent1"/>
+            </a:effectRef>
+            <a:fontRef idx="minor">
+              <a:schemeClr val="lt1"/>
+            </a:fontRef>
+          </p:style>
+          <p:txBody>
+            <a:bodyPr rtlCol="0" anchor="ctr"/>
+            <a:lstStyle/>
+            <a:p>
+              <a:pPr algn="ctr"/>
+              <a:endParaRPr lang="ko-KR" altLang="en-US"/>
+            </a:p>
+          </p:txBody>
+        </p:sp>
+        <p:sp>
+          <p:nvSpPr>
+            <p:cNvPr id="31" name="직사각형 30"/>
+            <p:cNvSpPr/>
+            <p:nvPr/>
+          </p:nvSpPr>
+          <p:spPr>
+            <a:xfrm>
+              <a:off x="2373262" y="11965275"/>
+              <a:ext cx="1008112" cy="324036"/>
+            </a:xfrm>
+            <a:prstGeom prst="rect">
+              <a:avLst/>
+            </a:prstGeom>
+            <a:noFill/>
+            <a:ln>
+              <a:noFill/>
+            </a:ln>
+          </p:spPr>
+          <p:style>
+            <a:lnRef idx="2">
+              <a:schemeClr val="accent1">
+                <a:shade val="50000"/>
+              </a:schemeClr>
+            </a:lnRef>
+            <a:fillRef idx="1">
+              <a:schemeClr val="accent1"/>
+            </a:fillRef>
+            <a:effectRef idx="0">
+              <a:schemeClr val="accent1"/>
+            </a:effectRef>
+            <a:fontRef idx="minor">
+              <a:schemeClr val="lt1"/>
+            </a:fontRef>
+          </p:style>
+          <p:txBody>
+            <a:bodyPr rtlCol="0" anchor="ctr"/>
+            <a:lstStyle/>
+            <a:p>
+              <a:pPr algn="ctr"/>
+              <a:endParaRPr lang="ko-KR" altLang="en-US"/>
+            </a:p>
+          </p:txBody>
+        </p:sp>
+        <p:pic>
+          <p:nvPicPr>
+            <p:cNvPr id="19" name="그림 18"/>
+            <p:cNvPicPr>
+              <a:picLocks noChangeAspect="1"/>
+            </p:cNvPicPr>
+            <p:nvPr/>
+          </p:nvPicPr>
+          <p:blipFill>
+            <a:blip r:embed="rId4">
+              <a:extLst>
+                <a:ext uri="{28A0092B-C50C-407E-A947-70E740481C1C}">
+                  <a14:useLocalDpi xmlns:a14="http://schemas.microsoft.com/office/drawing/2010/main" val="0"/>
+                </a:ext>
+              </a:extLst>
+            </a:blip>
+            <a:stretch>
+              <a:fillRect/>
+            </a:stretch>
+          </p:blipFill>
+          <p:spPr>
+            <a:xfrm>
+              <a:off x="11556899" y="8865642"/>
+              <a:ext cx="6111343" cy="3106919"/>
+            </a:xfrm>
+            <a:prstGeom prst="rect">
+              <a:avLst/>
+            </a:prstGeom>
+            <a:ln w="50800">
+              <a:solidFill>
+                <a:srgbClr val="C00000"/>
+              </a:solidFill>
+            </a:ln>
+          </p:spPr>
+        </p:pic>
+        <p:sp>
+          <p:nvSpPr>
+            <p:cNvPr id="27" name="TextBox 26"/>
+            <p:cNvSpPr txBox="1"/>
+            <p:nvPr/>
+          </p:nvSpPr>
+          <p:spPr>
+            <a:xfrm>
+              <a:off x="11556899" y="7834799"/>
+              <a:ext cx="5948141" cy="984885"/>
+            </a:xfrm>
+            <a:prstGeom prst="rect">
+              <a:avLst/>
+            </a:prstGeom>
+            <a:noFill/>
+          </p:spPr>
+          <p:txBody>
+            <a:bodyPr wrap="square" lIns="0" tIns="0" rIns="0" bIns="0" rtlCol="0">
+              <a:spAutoFit/>
+            </a:bodyPr>
+            <a:lstStyle/>
+            <a:p>
+              <a:pPr algn="ctr"/>
+              <a:r>
+                <a:rPr lang="ko-KR" altLang="en-US" sz="3200" b="1" smtClean="0">
+                  <a:solidFill>
+                    <a:srgbClr val="C00000"/>
+                  </a:solidFill>
+                </a:rPr>
+                <a:t>기능 시뮬레이션검증이 가능한</a:t>
+              </a:r>
+              <a:endParaRPr lang="en-US" altLang="ko-KR" sz="3200" b="1" smtClean="0">
+                <a:solidFill>
+                  <a:srgbClr val="C00000"/>
+                </a:solidFill>
+              </a:endParaRPr>
+            </a:p>
+            <a:p>
+              <a:pPr algn="ctr"/>
+              <a:r>
+                <a:rPr lang="ko-KR" altLang="en-US" sz="3200" b="1" smtClean="0">
+                  <a:solidFill>
+                    <a:srgbClr val="C00000"/>
+                  </a:solidFill>
+                </a:rPr>
+                <a:t>아키텍처 설계</a:t>
+              </a:r>
+              <a:r>
+                <a:rPr lang="en-US" altLang="ko-KR" sz="3200" b="1" smtClean="0">
+                  <a:solidFill>
+                    <a:srgbClr val="C00000"/>
+                  </a:solidFill>
+                </a:rPr>
+                <a:t>(MBD Modeling)</a:t>
+              </a:r>
+              <a:endParaRPr lang="ko-KR" altLang="en-US" sz="3200" b="1" smtClean="0">
+                <a:solidFill>
+                  <a:srgbClr val="C00000"/>
+                </a:solidFill>
+              </a:endParaRPr>
+            </a:p>
+          </p:txBody>
+        </p:sp>
+      </p:grpSp>
     </p:spTree>
     <p:extLst>
       <p:ext uri="{BB962C8B-B14F-4D97-AF65-F5344CB8AC3E}">

</xml_diff>